<commit_message>
Ponto de Controle 2
</commit_message>
<xml_diff>
--- a/Ponto de Controle/PC2/Compiladores – java2c.pptx
+++ b/Ponto de Controle/PC2/Compiladores – java2c.pptx
@@ -12,9 +12,8 @@
     <p:sldId id="265" r:id="rId6"/>
     <p:sldId id="262" r:id="rId7"/>
     <p:sldId id="266" r:id="rId8"/>
-    <p:sldId id="263" r:id="rId9"/>
-    <p:sldId id="267" r:id="rId10"/>
-    <p:sldId id="264" r:id="rId11"/>
+    <p:sldId id="267" r:id="rId9"/>
+    <p:sldId id="264" r:id="rId10"/>
   </p:sldIdLst>
   <p:sldSz cx="12192000" cy="6858000"/>
   <p:notesSz cx="6858000" cy="9144000"/>
@@ -869,6 +868,753 @@
 </file>
 
 <file path=ppt/diagrams/colors2.xml><?xml version="1.0" encoding="utf-8"?>
+<dgm:colorsDef xmlns:dgm="http://schemas.openxmlformats.org/drawingml/2006/diagram" xmlns:a="http://schemas.openxmlformats.org/drawingml/2006/main" uniqueId="urn:microsoft.com/office/officeart/2005/8/colors/accent1_2">
+  <dgm:title val=""/>
+  <dgm:desc val=""/>
+  <dgm:catLst>
+    <dgm:cat type="accent1" pri="11200"/>
+  </dgm:catLst>
+  <dgm:styleLbl name="node0">
+    <dgm:fillClrLst meth="repeat">
+      <a:schemeClr val="accent1"/>
+    </dgm:fillClrLst>
+    <dgm:linClrLst meth="repeat">
+      <a:schemeClr val="lt1"/>
+    </dgm:linClrLst>
+    <dgm:effectClrLst/>
+    <dgm:txLinClrLst/>
+    <dgm:txFillClrLst/>
+    <dgm:txEffectClrLst/>
+  </dgm:styleLbl>
+  <dgm:styleLbl name="alignNode1">
+    <dgm:fillClrLst meth="repeat">
+      <a:schemeClr val="accent1"/>
+    </dgm:fillClrLst>
+    <dgm:linClrLst meth="repeat">
+      <a:schemeClr val="accent1"/>
+    </dgm:linClrLst>
+    <dgm:effectClrLst/>
+    <dgm:txLinClrLst/>
+    <dgm:txFillClrLst/>
+    <dgm:txEffectClrLst/>
+  </dgm:styleLbl>
+  <dgm:styleLbl name="node1">
+    <dgm:fillClrLst meth="repeat">
+      <a:schemeClr val="accent1"/>
+    </dgm:fillClrLst>
+    <dgm:linClrLst meth="repeat">
+      <a:schemeClr val="lt1"/>
+    </dgm:linClrLst>
+    <dgm:effectClrLst/>
+    <dgm:txLinClrLst/>
+    <dgm:txFillClrLst/>
+    <dgm:txEffectClrLst/>
+  </dgm:styleLbl>
+  <dgm:styleLbl name="lnNode1">
+    <dgm:fillClrLst meth="repeat">
+      <a:schemeClr val="accent1"/>
+    </dgm:fillClrLst>
+    <dgm:linClrLst meth="repeat">
+      <a:schemeClr val="lt1"/>
+    </dgm:linClrLst>
+    <dgm:effectClrLst/>
+    <dgm:txLinClrLst/>
+    <dgm:txFillClrLst/>
+    <dgm:txEffectClrLst/>
+  </dgm:styleLbl>
+  <dgm:styleLbl name="vennNode1">
+    <dgm:fillClrLst meth="repeat">
+      <a:schemeClr val="accent1">
+        <a:alpha val="50000"/>
+      </a:schemeClr>
+    </dgm:fillClrLst>
+    <dgm:linClrLst meth="repeat">
+      <a:schemeClr val="lt1"/>
+    </dgm:linClrLst>
+    <dgm:effectClrLst/>
+    <dgm:txLinClrLst/>
+    <dgm:txFillClrLst/>
+    <dgm:txEffectClrLst/>
+  </dgm:styleLbl>
+  <dgm:styleLbl name="node2">
+    <dgm:fillClrLst meth="repeat">
+      <a:schemeClr val="accent1"/>
+    </dgm:fillClrLst>
+    <dgm:linClrLst meth="repeat">
+      <a:schemeClr val="lt1"/>
+    </dgm:linClrLst>
+    <dgm:effectClrLst/>
+    <dgm:txLinClrLst/>
+    <dgm:txFillClrLst/>
+    <dgm:txEffectClrLst/>
+  </dgm:styleLbl>
+  <dgm:styleLbl name="node3">
+    <dgm:fillClrLst meth="repeat">
+      <a:schemeClr val="accent1"/>
+    </dgm:fillClrLst>
+    <dgm:linClrLst meth="repeat">
+      <a:schemeClr val="lt1"/>
+    </dgm:linClrLst>
+    <dgm:effectClrLst/>
+    <dgm:txLinClrLst/>
+    <dgm:txFillClrLst/>
+    <dgm:txEffectClrLst/>
+  </dgm:styleLbl>
+  <dgm:styleLbl name="node4">
+    <dgm:fillClrLst meth="repeat">
+      <a:schemeClr val="accent1"/>
+    </dgm:fillClrLst>
+    <dgm:linClrLst meth="repeat">
+      <a:schemeClr val="lt1"/>
+    </dgm:linClrLst>
+    <dgm:effectClrLst/>
+    <dgm:txLinClrLst/>
+    <dgm:txFillClrLst/>
+    <dgm:txEffectClrLst/>
+  </dgm:styleLbl>
+  <dgm:styleLbl name="fgImgPlace1">
+    <dgm:fillClrLst meth="repeat">
+      <a:schemeClr val="accent1">
+        <a:tint val="50000"/>
+      </a:schemeClr>
+    </dgm:fillClrLst>
+    <dgm:linClrLst meth="repeat">
+      <a:schemeClr val="lt1"/>
+    </dgm:linClrLst>
+    <dgm:effectClrLst/>
+    <dgm:txLinClrLst/>
+    <dgm:txFillClrLst meth="repeat">
+      <a:schemeClr val="lt1"/>
+    </dgm:txFillClrLst>
+    <dgm:txEffectClrLst/>
+  </dgm:styleLbl>
+  <dgm:styleLbl name="alignImgPlace1">
+    <dgm:fillClrLst meth="repeat">
+      <a:schemeClr val="accent1">
+        <a:tint val="50000"/>
+      </a:schemeClr>
+    </dgm:fillClrLst>
+    <dgm:linClrLst meth="repeat">
+      <a:schemeClr val="lt1"/>
+    </dgm:linClrLst>
+    <dgm:effectClrLst/>
+    <dgm:txLinClrLst/>
+    <dgm:txFillClrLst meth="repeat">
+      <a:schemeClr val="lt1"/>
+    </dgm:txFillClrLst>
+    <dgm:txEffectClrLst/>
+  </dgm:styleLbl>
+  <dgm:styleLbl name="bgImgPlace1">
+    <dgm:fillClrLst meth="repeat">
+      <a:schemeClr val="accent1">
+        <a:tint val="50000"/>
+      </a:schemeClr>
+    </dgm:fillClrLst>
+    <dgm:linClrLst meth="repeat">
+      <a:schemeClr val="lt1"/>
+    </dgm:linClrLst>
+    <dgm:effectClrLst/>
+    <dgm:txLinClrLst/>
+    <dgm:txFillClrLst meth="repeat">
+      <a:schemeClr val="lt1"/>
+    </dgm:txFillClrLst>
+    <dgm:txEffectClrLst/>
+  </dgm:styleLbl>
+  <dgm:styleLbl name="sibTrans2D1">
+    <dgm:fillClrLst meth="repeat">
+      <a:schemeClr val="accent1">
+        <a:tint val="60000"/>
+      </a:schemeClr>
+    </dgm:fillClrLst>
+    <dgm:linClrLst meth="repeat">
+      <a:schemeClr val="accent1">
+        <a:tint val="60000"/>
+      </a:schemeClr>
+    </dgm:linClrLst>
+    <dgm:effectClrLst/>
+    <dgm:txLinClrLst/>
+    <dgm:txFillClrLst/>
+    <dgm:txEffectClrLst/>
+  </dgm:styleLbl>
+  <dgm:styleLbl name="fgSibTrans2D1">
+    <dgm:fillClrLst meth="repeat">
+      <a:schemeClr val="accent1">
+        <a:tint val="60000"/>
+      </a:schemeClr>
+    </dgm:fillClrLst>
+    <dgm:linClrLst meth="repeat">
+      <a:schemeClr val="accent1">
+        <a:tint val="60000"/>
+      </a:schemeClr>
+    </dgm:linClrLst>
+    <dgm:effectClrLst/>
+    <dgm:txLinClrLst/>
+    <dgm:txFillClrLst/>
+    <dgm:txEffectClrLst/>
+  </dgm:styleLbl>
+  <dgm:styleLbl name="bgSibTrans2D1">
+    <dgm:fillClrLst meth="repeat">
+      <a:schemeClr val="accent1">
+        <a:tint val="60000"/>
+      </a:schemeClr>
+    </dgm:fillClrLst>
+    <dgm:linClrLst meth="repeat">
+      <a:schemeClr val="accent1">
+        <a:tint val="60000"/>
+      </a:schemeClr>
+    </dgm:linClrLst>
+    <dgm:effectClrLst/>
+    <dgm:txLinClrLst/>
+    <dgm:txFillClrLst/>
+    <dgm:txEffectClrLst/>
+  </dgm:styleLbl>
+  <dgm:styleLbl name="sibTrans1D1">
+    <dgm:fillClrLst meth="repeat">
+      <a:schemeClr val="accent1"/>
+    </dgm:fillClrLst>
+    <dgm:linClrLst meth="repeat">
+      <a:schemeClr val="accent1"/>
+    </dgm:linClrLst>
+    <dgm:effectClrLst/>
+    <dgm:txLinClrLst/>
+    <dgm:txFillClrLst meth="repeat">
+      <a:schemeClr val="tx1"/>
+    </dgm:txFillClrLst>
+    <dgm:txEffectClrLst/>
+  </dgm:styleLbl>
+  <dgm:styleLbl name="callout">
+    <dgm:fillClrLst meth="repeat">
+      <a:schemeClr val="accent1"/>
+    </dgm:fillClrLst>
+    <dgm:linClrLst meth="repeat">
+      <a:schemeClr val="accent1">
+        <a:tint val="50000"/>
+      </a:schemeClr>
+    </dgm:linClrLst>
+    <dgm:effectClrLst/>
+    <dgm:txLinClrLst/>
+    <dgm:txFillClrLst meth="repeat">
+      <a:schemeClr val="tx1"/>
+    </dgm:txFillClrLst>
+    <dgm:txEffectClrLst/>
+  </dgm:styleLbl>
+  <dgm:styleLbl name="asst0">
+    <dgm:fillClrLst meth="repeat">
+      <a:schemeClr val="accent1"/>
+    </dgm:fillClrLst>
+    <dgm:linClrLst meth="repeat">
+      <a:schemeClr val="lt1"/>
+    </dgm:linClrLst>
+    <dgm:effectClrLst/>
+    <dgm:txLinClrLst/>
+    <dgm:txFillClrLst/>
+    <dgm:txEffectClrLst/>
+  </dgm:styleLbl>
+  <dgm:styleLbl name="asst1">
+    <dgm:fillClrLst meth="repeat">
+      <a:schemeClr val="accent1"/>
+    </dgm:fillClrLst>
+    <dgm:linClrLst meth="repeat">
+      <a:schemeClr val="lt1"/>
+    </dgm:linClrLst>
+    <dgm:effectClrLst/>
+    <dgm:txLinClrLst/>
+    <dgm:txFillClrLst/>
+    <dgm:txEffectClrLst/>
+  </dgm:styleLbl>
+  <dgm:styleLbl name="asst2">
+    <dgm:fillClrLst meth="repeat">
+      <a:schemeClr val="accent1"/>
+    </dgm:fillClrLst>
+    <dgm:linClrLst meth="repeat">
+      <a:schemeClr val="lt1"/>
+    </dgm:linClrLst>
+    <dgm:effectClrLst/>
+    <dgm:txLinClrLst/>
+    <dgm:txFillClrLst/>
+    <dgm:txEffectClrLst/>
+  </dgm:styleLbl>
+  <dgm:styleLbl name="asst3">
+    <dgm:fillClrLst meth="repeat">
+      <a:schemeClr val="accent1"/>
+    </dgm:fillClrLst>
+    <dgm:linClrLst meth="repeat">
+      <a:schemeClr val="lt1"/>
+    </dgm:linClrLst>
+    <dgm:effectClrLst/>
+    <dgm:txLinClrLst/>
+    <dgm:txFillClrLst/>
+    <dgm:txEffectClrLst/>
+  </dgm:styleLbl>
+  <dgm:styleLbl name="asst4">
+    <dgm:fillClrLst meth="repeat">
+      <a:schemeClr val="accent1"/>
+    </dgm:fillClrLst>
+    <dgm:linClrLst meth="repeat">
+      <a:schemeClr val="lt1"/>
+    </dgm:linClrLst>
+    <dgm:effectClrLst/>
+    <dgm:txLinClrLst/>
+    <dgm:txFillClrLst/>
+    <dgm:txEffectClrLst/>
+  </dgm:styleLbl>
+  <dgm:styleLbl name="parChTrans2D1">
+    <dgm:fillClrLst meth="repeat">
+      <a:schemeClr val="accent1">
+        <a:tint val="60000"/>
+      </a:schemeClr>
+    </dgm:fillClrLst>
+    <dgm:linClrLst meth="repeat">
+      <a:schemeClr val="accent1">
+        <a:tint val="60000"/>
+      </a:schemeClr>
+    </dgm:linClrLst>
+    <dgm:effectClrLst/>
+    <dgm:txLinClrLst/>
+    <dgm:txFillClrLst meth="repeat">
+      <a:schemeClr val="lt1"/>
+    </dgm:txFillClrLst>
+    <dgm:txEffectClrLst/>
+  </dgm:styleLbl>
+  <dgm:styleLbl name="parChTrans2D2">
+    <dgm:fillClrLst meth="repeat">
+      <a:schemeClr val="accent1"/>
+    </dgm:fillClrLst>
+    <dgm:linClrLst meth="repeat">
+      <a:schemeClr val="accent1"/>
+    </dgm:linClrLst>
+    <dgm:effectClrLst/>
+    <dgm:txLinClrLst/>
+    <dgm:txFillClrLst meth="repeat">
+      <a:schemeClr val="lt1"/>
+    </dgm:txFillClrLst>
+    <dgm:txEffectClrLst/>
+  </dgm:styleLbl>
+  <dgm:styleLbl name="parChTrans2D3">
+    <dgm:fillClrLst meth="repeat">
+      <a:schemeClr val="accent1"/>
+    </dgm:fillClrLst>
+    <dgm:linClrLst meth="repeat">
+      <a:schemeClr val="accent1"/>
+    </dgm:linClrLst>
+    <dgm:effectClrLst/>
+    <dgm:txLinClrLst/>
+    <dgm:txFillClrLst meth="repeat">
+      <a:schemeClr val="lt1"/>
+    </dgm:txFillClrLst>
+    <dgm:txEffectClrLst/>
+  </dgm:styleLbl>
+  <dgm:styleLbl name="parChTrans2D4">
+    <dgm:fillClrLst meth="repeat">
+      <a:schemeClr val="accent1"/>
+    </dgm:fillClrLst>
+    <dgm:linClrLst meth="repeat">
+      <a:schemeClr val="accent1"/>
+    </dgm:linClrLst>
+    <dgm:effectClrLst/>
+    <dgm:txLinClrLst/>
+    <dgm:txFillClrLst meth="repeat">
+      <a:schemeClr val="lt1"/>
+    </dgm:txFillClrLst>
+    <dgm:txEffectClrLst/>
+  </dgm:styleLbl>
+  <dgm:styleLbl name="parChTrans1D1">
+    <dgm:fillClrLst meth="repeat">
+      <a:schemeClr val="accent1"/>
+    </dgm:fillClrLst>
+    <dgm:linClrLst meth="repeat">
+      <a:schemeClr val="accent1">
+        <a:shade val="60000"/>
+      </a:schemeClr>
+    </dgm:linClrLst>
+    <dgm:effectClrLst/>
+    <dgm:txLinClrLst/>
+    <dgm:txFillClrLst meth="repeat">
+      <a:schemeClr val="tx1"/>
+    </dgm:txFillClrLst>
+    <dgm:txEffectClrLst/>
+  </dgm:styleLbl>
+  <dgm:styleLbl name="parChTrans1D2">
+    <dgm:fillClrLst meth="repeat">
+      <a:schemeClr val="accent1"/>
+    </dgm:fillClrLst>
+    <dgm:linClrLst meth="repeat">
+      <a:schemeClr val="accent1">
+        <a:shade val="60000"/>
+      </a:schemeClr>
+    </dgm:linClrLst>
+    <dgm:effectClrLst/>
+    <dgm:txLinClrLst/>
+    <dgm:txFillClrLst meth="repeat">
+      <a:schemeClr val="tx1"/>
+    </dgm:txFillClrLst>
+    <dgm:txEffectClrLst/>
+  </dgm:styleLbl>
+  <dgm:styleLbl name="parChTrans1D3">
+    <dgm:fillClrLst meth="repeat">
+      <a:schemeClr val="accent1"/>
+    </dgm:fillClrLst>
+    <dgm:linClrLst meth="repeat">
+      <a:schemeClr val="accent1">
+        <a:shade val="80000"/>
+      </a:schemeClr>
+    </dgm:linClrLst>
+    <dgm:effectClrLst/>
+    <dgm:txLinClrLst/>
+    <dgm:txFillClrLst meth="repeat">
+      <a:schemeClr val="tx1"/>
+    </dgm:txFillClrLst>
+    <dgm:txEffectClrLst/>
+  </dgm:styleLbl>
+  <dgm:styleLbl name="parChTrans1D4">
+    <dgm:fillClrLst meth="repeat">
+      <a:schemeClr val="accent1"/>
+    </dgm:fillClrLst>
+    <dgm:linClrLst meth="repeat">
+      <a:schemeClr val="accent1">
+        <a:shade val="80000"/>
+      </a:schemeClr>
+    </dgm:linClrLst>
+    <dgm:effectClrLst/>
+    <dgm:txLinClrLst/>
+    <dgm:txFillClrLst meth="repeat">
+      <a:schemeClr val="tx1"/>
+    </dgm:txFillClrLst>
+    <dgm:txEffectClrLst/>
+  </dgm:styleLbl>
+  <dgm:styleLbl name="fgAcc1">
+    <dgm:fillClrLst meth="repeat">
+      <a:schemeClr val="lt1">
+        <a:alpha val="90000"/>
+      </a:schemeClr>
+    </dgm:fillClrLst>
+    <dgm:linClrLst meth="repeat">
+      <a:schemeClr val="accent1"/>
+    </dgm:linClrLst>
+    <dgm:effectClrLst/>
+    <dgm:txLinClrLst/>
+    <dgm:txFillClrLst meth="repeat">
+      <a:schemeClr val="dk1"/>
+    </dgm:txFillClrLst>
+    <dgm:txEffectClrLst/>
+  </dgm:styleLbl>
+  <dgm:styleLbl name="conFgAcc1">
+    <dgm:fillClrLst meth="repeat">
+      <a:schemeClr val="lt1">
+        <a:alpha val="90000"/>
+      </a:schemeClr>
+    </dgm:fillClrLst>
+    <dgm:linClrLst meth="repeat">
+      <a:schemeClr val="accent1"/>
+    </dgm:linClrLst>
+    <dgm:effectClrLst/>
+    <dgm:txLinClrLst/>
+    <dgm:txFillClrLst meth="repeat">
+      <a:schemeClr val="dk1"/>
+    </dgm:txFillClrLst>
+    <dgm:txEffectClrLst/>
+  </dgm:styleLbl>
+  <dgm:styleLbl name="alignAcc1">
+    <dgm:fillClrLst meth="repeat">
+      <a:schemeClr val="lt1">
+        <a:alpha val="90000"/>
+      </a:schemeClr>
+    </dgm:fillClrLst>
+    <dgm:linClrLst meth="repeat">
+      <a:schemeClr val="accent1"/>
+    </dgm:linClrLst>
+    <dgm:effectClrLst/>
+    <dgm:txLinClrLst/>
+    <dgm:txFillClrLst meth="repeat">
+      <a:schemeClr val="dk1"/>
+    </dgm:txFillClrLst>
+    <dgm:txEffectClrLst/>
+  </dgm:styleLbl>
+  <dgm:styleLbl name="trAlignAcc1">
+    <dgm:fillClrLst meth="repeat">
+      <a:schemeClr val="lt1">
+        <a:alpha val="40000"/>
+      </a:schemeClr>
+    </dgm:fillClrLst>
+    <dgm:linClrLst meth="repeat">
+      <a:schemeClr val="accent1"/>
+    </dgm:linClrLst>
+    <dgm:effectClrLst/>
+    <dgm:txLinClrLst/>
+    <dgm:txFillClrLst meth="repeat">
+      <a:schemeClr val="dk1"/>
+    </dgm:txFillClrLst>
+    <dgm:txEffectClrLst/>
+  </dgm:styleLbl>
+  <dgm:styleLbl name="bgAcc1">
+    <dgm:fillClrLst meth="repeat">
+      <a:schemeClr val="lt1">
+        <a:alpha val="90000"/>
+      </a:schemeClr>
+    </dgm:fillClrLst>
+    <dgm:linClrLst meth="repeat">
+      <a:schemeClr val="accent1"/>
+    </dgm:linClrLst>
+    <dgm:effectClrLst/>
+    <dgm:txLinClrLst/>
+    <dgm:txFillClrLst meth="repeat">
+      <a:schemeClr val="dk1"/>
+    </dgm:txFillClrLst>
+    <dgm:txEffectClrLst/>
+  </dgm:styleLbl>
+  <dgm:styleLbl name="solidFgAcc1">
+    <dgm:fillClrLst meth="repeat">
+      <a:schemeClr val="lt1"/>
+    </dgm:fillClrLst>
+    <dgm:linClrLst meth="repeat">
+      <a:schemeClr val="accent1"/>
+    </dgm:linClrLst>
+    <dgm:effectClrLst/>
+    <dgm:txLinClrLst/>
+    <dgm:txFillClrLst meth="repeat">
+      <a:schemeClr val="dk1"/>
+    </dgm:txFillClrLst>
+    <dgm:txEffectClrLst/>
+  </dgm:styleLbl>
+  <dgm:styleLbl name="solidAlignAcc1">
+    <dgm:fillClrLst meth="repeat">
+      <a:schemeClr val="lt1"/>
+    </dgm:fillClrLst>
+    <dgm:linClrLst meth="repeat">
+      <a:schemeClr val="accent1"/>
+    </dgm:linClrLst>
+    <dgm:effectClrLst/>
+    <dgm:txLinClrLst/>
+    <dgm:txFillClrLst meth="repeat">
+      <a:schemeClr val="dk1"/>
+    </dgm:txFillClrLst>
+    <dgm:txEffectClrLst/>
+  </dgm:styleLbl>
+  <dgm:styleLbl name="solidBgAcc1">
+    <dgm:fillClrLst meth="repeat">
+      <a:schemeClr val="lt1"/>
+    </dgm:fillClrLst>
+    <dgm:linClrLst meth="repeat">
+      <a:schemeClr val="accent1"/>
+    </dgm:linClrLst>
+    <dgm:effectClrLst/>
+    <dgm:txLinClrLst/>
+    <dgm:txFillClrLst meth="repeat">
+      <a:schemeClr val="dk1"/>
+    </dgm:txFillClrLst>
+    <dgm:txEffectClrLst/>
+  </dgm:styleLbl>
+  <dgm:styleLbl name="fgAccFollowNode1">
+    <dgm:fillClrLst meth="repeat">
+      <a:schemeClr val="accent1">
+        <a:alpha val="90000"/>
+        <a:tint val="40000"/>
+      </a:schemeClr>
+    </dgm:fillClrLst>
+    <dgm:linClrLst meth="repeat">
+      <a:schemeClr val="accent1">
+        <a:alpha val="90000"/>
+        <a:tint val="40000"/>
+      </a:schemeClr>
+    </dgm:linClrLst>
+    <dgm:effectClrLst/>
+    <dgm:txLinClrLst/>
+    <dgm:txFillClrLst meth="repeat">
+      <a:schemeClr val="dk1"/>
+    </dgm:txFillClrLst>
+    <dgm:txEffectClrLst/>
+  </dgm:styleLbl>
+  <dgm:styleLbl name="alignAccFollowNode1">
+    <dgm:fillClrLst meth="repeat">
+      <a:schemeClr val="accent1">
+        <a:alpha val="90000"/>
+        <a:tint val="40000"/>
+      </a:schemeClr>
+    </dgm:fillClrLst>
+    <dgm:linClrLst meth="repeat">
+      <a:schemeClr val="accent1">
+        <a:alpha val="90000"/>
+        <a:tint val="40000"/>
+      </a:schemeClr>
+    </dgm:linClrLst>
+    <dgm:effectClrLst/>
+    <dgm:txLinClrLst/>
+    <dgm:txFillClrLst meth="repeat">
+      <a:schemeClr val="dk1"/>
+    </dgm:txFillClrLst>
+    <dgm:txEffectClrLst/>
+  </dgm:styleLbl>
+  <dgm:styleLbl name="bgAccFollowNode1">
+    <dgm:fillClrLst meth="repeat">
+      <a:schemeClr val="accent1">
+        <a:alpha val="90000"/>
+        <a:tint val="40000"/>
+      </a:schemeClr>
+    </dgm:fillClrLst>
+    <dgm:linClrLst meth="repeat">
+      <a:schemeClr val="accent1">
+        <a:alpha val="90000"/>
+        <a:tint val="40000"/>
+      </a:schemeClr>
+    </dgm:linClrLst>
+    <dgm:effectClrLst/>
+    <dgm:txLinClrLst/>
+    <dgm:txFillClrLst meth="repeat">
+      <a:schemeClr val="dk1"/>
+    </dgm:txFillClrLst>
+    <dgm:txEffectClrLst/>
+  </dgm:styleLbl>
+  <dgm:styleLbl name="fgAcc0">
+    <dgm:fillClrLst meth="repeat">
+      <a:schemeClr val="lt1">
+        <a:alpha val="90000"/>
+      </a:schemeClr>
+    </dgm:fillClrLst>
+    <dgm:linClrLst meth="repeat">
+      <a:schemeClr val="accent1"/>
+    </dgm:linClrLst>
+    <dgm:effectClrLst/>
+    <dgm:txLinClrLst/>
+    <dgm:txFillClrLst meth="repeat">
+      <a:schemeClr val="dk1"/>
+    </dgm:txFillClrLst>
+    <dgm:txEffectClrLst/>
+  </dgm:styleLbl>
+  <dgm:styleLbl name="fgAcc2">
+    <dgm:fillClrLst meth="repeat">
+      <a:schemeClr val="lt1">
+        <a:alpha val="90000"/>
+      </a:schemeClr>
+    </dgm:fillClrLst>
+    <dgm:linClrLst meth="repeat">
+      <a:schemeClr val="accent1"/>
+    </dgm:linClrLst>
+    <dgm:effectClrLst/>
+    <dgm:txLinClrLst/>
+    <dgm:txFillClrLst meth="repeat">
+      <a:schemeClr val="dk1"/>
+    </dgm:txFillClrLst>
+    <dgm:txEffectClrLst/>
+  </dgm:styleLbl>
+  <dgm:styleLbl name="fgAcc3">
+    <dgm:fillClrLst meth="repeat">
+      <a:schemeClr val="lt1">
+        <a:alpha val="90000"/>
+      </a:schemeClr>
+    </dgm:fillClrLst>
+    <dgm:linClrLst meth="repeat">
+      <a:schemeClr val="accent1"/>
+    </dgm:linClrLst>
+    <dgm:effectClrLst/>
+    <dgm:txLinClrLst/>
+    <dgm:txFillClrLst meth="repeat">
+      <a:schemeClr val="dk1"/>
+    </dgm:txFillClrLst>
+    <dgm:txEffectClrLst/>
+  </dgm:styleLbl>
+  <dgm:styleLbl name="fgAcc4">
+    <dgm:fillClrLst meth="repeat">
+      <a:schemeClr val="lt1">
+        <a:alpha val="90000"/>
+      </a:schemeClr>
+    </dgm:fillClrLst>
+    <dgm:linClrLst meth="repeat">
+      <a:schemeClr val="accent1"/>
+    </dgm:linClrLst>
+    <dgm:effectClrLst/>
+    <dgm:txLinClrLst/>
+    <dgm:txFillClrLst meth="repeat">
+      <a:schemeClr val="dk1"/>
+    </dgm:txFillClrLst>
+    <dgm:txEffectClrLst/>
+  </dgm:styleLbl>
+  <dgm:styleLbl name="bgShp">
+    <dgm:fillClrLst meth="repeat">
+      <a:schemeClr val="accent1">
+        <a:tint val="40000"/>
+      </a:schemeClr>
+    </dgm:fillClrLst>
+    <dgm:linClrLst meth="repeat">
+      <a:schemeClr val="accent1"/>
+    </dgm:linClrLst>
+    <dgm:effectClrLst/>
+    <dgm:txLinClrLst/>
+    <dgm:txFillClrLst meth="repeat">
+      <a:schemeClr val="dk1"/>
+    </dgm:txFillClrLst>
+    <dgm:txEffectClrLst/>
+  </dgm:styleLbl>
+  <dgm:styleLbl name="dkBgShp">
+    <dgm:fillClrLst meth="repeat">
+      <a:schemeClr val="accent1">
+        <a:shade val="80000"/>
+      </a:schemeClr>
+    </dgm:fillClrLst>
+    <dgm:linClrLst meth="repeat">
+      <a:schemeClr val="accent1"/>
+    </dgm:linClrLst>
+    <dgm:effectClrLst/>
+    <dgm:txLinClrLst/>
+    <dgm:txFillClrLst meth="repeat">
+      <a:schemeClr val="lt1"/>
+    </dgm:txFillClrLst>
+    <dgm:txEffectClrLst/>
+  </dgm:styleLbl>
+  <dgm:styleLbl name="trBgShp">
+    <dgm:fillClrLst meth="repeat">
+      <a:schemeClr val="accent1">
+        <a:tint val="50000"/>
+        <a:alpha val="40000"/>
+      </a:schemeClr>
+    </dgm:fillClrLst>
+    <dgm:linClrLst meth="repeat">
+      <a:schemeClr val="accent1"/>
+    </dgm:linClrLst>
+    <dgm:effectClrLst/>
+    <dgm:txLinClrLst/>
+    <dgm:txFillClrLst meth="repeat">
+      <a:schemeClr val="lt1"/>
+    </dgm:txFillClrLst>
+    <dgm:txEffectClrLst/>
+  </dgm:styleLbl>
+  <dgm:styleLbl name="fgShp">
+    <dgm:fillClrLst meth="repeat">
+      <a:schemeClr val="accent1">
+        <a:tint val="60000"/>
+      </a:schemeClr>
+    </dgm:fillClrLst>
+    <dgm:linClrLst meth="repeat">
+      <a:schemeClr val="lt1"/>
+    </dgm:linClrLst>
+    <dgm:effectClrLst/>
+    <dgm:txLinClrLst/>
+    <dgm:txFillClrLst meth="repeat">
+      <a:schemeClr val="dk1"/>
+    </dgm:txFillClrLst>
+    <dgm:txEffectClrLst/>
+  </dgm:styleLbl>
+  <dgm:styleLbl name="revTx">
+    <dgm:fillClrLst meth="repeat">
+      <a:schemeClr val="lt1">
+        <a:alpha val="0"/>
+      </a:schemeClr>
+    </dgm:fillClrLst>
+    <dgm:linClrLst meth="repeat">
+      <a:schemeClr val="dk1">
+        <a:alpha val="0"/>
+      </a:schemeClr>
+    </dgm:linClrLst>
+    <dgm:effectClrLst/>
+    <dgm:txLinClrLst/>
+    <dgm:txFillClrLst meth="repeat">
+      <a:schemeClr val="tx1"/>
+    </dgm:txFillClrLst>
+    <dgm:txEffectClrLst/>
+  </dgm:styleLbl>
+</dgm:colorsDef>
+</file>
+
+<file path=ppt/diagrams/colors3.xml><?xml version="1.0" encoding="utf-8"?>
 <dgm:colorsDef xmlns:dgm="http://schemas.openxmlformats.org/drawingml/2006/diagram" xmlns:a="http://schemas.openxmlformats.org/drawingml/2006/main" uniqueId="urn:microsoft.com/office/officeart/2005/8/colors/accent1_2">
   <dgm:title val=""/>
   <dgm:desc val=""/>
@@ -2282,7 +3028,7 @@
         <a:p>
           <a:r>
             <a:rPr lang="pt-BR" dirty="0" smtClean="0"/>
-            <a:t>Detalhamento do escopo</a:t>
+            <a:t>Token</a:t>
           </a:r>
           <a:endParaRPr lang="pt-BR" dirty="0"/>
         </a:p>
@@ -2585,39 +3331,39 @@
     </dgm:pt>
   </dgm:ptLst>
   <dgm:cxnLst>
-    <dgm:cxn modelId="{97DACB0F-0F06-4D3F-B6EA-F748C7E883D0}" type="presOf" srcId="{2AB7BB3F-DCBC-41B6-8039-31AECBBBDAA6}" destId="{9F21655B-70FD-4D96-BE75-E18CDDCF19A5}" srcOrd="1" destOrd="0" presId="urn:microsoft.com/office/officeart/2005/8/layout/hProcess4"/>
-    <dgm:cxn modelId="{57E33C77-93A3-4759-8C5A-8B07E534E439}" srcId="{89049DC1-A649-471E-866F-01C974D3754C}" destId="{CA1247BC-A486-4F22-9783-7C8ADFE2481F}" srcOrd="2" destOrd="0" parTransId="{8A67C6CD-E341-405E-A9D8-B66C80DA0C60}" sibTransId="{68F35897-53F3-4C67-B7FB-9BB04DB9668C}"/>
+    <dgm:cxn modelId="{D7F05B96-C766-44EA-9AE3-1D6EBCFA7E6B}" type="presOf" srcId="{7485ED6D-7763-44CB-A3A3-C5FA6F95B99B}" destId="{E851F0C7-646D-495D-8281-E4D054BA7C6C}" srcOrd="0" destOrd="0" presId="urn:microsoft.com/office/officeart/2005/8/layout/hProcess4"/>
+    <dgm:cxn modelId="{A07EE1C0-0BB3-4CC4-92B6-E08723040321}" type="presOf" srcId="{B16E2BDC-DC51-46BA-A2EB-96A666024A48}" destId="{DB377DA4-71DA-4792-9A7A-CE5D0599E62D}" srcOrd="0" destOrd="2" presId="urn:microsoft.com/office/officeart/2005/8/layout/hProcess4"/>
+    <dgm:cxn modelId="{BC19FE70-069D-4C86-A67E-BD06D3592E1F}" srcId="{C9E4D9AC-E7BF-422E-B79A-BC81E5EBE4FA}" destId="{B16E2BDC-DC51-46BA-A2EB-96A666024A48}" srcOrd="2" destOrd="0" parTransId="{16BDA239-DFA3-48C9-B653-F0954C0B879B}" sibTransId="{87F29D28-C4D2-47D9-BDEE-001A70ADB091}"/>
+    <dgm:cxn modelId="{3D548A06-17B6-41B4-8D1F-EDBE6F4E02B7}" type="presOf" srcId="{72692382-1636-4044-A508-C226E4CDD7FB}" destId="{6D554565-742B-4756-BFA8-28E409FD4972}" srcOrd="0" destOrd="3" presId="urn:microsoft.com/office/officeart/2005/8/layout/hProcess4"/>
+    <dgm:cxn modelId="{1D90C970-76E6-464D-9A6B-F02E8680783B}" type="presOf" srcId="{C27A3DEC-A16C-4C08-B047-E07D53AB393E}" destId="{6D554565-742B-4756-BFA8-28E409FD4972}" srcOrd="0" destOrd="2" presId="urn:microsoft.com/office/officeart/2005/8/layout/hProcess4"/>
+    <dgm:cxn modelId="{FD82E558-C7A7-4DCD-89B5-8B38C8BD70BE}" type="presOf" srcId="{68F35897-53F3-4C67-B7FB-9BB04DB9668C}" destId="{84E39F03-D8D6-49D9-A31A-E92025C829D9}" srcOrd="0" destOrd="0" presId="urn:microsoft.com/office/officeart/2005/8/layout/hProcess4"/>
+    <dgm:cxn modelId="{FB683E4F-C9BE-4521-974A-06797DBC9DBC}" type="presOf" srcId="{CA1247BC-A486-4F22-9783-7C8ADFE2481F}" destId="{B9C8E1F6-53F1-46F8-A169-158621352E82}" srcOrd="0" destOrd="0" presId="urn:microsoft.com/office/officeart/2005/8/layout/hProcess4"/>
+    <dgm:cxn modelId="{38096D8B-E4E0-426A-94C4-7108D5F76A0D}" type="presOf" srcId="{F0D39EC3-93A3-4B87-8995-7CE449898872}" destId="{9420C313-967D-47FD-9D26-66DC561F491A}" srcOrd="0" destOrd="0" presId="urn:microsoft.com/office/officeart/2005/8/layout/hProcess4"/>
+    <dgm:cxn modelId="{DA7A213F-327A-45BE-9D68-5D89D22CCD6B}" type="presOf" srcId="{0B699787-534F-45FE-AB75-AFA0F29A2EEE}" destId="{6CAFE6CA-DF3A-4E7A-9A54-77A9CBCF12C6}" srcOrd="1" destOrd="1" presId="urn:microsoft.com/office/officeart/2005/8/layout/hProcess4"/>
     <dgm:cxn modelId="{BFF80A27-A4EF-4138-A38F-B16DEDE966E6}" type="presOf" srcId="{C27A3DEC-A16C-4C08-B047-E07D53AB393E}" destId="{6CAFE6CA-DF3A-4E7A-9A54-77A9CBCF12C6}" srcOrd="1" destOrd="2" presId="urn:microsoft.com/office/officeart/2005/8/layout/hProcess4"/>
     <dgm:cxn modelId="{37CB071B-61AE-453E-B475-3CEB4D9CC03F}" srcId="{89049DC1-A649-471E-866F-01C974D3754C}" destId="{ADF6D1EA-BCCE-4618-850A-FF121CE8CC37}" srcOrd="3" destOrd="0" parTransId="{5540661B-3981-43B6-A06A-28129BBE45E4}" sibTransId="{5C22AF0B-7B2B-460D-ABD3-31B3072DED60}"/>
+    <dgm:cxn modelId="{78F53DC9-BCFF-424B-B0F8-2AA61768E457}" srcId="{C9E4D9AC-E7BF-422E-B79A-BC81E5EBE4FA}" destId="{820D3869-0D8C-4E25-99E8-45CDF5D9BDEC}" srcOrd="1" destOrd="0" parTransId="{AF3815AA-20F7-471F-8F0E-A567D5AE3F6A}" sibTransId="{A8A6BD53-FD6B-482E-AD11-D72DFE995F15}"/>
+    <dgm:cxn modelId="{CB229B04-1DC5-4B77-A179-82183ABBD291}" type="presOf" srcId="{0B699787-534F-45FE-AB75-AFA0F29A2EEE}" destId="{6D554565-742B-4756-BFA8-28E409FD4972}" srcOrd="0" destOrd="1" presId="urn:microsoft.com/office/officeart/2005/8/layout/hProcess4"/>
+    <dgm:cxn modelId="{4A4E2597-84CC-473C-8540-F958A4A0A4BC}" type="presOf" srcId="{8BDA44EB-A524-49BA-81C9-8B53E0926F00}" destId="{BD54F51C-23F4-4B8C-A1D1-797BE2CF018B}" srcOrd="0" destOrd="0" presId="urn:microsoft.com/office/officeart/2005/8/layout/hProcess4"/>
+    <dgm:cxn modelId="{0E5A17E5-1EE2-4500-AB15-31F3BA901657}" type="presOf" srcId="{89049DC1-A649-471E-866F-01C974D3754C}" destId="{59202DAD-34A5-4F1F-9FFC-30AC15EC3534}" srcOrd="0" destOrd="0" presId="urn:microsoft.com/office/officeart/2005/8/layout/hProcess4"/>
+    <dgm:cxn modelId="{3ACF03F8-014F-4F7F-9EF1-CD05FDA996A4}" type="presOf" srcId="{820D3869-0D8C-4E25-99E8-45CDF5D9BDEC}" destId="{9F21655B-70FD-4D96-BE75-E18CDDCF19A5}" srcOrd="1" destOrd="1" presId="urn:microsoft.com/office/officeart/2005/8/layout/hProcess4"/>
+    <dgm:cxn modelId="{9E8136F3-5D97-48DF-A124-75A3A1583D61}" type="presOf" srcId="{C9E4D9AC-E7BF-422E-B79A-BC81E5EBE4FA}" destId="{E4EEEADF-9BED-477D-94B3-F1F28FAE75AE}" srcOrd="0" destOrd="0" presId="urn:microsoft.com/office/officeart/2005/8/layout/hProcess4"/>
+    <dgm:cxn modelId="{0F6BA46E-36DD-48E5-A942-E06227569E01}" type="presOf" srcId="{ADF6D1EA-BCCE-4618-850A-FF121CE8CC37}" destId="{74ACF545-5F10-4867-B2C9-AD98709609C0}" srcOrd="0" destOrd="0" presId="urn:microsoft.com/office/officeart/2005/8/layout/hProcess4"/>
+    <dgm:cxn modelId="{57E33C77-93A3-4759-8C5A-8B07E534E439}" srcId="{89049DC1-A649-471E-866F-01C974D3754C}" destId="{CA1247BC-A486-4F22-9783-7C8ADFE2481F}" srcOrd="2" destOrd="0" parTransId="{8A67C6CD-E341-405E-A9D8-B66C80DA0C60}" sibTransId="{68F35897-53F3-4C67-B7FB-9BB04DB9668C}"/>
+    <dgm:cxn modelId="{F7229B2C-DE2D-4B77-A03E-A9CB0643053F}" type="presOf" srcId="{B16E2BDC-DC51-46BA-A2EB-96A666024A48}" destId="{9F21655B-70FD-4D96-BE75-E18CDDCF19A5}" srcOrd="1" destOrd="2" presId="urn:microsoft.com/office/officeart/2005/8/layout/hProcess4"/>
+    <dgm:cxn modelId="{1CB27949-B576-483D-96ED-D505D967F2B2}" type="presOf" srcId="{2AB7BB3F-DCBC-41B6-8039-31AECBBBDAA6}" destId="{DB377DA4-71DA-4792-9A7A-CE5D0599E62D}" srcOrd="0" destOrd="0" presId="urn:microsoft.com/office/officeart/2005/8/layout/hProcess4"/>
+    <dgm:cxn modelId="{97DACB0F-0F06-4D3F-B6EA-F748C7E883D0}" type="presOf" srcId="{2AB7BB3F-DCBC-41B6-8039-31AECBBBDAA6}" destId="{9F21655B-70FD-4D96-BE75-E18CDDCF19A5}" srcOrd="1" destOrd="0" presId="urn:microsoft.com/office/officeart/2005/8/layout/hProcess4"/>
+    <dgm:cxn modelId="{7C3B8B7D-F77C-46AD-9B7A-D8BFA9A713FB}" srcId="{7485ED6D-7763-44CB-A3A3-C5FA6F95B99B}" destId="{0482B99A-3D3A-40CB-A03C-FA1E24B1AD44}" srcOrd="0" destOrd="0" parTransId="{AF6B76E8-ACF1-4816-888C-788E722CE7BC}" sibTransId="{0AD17C91-E002-4A34-9BB7-768D8A62D717}"/>
+    <dgm:cxn modelId="{7107D3A7-B00B-41F5-A9E0-2AF0C88C0C7D}" srcId="{89049DC1-A649-471E-866F-01C974D3754C}" destId="{C9E4D9AC-E7BF-422E-B79A-BC81E5EBE4FA}" srcOrd="1" destOrd="0" parTransId="{10714588-CB09-4D4A-9671-0BCD3087FB11}" sibTransId="{8BDA44EB-A524-49BA-81C9-8B53E0926F00}"/>
     <dgm:cxn modelId="{AB8BFCFF-CD4C-41CB-92AD-BF104706B9AC}" srcId="{7485ED6D-7763-44CB-A3A3-C5FA6F95B99B}" destId="{C27A3DEC-A16C-4C08-B047-E07D53AB393E}" srcOrd="2" destOrd="0" parTransId="{D9C2F1B4-3212-495E-89BF-BEF802A1E7AA}" sibTransId="{EEA6E960-B0E3-4D83-8A8A-58675ED02A15}"/>
-    <dgm:cxn modelId="{CB229B04-1DC5-4B77-A179-82183ABBD291}" type="presOf" srcId="{0B699787-534F-45FE-AB75-AFA0F29A2EEE}" destId="{6D554565-742B-4756-BFA8-28E409FD4972}" srcOrd="0" destOrd="1" presId="urn:microsoft.com/office/officeart/2005/8/layout/hProcess4"/>
-    <dgm:cxn modelId="{78F53DC9-BCFF-424B-B0F8-2AA61768E457}" srcId="{C9E4D9AC-E7BF-422E-B79A-BC81E5EBE4FA}" destId="{820D3869-0D8C-4E25-99E8-45CDF5D9BDEC}" srcOrd="1" destOrd="0" parTransId="{AF3815AA-20F7-471F-8F0E-A567D5AE3F6A}" sibTransId="{A8A6BD53-FD6B-482E-AD11-D72DFE995F15}"/>
-    <dgm:cxn modelId="{3ACF03F8-014F-4F7F-9EF1-CD05FDA996A4}" type="presOf" srcId="{820D3869-0D8C-4E25-99E8-45CDF5D9BDEC}" destId="{9F21655B-70FD-4D96-BE75-E18CDDCF19A5}" srcOrd="1" destOrd="1" presId="urn:microsoft.com/office/officeart/2005/8/layout/hProcess4"/>
-    <dgm:cxn modelId="{1D90C970-76E6-464D-9A6B-F02E8680783B}" type="presOf" srcId="{C27A3DEC-A16C-4C08-B047-E07D53AB393E}" destId="{6D554565-742B-4756-BFA8-28E409FD4972}" srcOrd="0" destOrd="2" presId="urn:microsoft.com/office/officeart/2005/8/layout/hProcess4"/>
+    <dgm:cxn modelId="{3BBC2205-C1AC-42F2-B1F4-6008EF332DC4}" type="presOf" srcId="{72692382-1636-4044-A508-C226E4CDD7FB}" destId="{6CAFE6CA-DF3A-4E7A-9A54-77A9CBCF12C6}" srcOrd="1" destOrd="3" presId="urn:microsoft.com/office/officeart/2005/8/layout/hProcess4"/>
+    <dgm:cxn modelId="{AB08A7BB-A894-43BD-ACCF-B3A898828FA0}" srcId="{89049DC1-A649-471E-866F-01C974D3754C}" destId="{7485ED6D-7763-44CB-A3A3-C5FA6F95B99B}" srcOrd="0" destOrd="0" parTransId="{376BB5C4-2748-457E-8837-3274FF96CD29}" sibTransId="{F0D39EC3-93A3-4B87-8995-7CE449898872}"/>
+    <dgm:cxn modelId="{050AD0EE-F313-432C-B0D0-744C1799C0B5}" type="presOf" srcId="{820D3869-0D8C-4E25-99E8-45CDF5D9BDEC}" destId="{DB377DA4-71DA-4792-9A7A-CE5D0599E62D}" srcOrd="0" destOrd="1" presId="urn:microsoft.com/office/officeart/2005/8/layout/hProcess4"/>
+    <dgm:cxn modelId="{B2EE4E51-AC77-4A9B-87FE-BEA54F74DF43}" type="presOf" srcId="{0482B99A-3D3A-40CB-A03C-FA1E24B1AD44}" destId="{6D554565-742B-4756-BFA8-28E409FD4972}" srcOrd="0" destOrd="0" presId="urn:microsoft.com/office/officeart/2005/8/layout/hProcess4"/>
+    <dgm:cxn modelId="{202E0845-661A-4CF0-BF28-E37CD21861B2}" type="presOf" srcId="{0482B99A-3D3A-40CB-A03C-FA1E24B1AD44}" destId="{6CAFE6CA-DF3A-4E7A-9A54-77A9CBCF12C6}" srcOrd="1" destOrd="0" presId="urn:microsoft.com/office/officeart/2005/8/layout/hProcess4"/>
+    <dgm:cxn modelId="{9AFC54FE-93FF-4E47-BD0C-8F092E2DB078}" srcId="{7485ED6D-7763-44CB-A3A3-C5FA6F95B99B}" destId="{0B699787-534F-45FE-AB75-AFA0F29A2EEE}" srcOrd="1" destOrd="0" parTransId="{2D932C45-F37C-4FE2-8279-913BB277E31B}" sibTransId="{ACD84AB4-0CFE-458A-8BA2-FA7A84B77986}"/>
+    <dgm:cxn modelId="{7B73F7D5-0E6A-4A93-A669-CD6C70233CE7}" srcId="{C9E4D9AC-E7BF-422E-B79A-BC81E5EBE4FA}" destId="{2AB7BB3F-DCBC-41B6-8039-31AECBBBDAA6}" srcOrd="0" destOrd="0" parTransId="{58B10716-B440-4454-976E-75328D6F499B}" sibTransId="{7F9CF021-BFC8-4F2A-A9C8-CC1FEA3B284D}"/>
     <dgm:cxn modelId="{5765A9E7-C6D6-4D1A-A339-BB631D9BDFE0}" srcId="{7485ED6D-7763-44CB-A3A3-C5FA6F95B99B}" destId="{72692382-1636-4044-A508-C226E4CDD7FB}" srcOrd="3" destOrd="0" parTransId="{7B4EF995-9076-436A-A661-4E7DA046FB59}" sibTransId="{02FAD600-C714-4207-9333-CBA78E6F1995}"/>
-    <dgm:cxn modelId="{0F6BA46E-36DD-48E5-A942-E06227569E01}" type="presOf" srcId="{ADF6D1EA-BCCE-4618-850A-FF121CE8CC37}" destId="{74ACF545-5F10-4867-B2C9-AD98709609C0}" srcOrd="0" destOrd="0" presId="urn:microsoft.com/office/officeart/2005/8/layout/hProcess4"/>
-    <dgm:cxn modelId="{9AFC54FE-93FF-4E47-BD0C-8F092E2DB078}" srcId="{7485ED6D-7763-44CB-A3A3-C5FA6F95B99B}" destId="{0B699787-534F-45FE-AB75-AFA0F29A2EEE}" srcOrd="1" destOrd="0" parTransId="{2D932C45-F37C-4FE2-8279-913BB277E31B}" sibTransId="{ACD84AB4-0CFE-458A-8BA2-FA7A84B77986}"/>
-    <dgm:cxn modelId="{3D548A06-17B6-41B4-8D1F-EDBE6F4E02B7}" type="presOf" srcId="{72692382-1636-4044-A508-C226E4CDD7FB}" destId="{6D554565-742B-4756-BFA8-28E409FD4972}" srcOrd="0" destOrd="3" presId="urn:microsoft.com/office/officeart/2005/8/layout/hProcess4"/>
-    <dgm:cxn modelId="{F7229B2C-DE2D-4B77-A03E-A9CB0643053F}" type="presOf" srcId="{B16E2BDC-DC51-46BA-A2EB-96A666024A48}" destId="{9F21655B-70FD-4D96-BE75-E18CDDCF19A5}" srcOrd="1" destOrd="2" presId="urn:microsoft.com/office/officeart/2005/8/layout/hProcess4"/>
-    <dgm:cxn modelId="{BC19FE70-069D-4C86-A67E-BD06D3592E1F}" srcId="{C9E4D9AC-E7BF-422E-B79A-BC81E5EBE4FA}" destId="{B16E2BDC-DC51-46BA-A2EB-96A666024A48}" srcOrd="2" destOrd="0" parTransId="{16BDA239-DFA3-48C9-B653-F0954C0B879B}" sibTransId="{87F29D28-C4D2-47D9-BDEE-001A70ADB091}"/>
-    <dgm:cxn modelId="{DA7A213F-327A-45BE-9D68-5D89D22CCD6B}" type="presOf" srcId="{0B699787-534F-45FE-AB75-AFA0F29A2EEE}" destId="{6CAFE6CA-DF3A-4E7A-9A54-77A9CBCF12C6}" srcOrd="1" destOrd="1" presId="urn:microsoft.com/office/officeart/2005/8/layout/hProcess4"/>
-    <dgm:cxn modelId="{7C3B8B7D-F77C-46AD-9B7A-D8BFA9A713FB}" srcId="{7485ED6D-7763-44CB-A3A3-C5FA6F95B99B}" destId="{0482B99A-3D3A-40CB-A03C-FA1E24B1AD44}" srcOrd="0" destOrd="0" parTransId="{AF6B76E8-ACF1-4816-888C-788E722CE7BC}" sibTransId="{0AD17C91-E002-4A34-9BB7-768D8A62D717}"/>
-    <dgm:cxn modelId="{9E8136F3-5D97-48DF-A124-75A3A1583D61}" type="presOf" srcId="{C9E4D9AC-E7BF-422E-B79A-BC81E5EBE4FA}" destId="{E4EEEADF-9BED-477D-94B3-F1F28FAE75AE}" srcOrd="0" destOrd="0" presId="urn:microsoft.com/office/officeart/2005/8/layout/hProcess4"/>
-    <dgm:cxn modelId="{7B73F7D5-0E6A-4A93-A669-CD6C70233CE7}" srcId="{C9E4D9AC-E7BF-422E-B79A-BC81E5EBE4FA}" destId="{2AB7BB3F-DCBC-41B6-8039-31AECBBBDAA6}" srcOrd="0" destOrd="0" parTransId="{58B10716-B440-4454-976E-75328D6F499B}" sibTransId="{7F9CF021-BFC8-4F2A-A9C8-CC1FEA3B284D}"/>
-    <dgm:cxn modelId="{38096D8B-E4E0-426A-94C4-7108D5F76A0D}" type="presOf" srcId="{F0D39EC3-93A3-4B87-8995-7CE449898872}" destId="{9420C313-967D-47FD-9D26-66DC561F491A}" srcOrd="0" destOrd="0" presId="urn:microsoft.com/office/officeart/2005/8/layout/hProcess4"/>
-    <dgm:cxn modelId="{B2EE4E51-AC77-4A9B-87FE-BEA54F74DF43}" type="presOf" srcId="{0482B99A-3D3A-40CB-A03C-FA1E24B1AD44}" destId="{6D554565-742B-4756-BFA8-28E409FD4972}" srcOrd="0" destOrd="0" presId="urn:microsoft.com/office/officeart/2005/8/layout/hProcess4"/>
-    <dgm:cxn modelId="{FD82E558-C7A7-4DCD-89B5-8B38C8BD70BE}" type="presOf" srcId="{68F35897-53F3-4C67-B7FB-9BB04DB9668C}" destId="{84E39F03-D8D6-49D9-A31A-E92025C829D9}" srcOrd="0" destOrd="0" presId="urn:microsoft.com/office/officeart/2005/8/layout/hProcess4"/>
-    <dgm:cxn modelId="{D7F05B96-C766-44EA-9AE3-1D6EBCFA7E6B}" type="presOf" srcId="{7485ED6D-7763-44CB-A3A3-C5FA6F95B99B}" destId="{E851F0C7-646D-495D-8281-E4D054BA7C6C}" srcOrd="0" destOrd="0" presId="urn:microsoft.com/office/officeart/2005/8/layout/hProcess4"/>
-    <dgm:cxn modelId="{0E5A17E5-1EE2-4500-AB15-31F3BA901657}" type="presOf" srcId="{89049DC1-A649-471E-866F-01C974D3754C}" destId="{59202DAD-34A5-4F1F-9FFC-30AC15EC3534}" srcOrd="0" destOrd="0" presId="urn:microsoft.com/office/officeart/2005/8/layout/hProcess4"/>
-    <dgm:cxn modelId="{AB08A7BB-A894-43BD-ACCF-B3A898828FA0}" srcId="{89049DC1-A649-471E-866F-01C974D3754C}" destId="{7485ED6D-7763-44CB-A3A3-C5FA6F95B99B}" srcOrd="0" destOrd="0" parTransId="{376BB5C4-2748-457E-8837-3274FF96CD29}" sibTransId="{F0D39EC3-93A3-4B87-8995-7CE449898872}"/>
-    <dgm:cxn modelId="{3BBC2205-C1AC-42F2-B1F4-6008EF332DC4}" type="presOf" srcId="{72692382-1636-4044-A508-C226E4CDD7FB}" destId="{6CAFE6CA-DF3A-4E7A-9A54-77A9CBCF12C6}" srcOrd="1" destOrd="3" presId="urn:microsoft.com/office/officeart/2005/8/layout/hProcess4"/>
-    <dgm:cxn modelId="{4A4E2597-84CC-473C-8540-F958A4A0A4BC}" type="presOf" srcId="{8BDA44EB-A524-49BA-81C9-8B53E0926F00}" destId="{BD54F51C-23F4-4B8C-A1D1-797BE2CF018B}" srcOrd="0" destOrd="0" presId="urn:microsoft.com/office/officeart/2005/8/layout/hProcess4"/>
-    <dgm:cxn modelId="{FB683E4F-C9BE-4521-974A-06797DBC9DBC}" type="presOf" srcId="{CA1247BC-A486-4F22-9783-7C8ADFE2481F}" destId="{B9C8E1F6-53F1-46F8-A169-158621352E82}" srcOrd="0" destOrd="0" presId="urn:microsoft.com/office/officeart/2005/8/layout/hProcess4"/>
-    <dgm:cxn modelId="{1CB27949-B576-483D-96ED-D505D967F2B2}" type="presOf" srcId="{2AB7BB3F-DCBC-41B6-8039-31AECBBBDAA6}" destId="{DB377DA4-71DA-4792-9A7A-CE5D0599E62D}" srcOrd="0" destOrd="0" presId="urn:microsoft.com/office/officeart/2005/8/layout/hProcess4"/>
-    <dgm:cxn modelId="{A07EE1C0-0BB3-4CC4-92B6-E08723040321}" type="presOf" srcId="{B16E2BDC-DC51-46BA-A2EB-96A666024A48}" destId="{DB377DA4-71DA-4792-9A7A-CE5D0599E62D}" srcOrd="0" destOrd="2" presId="urn:microsoft.com/office/officeart/2005/8/layout/hProcess4"/>
-    <dgm:cxn modelId="{202E0845-661A-4CF0-BF28-E37CD21861B2}" type="presOf" srcId="{0482B99A-3D3A-40CB-A03C-FA1E24B1AD44}" destId="{6CAFE6CA-DF3A-4E7A-9A54-77A9CBCF12C6}" srcOrd="1" destOrd="0" presId="urn:microsoft.com/office/officeart/2005/8/layout/hProcess4"/>
-    <dgm:cxn modelId="{7107D3A7-B00B-41F5-A9E0-2AF0C88C0C7D}" srcId="{89049DC1-A649-471E-866F-01C974D3754C}" destId="{C9E4D9AC-E7BF-422E-B79A-BC81E5EBE4FA}" srcOrd="1" destOrd="0" parTransId="{10714588-CB09-4D4A-9671-0BCD3087FB11}" sibTransId="{8BDA44EB-A524-49BA-81C9-8B53E0926F00}"/>
-    <dgm:cxn modelId="{050AD0EE-F313-432C-B0D0-744C1799C0B5}" type="presOf" srcId="{820D3869-0D8C-4E25-99E8-45CDF5D9BDEC}" destId="{DB377DA4-71DA-4792-9A7A-CE5D0599E62D}" srcOrd="0" destOrd="1" presId="urn:microsoft.com/office/officeart/2005/8/layout/hProcess4"/>
     <dgm:cxn modelId="{C08C236C-DF8A-4F10-80A6-34D97783679B}" type="presParOf" srcId="{59202DAD-34A5-4F1F-9FFC-30AC15EC3534}" destId="{C7167B5F-EB14-4567-AB92-789F7895CBFB}" srcOrd="0" destOrd="0" presId="urn:microsoft.com/office/officeart/2005/8/layout/hProcess4"/>
     <dgm:cxn modelId="{963BA747-781E-4352-9F62-274A8BE33EA6}" type="presParOf" srcId="{59202DAD-34A5-4F1F-9FFC-30AC15EC3534}" destId="{65EFC4C8-F9EE-4155-8B79-2270EA84D3BD}" srcOrd="1" destOrd="0" presId="urn:microsoft.com/office/officeart/2005/8/layout/hProcess4"/>
     <dgm:cxn modelId="{F8B2B43B-5EEF-42ED-BDE5-AE3356C02713}" type="presParOf" srcId="{59202DAD-34A5-4F1F-9FFC-30AC15EC3534}" destId="{34D70F95-628F-4327-802F-3B75E2365BBA}" srcOrd="2" destOrd="0" presId="urn:microsoft.com/office/officeart/2005/8/layout/hProcess4"/>
@@ -2648,6 +3394,161 @@
     <dgm:cxn modelId="{170496BE-9644-4B4C-AC08-BCF3B5B93B4D}" type="presParOf" srcId="{B130FA0F-4E12-4316-81D9-62EE394D13E4}" destId="{CAB8352A-47F0-4D31-B425-94C6E0532A97}" srcOrd="2" destOrd="0" presId="urn:microsoft.com/office/officeart/2005/8/layout/hProcess4"/>
     <dgm:cxn modelId="{A9621AA6-FCA7-4046-B6E3-5FDF2A246E74}" type="presParOf" srcId="{B130FA0F-4E12-4316-81D9-62EE394D13E4}" destId="{74ACF545-5F10-4867-B2C9-AD98709609C0}" srcOrd="3" destOrd="0" presId="urn:microsoft.com/office/officeart/2005/8/layout/hProcess4"/>
     <dgm:cxn modelId="{6447DC4D-F1AB-4F5D-B1F2-F7D8F1C7C9FB}" type="presParOf" srcId="{B130FA0F-4E12-4316-81D9-62EE394D13E4}" destId="{ECD5955E-5405-4D05-837A-643C9E8B8B80}" srcOrd="4" destOrd="0" presId="urn:microsoft.com/office/officeart/2005/8/layout/hProcess4"/>
+  </dgm:cxnLst>
+  <dgm:bg/>
+  <dgm:whole/>
+  <dgm:extLst>
+    <a:ext uri="http://schemas.microsoft.com/office/drawing/2008/diagram">
+      <dsp:dataModelExt xmlns:dsp="http://schemas.microsoft.com/office/drawing/2008/diagram" relId="rId6" minVer="http://schemas.openxmlformats.org/drawingml/2006/diagram"/>
+    </a:ext>
+  </dgm:extLst>
+</dgm:dataModel>
+</file>
+
+<file path=ppt/diagrams/data3.xml><?xml version="1.0" encoding="utf-8"?>
+<dgm:dataModel xmlns:dgm="http://schemas.openxmlformats.org/drawingml/2006/diagram" xmlns:a="http://schemas.openxmlformats.org/drawingml/2006/main">
+  <dgm:ptLst>
+    <dgm:pt modelId="{9E6AFE4F-E5DA-40B6-A318-54F1406DEB2F}" type="doc">
+      <dgm:prSet loTypeId="urn:microsoft.com/office/officeart/2005/8/layout/funnel1" loCatId="relationship" qsTypeId="urn:microsoft.com/office/officeart/2005/8/quickstyle/simple1" qsCatId="simple" csTypeId="urn:microsoft.com/office/officeart/2005/8/colors/accent1_2" csCatId="accent1" phldr="1"/>
+      <dgm:spPr/>
+      <dgm:t>
+        <a:bodyPr/>
+        <a:lstStyle/>
+        <a:p>
+          <a:endParaRPr lang="pt-BR"/>
+        </a:p>
+      </dgm:t>
+    </dgm:pt>
+    <dgm:pt modelId="{DAC37F6D-D856-4B12-ADB5-761FAB6D8A80}">
+      <dgm:prSet phldrT="[Texto]"/>
+      <dgm:spPr/>
+      <dgm:t>
+        <a:bodyPr/>
+        <a:lstStyle/>
+        <a:p>
+          <a:r>
+            <a:rPr lang="pt-BR" dirty="0" smtClean="0"/>
+            <a:t>Objeto</a:t>
+          </a:r>
+          <a:endParaRPr lang="pt-BR" dirty="0"/>
+        </a:p>
+      </dgm:t>
+    </dgm:pt>
+    <dgm:pt modelId="{1DF33100-4AEE-4A3F-9FA5-D8888BCE8170}" type="parTrans" cxnId="{50A8987D-F00A-4786-8A45-060B6F8E1E7B}">
+      <dgm:prSet/>
+      <dgm:spPr/>
+      <dgm:t>
+        <a:bodyPr/>
+        <a:lstStyle/>
+        <a:p>
+          <a:endParaRPr lang="pt-BR"/>
+        </a:p>
+      </dgm:t>
+    </dgm:pt>
+    <dgm:pt modelId="{D4C81D4E-238C-4442-AA00-9C54DEB67BB3}" type="sibTrans" cxnId="{50A8987D-F00A-4786-8A45-060B6F8E1E7B}">
+      <dgm:prSet/>
+      <dgm:spPr/>
+      <dgm:t>
+        <a:bodyPr/>
+        <a:lstStyle/>
+        <a:p>
+          <a:endParaRPr lang="pt-BR"/>
+        </a:p>
+      </dgm:t>
+    </dgm:pt>
+    <dgm:pt modelId="{7203FA11-A6CA-46DE-AC72-6C625BCAFED6}">
+      <dgm:prSet phldrT="[Texto]"/>
+      <dgm:spPr/>
+      <dgm:t>
+        <a:bodyPr/>
+        <a:lstStyle/>
+        <a:p>
+          <a:r>
+            <a:rPr lang="pt-BR" dirty="0" smtClean="0"/>
+            <a:t>Semântica em C</a:t>
+          </a:r>
+          <a:endParaRPr lang="pt-BR" dirty="0"/>
+        </a:p>
+      </dgm:t>
+    </dgm:pt>
+    <dgm:pt modelId="{F120B6AB-DAF8-41A5-A04A-3F4557C482F8}" type="parTrans" cxnId="{FEE06F07-7F9A-4B98-9B9A-A8A00C2CFBA1}">
+      <dgm:prSet/>
+      <dgm:spPr/>
+      <dgm:t>
+        <a:bodyPr/>
+        <a:lstStyle/>
+        <a:p>
+          <a:endParaRPr lang="pt-BR"/>
+        </a:p>
+      </dgm:t>
+    </dgm:pt>
+    <dgm:pt modelId="{6D03AF59-4D89-45BF-8BF3-273E62F68F8C}" type="sibTrans" cxnId="{FEE06F07-7F9A-4B98-9B9A-A8A00C2CFBA1}">
+      <dgm:prSet/>
+      <dgm:spPr/>
+      <dgm:t>
+        <a:bodyPr/>
+        <a:lstStyle/>
+        <a:p>
+          <a:endParaRPr lang="pt-BR"/>
+        </a:p>
+      </dgm:t>
+    </dgm:pt>
+    <dgm:pt modelId="{44300453-3E76-4E92-887A-17B98159C458}" type="pres">
+      <dgm:prSet presAssocID="{9E6AFE4F-E5DA-40B6-A318-54F1406DEB2F}" presName="Name0" presStyleCnt="0">
+        <dgm:presLayoutVars>
+          <dgm:chMax val="4"/>
+          <dgm:resizeHandles val="exact"/>
+        </dgm:presLayoutVars>
+      </dgm:prSet>
+      <dgm:spPr/>
+    </dgm:pt>
+    <dgm:pt modelId="{F27275B8-382F-47B8-B65E-9F923B2D0057}" type="pres">
+      <dgm:prSet presAssocID="{9E6AFE4F-E5DA-40B6-A318-54F1406DEB2F}" presName="ellipse" presStyleLbl="trBgShp" presStyleIdx="0" presStyleCnt="1"/>
+      <dgm:spPr/>
+    </dgm:pt>
+    <dgm:pt modelId="{C66DEAF4-A9F6-4B99-A0F2-8B43C1E6E87F}" type="pres">
+      <dgm:prSet presAssocID="{9E6AFE4F-E5DA-40B6-A318-54F1406DEB2F}" presName="arrow1" presStyleLbl="fgShp" presStyleIdx="0" presStyleCnt="1"/>
+      <dgm:spPr/>
+    </dgm:pt>
+    <dgm:pt modelId="{F89BFA3D-63D7-4505-A710-30F66CF8C562}" type="pres">
+      <dgm:prSet presAssocID="{9E6AFE4F-E5DA-40B6-A318-54F1406DEB2F}" presName="rectangle" presStyleLbl="revTx" presStyleIdx="0" presStyleCnt="1">
+        <dgm:presLayoutVars>
+          <dgm:bulletEnabled val="1"/>
+        </dgm:presLayoutVars>
+      </dgm:prSet>
+      <dgm:spPr/>
+      <dgm:t>
+        <a:bodyPr/>
+        <a:lstStyle/>
+        <a:p>
+          <a:endParaRPr lang="pt-BR"/>
+        </a:p>
+      </dgm:t>
+    </dgm:pt>
+    <dgm:pt modelId="{668B6CFA-1EFA-44FF-9497-16D0B8C66679}" type="pres">
+      <dgm:prSet presAssocID="{7203FA11-A6CA-46DE-AC72-6C625BCAFED6}" presName="item1" presStyleLbl="node1" presStyleIdx="0" presStyleCnt="1" custLinFactNeighborX="5309" custLinFactNeighborY="-4515">
+        <dgm:presLayoutVars>
+          <dgm:bulletEnabled val="1"/>
+        </dgm:presLayoutVars>
+      </dgm:prSet>
+      <dgm:spPr/>
+    </dgm:pt>
+    <dgm:pt modelId="{4E3C57FC-02C5-4754-9730-87F975BB461B}" type="pres">
+      <dgm:prSet presAssocID="{9E6AFE4F-E5DA-40B6-A318-54F1406DEB2F}" presName="funnel" presStyleLbl="trAlignAcc1" presStyleIdx="0" presStyleCnt="1"/>
+      <dgm:spPr/>
+    </dgm:pt>
+  </dgm:ptLst>
+  <dgm:cxnLst>
+    <dgm:cxn modelId="{C0DAF3AB-2271-44EE-8801-F6ED7FD4C0A8}" type="presOf" srcId="{DAC37F6D-D856-4B12-ADB5-761FAB6D8A80}" destId="{668B6CFA-1EFA-44FF-9497-16D0B8C66679}" srcOrd="0" destOrd="0" presId="urn:microsoft.com/office/officeart/2005/8/layout/funnel1"/>
+    <dgm:cxn modelId="{FEE06F07-7F9A-4B98-9B9A-A8A00C2CFBA1}" srcId="{9E6AFE4F-E5DA-40B6-A318-54F1406DEB2F}" destId="{7203FA11-A6CA-46DE-AC72-6C625BCAFED6}" srcOrd="1" destOrd="0" parTransId="{F120B6AB-DAF8-41A5-A04A-3F4557C482F8}" sibTransId="{6D03AF59-4D89-45BF-8BF3-273E62F68F8C}"/>
+    <dgm:cxn modelId="{50A8987D-F00A-4786-8A45-060B6F8E1E7B}" srcId="{9E6AFE4F-E5DA-40B6-A318-54F1406DEB2F}" destId="{DAC37F6D-D856-4B12-ADB5-761FAB6D8A80}" srcOrd="0" destOrd="0" parTransId="{1DF33100-4AEE-4A3F-9FA5-D8888BCE8170}" sibTransId="{D4C81D4E-238C-4442-AA00-9C54DEB67BB3}"/>
+    <dgm:cxn modelId="{CC39D624-F183-4919-8093-BF2F93ED88A4}" type="presOf" srcId="{7203FA11-A6CA-46DE-AC72-6C625BCAFED6}" destId="{F89BFA3D-63D7-4505-A710-30F66CF8C562}" srcOrd="0" destOrd="0" presId="urn:microsoft.com/office/officeart/2005/8/layout/funnel1"/>
+    <dgm:cxn modelId="{BAADE10C-1022-45F7-A43A-132AC3FD8F7A}" type="presOf" srcId="{9E6AFE4F-E5DA-40B6-A318-54F1406DEB2F}" destId="{44300453-3E76-4E92-887A-17B98159C458}" srcOrd="0" destOrd="0" presId="urn:microsoft.com/office/officeart/2005/8/layout/funnel1"/>
+    <dgm:cxn modelId="{35A10188-4C72-4012-A523-EB5F93856E19}" type="presParOf" srcId="{44300453-3E76-4E92-887A-17B98159C458}" destId="{F27275B8-382F-47B8-B65E-9F923B2D0057}" srcOrd="0" destOrd="0" presId="urn:microsoft.com/office/officeart/2005/8/layout/funnel1"/>
+    <dgm:cxn modelId="{D0A9929B-5C4D-437D-808C-284423925635}" type="presParOf" srcId="{44300453-3E76-4E92-887A-17B98159C458}" destId="{C66DEAF4-A9F6-4B99-A0F2-8B43C1E6E87F}" srcOrd="1" destOrd="0" presId="urn:microsoft.com/office/officeart/2005/8/layout/funnel1"/>
+    <dgm:cxn modelId="{27DF1999-BD62-4475-8116-BF1092A8A476}" type="presParOf" srcId="{44300453-3E76-4E92-887A-17B98159C458}" destId="{F89BFA3D-63D7-4505-A710-30F66CF8C562}" srcOrd="2" destOrd="0" presId="urn:microsoft.com/office/officeart/2005/8/layout/funnel1"/>
+    <dgm:cxn modelId="{48B3F07D-3026-4A63-ABE7-FDCB0F348D41}" type="presParOf" srcId="{44300453-3E76-4E92-887A-17B98159C458}" destId="{668B6CFA-1EFA-44FF-9497-16D0B8C66679}" srcOrd="3" destOrd="0" presId="urn:microsoft.com/office/officeart/2005/8/layout/funnel1"/>
+    <dgm:cxn modelId="{ED8B2C43-6B1C-4A30-A903-B4200C66C69B}" type="presParOf" srcId="{44300453-3E76-4E92-887A-17B98159C458}" destId="{4E3C57FC-02C5-4754-9730-87F975BB461B}" srcOrd="4" destOrd="0" presId="urn:microsoft.com/office/officeart/2005/8/layout/funnel1"/>
   </dgm:cxnLst>
   <dgm:bg/>
   <dgm:whole/>
@@ -3089,7 +3990,7 @@
         <a:fontRef idx="minor"/>
       </dsp:style>
       <dsp:txBody>
-        <a:bodyPr spcFirstLastPara="0" vert="horz" wrap="square" lIns="32385" tIns="32385" rIns="32385" bIns="32385" numCol="1" spcCol="1270" anchor="t" anchorCtr="0">
+        <a:bodyPr spcFirstLastPara="0" vert="horz" wrap="square" lIns="36195" tIns="36195" rIns="36195" bIns="36195" numCol="1" spcCol="1270" anchor="t" anchorCtr="0">
           <a:noAutofit/>
         </a:bodyPr>
         <a:lstStyle/>
@@ -3182,16 +4083,16 @@
       </dsp:nvSpPr>
       <dsp:spPr>
         <a:xfrm rot="1028162">
-          <a:off x="922380" y="2544949"/>
-          <a:ext cx="1983884" cy="1983884"/>
+          <a:off x="381029" y="2802356"/>
+          <a:ext cx="2529840" cy="2529840"/>
         </a:xfrm>
         <a:prstGeom prst="leftCircularArrow">
           <a:avLst>
-            <a:gd name="adj1" fmla="val 2688"/>
-            <a:gd name="adj2" fmla="val 327196"/>
-            <a:gd name="adj3" fmla="val 1013583"/>
-            <a:gd name="adj4" fmla="val 7935365"/>
-            <a:gd name="adj5" fmla="val 3136"/>
+            <a:gd name="adj1" fmla="val 2108"/>
+            <a:gd name="adj2" fmla="val 253167"/>
+            <a:gd name="adj3" fmla="val 21068898"/>
+            <a:gd name="adj4" fmla="val 6464709"/>
+            <a:gd name="adj5" fmla="val 2459"/>
           </a:avLst>
         </a:prstGeom>
         <a:solidFill>
@@ -3230,7 +4131,7 @@
       </dsp:nvSpPr>
       <dsp:spPr>
         <a:xfrm>
-          <a:off x="553886" y="3360507"/>
+          <a:off x="553886" y="4277090"/>
           <a:ext cx="1523474" cy="605835"/>
         </a:xfrm>
         <a:prstGeom prst="roundRect">
@@ -3292,7 +4193,7 @@
         </a:p>
       </dsp:txBody>
       <dsp:txXfrm>
-        <a:off x="571630" y="3378251"/>
+        <a:off x="571630" y="4294834"/>
         <a:ext cx="1487986" cy="570347"/>
       </dsp:txXfrm>
     </dsp:sp>
@@ -3346,12 +4247,12 @@
         <a:fontRef idx="minor"/>
       </dsp:style>
       <dsp:txBody>
-        <a:bodyPr spcFirstLastPara="0" vert="horz" wrap="square" lIns="32385" tIns="32385" rIns="32385" bIns="32385" numCol="1" spcCol="1270" anchor="t" anchorCtr="0">
+        <a:bodyPr spcFirstLastPara="0" vert="horz" wrap="square" lIns="36195" tIns="36195" rIns="36195" bIns="36195" numCol="1" spcCol="1270" anchor="t" anchorCtr="0">
           <a:noAutofit/>
         </a:bodyPr>
         <a:lstStyle/>
         <a:p>
-          <a:pPr marL="171450" lvl="1" indent="-171450" algn="l" defTabSz="755650">
+          <a:pPr marL="171450" lvl="1" indent="-171450" algn="l" defTabSz="844550">
             <a:lnSpc>
               <a:spcPct val="90000"/>
             </a:lnSpc>
@@ -3364,13 +4265,13 @@
             <a:buChar char="••"/>
           </a:pPr>
           <a:r>
-            <a:rPr lang="pt-BR" sz="1700" kern="1200" dirty="0" smtClean="0"/>
+            <a:rPr lang="pt-BR" sz="1900" kern="1200" dirty="0" smtClean="0"/>
             <a:t>Estudo do problema do projeto</a:t>
           </a:r>
-          <a:endParaRPr lang="pt-BR" sz="1700" kern="1200" dirty="0"/>
+          <a:endParaRPr lang="pt-BR" sz="1900" kern="1200" dirty="0"/>
         </a:p>
         <a:p>
-          <a:pPr marL="171450" lvl="1" indent="-171450" algn="l" defTabSz="755650">
+          <a:pPr marL="171450" lvl="1" indent="-171450" algn="l" defTabSz="844550">
             <a:lnSpc>
               <a:spcPct val="90000"/>
             </a:lnSpc>
@@ -3383,13 +4284,13 @@
             <a:buChar char="••"/>
           </a:pPr>
           <a:r>
-            <a:rPr lang="pt-BR" sz="1700" kern="1200" dirty="0" smtClean="0"/>
+            <a:rPr lang="pt-BR" sz="1900" kern="1200" dirty="0" smtClean="0"/>
             <a:t>Definição de expressões regulares</a:t>
           </a:r>
-          <a:endParaRPr lang="pt-BR" sz="1700" kern="1200" dirty="0"/>
+          <a:endParaRPr lang="pt-BR" sz="1900" kern="1200" dirty="0"/>
         </a:p>
         <a:p>
-          <a:pPr marL="171450" lvl="1" indent="-171450" algn="l" defTabSz="755650">
+          <a:pPr marL="171450" lvl="1" indent="-171450" algn="l" defTabSz="844550">
             <a:lnSpc>
               <a:spcPct val="90000"/>
             </a:lnSpc>
@@ -3402,10 +4303,10 @@
             <a:buChar char="••"/>
           </a:pPr>
           <a:r>
-            <a:rPr lang="pt-BR" sz="1700" kern="1200" dirty="0" smtClean="0"/>
-            <a:t>Detalhamento do escopo</a:t>
+            <a:rPr lang="pt-BR" sz="1900" kern="1200" dirty="0" smtClean="0"/>
+            <a:t>Token</a:t>
           </a:r>
-          <a:endParaRPr lang="pt-BR" sz="1700" kern="1200" dirty="0"/>
+          <a:endParaRPr lang="pt-BR" sz="1900" kern="1200" dirty="0"/>
         </a:p>
       </dsp:txBody>
       <dsp:txXfrm>
@@ -3420,16 +4321,16 @@
       </dsp:nvSpPr>
       <dsp:spPr>
         <a:xfrm rot="20207699">
-          <a:off x="2999674" y="354021"/>
-          <a:ext cx="2254996" cy="2254996"/>
+          <a:off x="2638785" y="-133167"/>
+          <a:ext cx="2634763" cy="2634763"/>
         </a:xfrm>
         <a:prstGeom prst="circularArrow">
           <a:avLst>
-            <a:gd name="adj1" fmla="val 2365"/>
-            <a:gd name="adj2" fmla="val 285708"/>
-            <a:gd name="adj3" fmla="val 21123647"/>
-            <a:gd name="adj4" fmla="val 14160377"/>
-            <a:gd name="adj5" fmla="val 2759"/>
+            <a:gd name="adj1" fmla="val 2024"/>
+            <a:gd name="adj2" fmla="val 242619"/>
+            <a:gd name="adj3" fmla="val 410896"/>
+            <a:gd name="adj4" fmla="val 15004537"/>
+            <a:gd name="adj5" fmla="val 2361"/>
           </a:avLst>
         </a:prstGeom>
         <a:solidFill>
@@ -3468,7 +4369,7 @@
       </dsp:nvSpPr>
       <dsp:spPr>
         <a:xfrm>
-          <a:off x="2780224" y="594609"/>
+          <a:off x="2780224" y="0"/>
           <a:ext cx="1523474" cy="605835"/>
         </a:xfrm>
         <a:prstGeom prst="roundRect">
@@ -3531,7 +4432,7 @@
         </a:p>
       </dsp:txBody>
       <dsp:txXfrm>
-        <a:off x="2797968" y="612353"/>
+        <a:off x="2797968" y="17744"/>
         <a:ext cx="1487986" cy="570347"/>
       </dsp:txXfrm>
     </dsp:sp>
@@ -3592,16 +4493,16 @@
       </dsp:nvSpPr>
       <dsp:spPr>
         <a:xfrm rot="1198059">
-          <a:off x="6027003" y="2780509"/>
-          <a:ext cx="1665457" cy="1665457"/>
+          <a:off x="5588528" y="3078764"/>
+          <a:ext cx="2317141" cy="2317141"/>
         </a:xfrm>
         <a:prstGeom prst="leftCircularArrow">
           <a:avLst>
-            <a:gd name="adj1" fmla="val 3202"/>
-            <a:gd name="adj2" fmla="val 394486"/>
-            <a:gd name="adj3" fmla="val 1094599"/>
-            <a:gd name="adj4" fmla="val 7949092"/>
-            <a:gd name="adj5" fmla="val 3736"/>
+            <a:gd name="adj1" fmla="val 2301"/>
+            <a:gd name="adj2" fmla="val 277639"/>
+            <a:gd name="adj3" fmla="val 20776385"/>
+            <a:gd name="adj4" fmla="val 6147725"/>
+            <a:gd name="adj5" fmla="val 2685"/>
           </a:avLst>
         </a:prstGeom>
         <a:solidFill>
@@ -3640,7 +4541,7 @@
       </dsp:nvSpPr>
       <dsp:spPr>
         <a:xfrm>
-          <a:off x="5131896" y="3270356"/>
+          <a:off x="5131896" y="4277090"/>
           <a:ext cx="1523474" cy="605835"/>
         </a:xfrm>
         <a:prstGeom prst="roundRect">
@@ -3703,7 +4604,7 @@
         </a:p>
       </dsp:txBody>
       <dsp:txXfrm>
-        <a:off x="5149640" y="3288100"/>
+        <a:off x="5149640" y="4294834"/>
         <a:ext cx="1487986" cy="570347"/>
       </dsp:txXfrm>
     </dsp:sp>
@@ -3764,7 +4665,7 @@
       </dsp:nvSpPr>
       <dsp:spPr>
         <a:xfrm>
-          <a:off x="7072664" y="607488"/>
+          <a:off x="7072664" y="0"/>
           <a:ext cx="1523474" cy="605835"/>
         </a:xfrm>
         <a:prstGeom prst="roundRect">
@@ -3827,9 +4728,295 @@
         </a:p>
       </dsp:txBody>
       <dsp:txXfrm>
-        <a:off x="7090408" y="625232"/>
+        <a:off x="7090408" y="17744"/>
         <a:ext cx="1487986" cy="570347"/>
       </dsp:txXfrm>
+    </dsp:sp>
+  </dsp:spTree>
+</dsp:drawing>
+</file>
+
+<file path=ppt/diagrams/drawing3.xml><?xml version="1.0" encoding="utf-8"?>
+<dsp:drawing xmlns:dgm="http://schemas.openxmlformats.org/drawingml/2006/diagram" xmlns:dsp="http://schemas.microsoft.com/office/drawing/2008/diagram" xmlns:a="http://schemas.openxmlformats.org/drawingml/2006/main">
+  <dsp:spTree>
+    <dsp:nvGrpSpPr>
+      <dsp:cNvPr id="0" name=""/>
+      <dsp:cNvGrpSpPr/>
+    </dsp:nvGrpSpPr>
+    <dsp:grpSpPr/>
+    <dsp:sp modelId="{F27275B8-382F-47B8-B65E-9F923B2D0057}">
+      <dsp:nvSpPr>
+        <dsp:cNvPr id="0" name=""/>
+        <dsp:cNvSpPr/>
+      </dsp:nvSpPr>
+      <dsp:spPr>
+        <a:xfrm>
+          <a:off x="2728599" y="157683"/>
+          <a:ext cx="3129408" cy="1086802"/>
+        </a:xfrm>
+        <a:prstGeom prst="ellipse">
+          <a:avLst/>
+        </a:prstGeom>
+        <a:solidFill>
+          <a:schemeClr val="accent1">
+            <a:tint val="50000"/>
+            <a:alpha val="40000"/>
+            <a:hueOff val="0"/>
+            <a:satOff val="0"/>
+            <a:lumOff val="0"/>
+            <a:alphaOff val="0"/>
+          </a:schemeClr>
+        </a:solidFill>
+        <a:ln>
+          <a:noFill/>
+        </a:ln>
+        <a:effectLst/>
+      </dsp:spPr>
+      <dsp:style>
+        <a:lnRef idx="0">
+          <a:scrgbClr r="0" g="0" b="0"/>
+        </a:lnRef>
+        <a:fillRef idx="1">
+          <a:scrgbClr r="0" g="0" b="0"/>
+        </a:fillRef>
+        <a:effectRef idx="0">
+          <a:scrgbClr r="0" g="0" b="0"/>
+        </a:effectRef>
+        <a:fontRef idx="minor"/>
+      </dsp:style>
+    </dsp:sp>
+    <dsp:sp modelId="{C66DEAF4-A9F6-4B99-A0F2-8B43C1E6E87F}">
+      <dsp:nvSpPr>
+        <dsp:cNvPr id="0" name=""/>
+        <dsp:cNvSpPr/>
+      </dsp:nvSpPr>
+      <dsp:spPr>
+        <a:xfrm>
+          <a:off x="3994918" y="2818893"/>
+          <a:ext cx="606474" cy="388143"/>
+        </a:xfrm>
+        <a:prstGeom prst="downArrow">
+          <a:avLst/>
+        </a:prstGeom>
+        <a:solidFill>
+          <a:schemeClr val="accent1">
+            <a:tint val="60000"/>
+            <a:hueOff val="0"/>
+            <a:satOff val="0"/>
+            <a:lumOff val="0"/>
+            <a:alphaOff val="0"/>
+          </a:schemeClr>
+        </a:solidFill>
+        <a:ln w="19050" cap="rnd" cmpd="sng" algn="ctr">
+          <a:solidFill>
+            <a:schemeClr val="lt1">
+              <a:hueOff val="0"/>
+              <a:satOff val="0"/>
+              <a:lumOff val="0"/>
+              <a:alphaOff val="0"/>
+            </a:schemeClr>
+          </a:solidFill>
+          <a:prstDash val="solid"/>
+        </a:ln>
+        <a:effectLst/>
+      </dsp:spPr>
+      <dsp:style>
+        <a:lnRef idx="2">
+          <a:scrgbClr r="0" g="0" b="0"/>
+        </a:lnRef>
+        <a:fillRef idx="1">
+          <a:scrgbClr r="0" g="0" b="0"/>
+        </a:fillRef>
+        <a:effectRef idx="0">
+          <a:scrgbClr r="0" g="0" b="0"/>
+        </a:effectRef>
+        <a:fontRef idx="minor"/>
+      </dsp:style>
+    </dsp:sp>
+    <dsp:sp modelId="{F89BFA3D-63D7-4505-A710-30F66CF8C562}">
+      <dsp:nvSpPr>
+        <dsp:cNvPr id="0" name=""/>
+        <dsp:cNvSpPr/>
+      </dsp:nvSpPr>
+      <dsp:spPr>
+        <a:xfrm>
+          <a:off x="2842617" y="3129408"/>
+          <a:ext cx="2911077" cy="727769"/>
+        </a:xfrm>
+        <a:prstGeom prst="rect">
+          <a:avLst/>
+        </a:prstGeom>
+        <a:noFill/>
+        <a:ln>
+          <a:noFill/>
+        </a:ln>
+        <a:effectLst/>
+      </dsp:spPr>
+      <dsp:style>
+        <a:lnRef idx="0">
+          <a:scrgbClr r="0" g="0" b="0"/>
+        </a:lnRef>
+        <a:fillRef idx="0">
+          <a:scrgbClr r="0" g="0" b="0"/>
+        </a:fillRef>
+        <a:effectRef idx="0">
+          <a:scrgbClr r="0" g="0" b="0"/>
+        </a:effectRef>
+        <a:fontRef idx="minor"/>
+      </dsp:style>
+      <dsp:txBody>
+        <a:bodyPr spcFirstLastPara="0" vert="horz" wrap="square" lIns="184912" tIns="184912" rIns="184912" bIns="184912" numCol="1" spcCol="1270" anchor="ctr" anchorCtr="0">
+          <a:noAutofit/>
+        </a:bodyPr>
+        <a:lstStyle/>
+        <a:p>
+          <a:pPr lvl="0" algn="ctr" defTabSz="1155700">
+            <a:lnSpc>
+              <a:spcPct val="90000"/>
+            </a:lnSpc>
+            <a:spcBef>
+              <a:spcPct val="0"/>
+            </a:spcBef>
+            <a:spcAft>
+              <a:spcPct val="35000"/>
+            </a:spcAft>
+          </a:pPr>
+          <a:r>
+            <a:rPr lang="pt-BR" sz="2600" kern="1200" dirty="0" smtClean="0"/>
+            <a:t>Semântica em C</a:t>
+          </a:r>
+          <a:endParaRPr lang="pt-BR" sz="2600" kern="1200" dirty="0"/>
+        </a:p>
+      </dsp:txBody>
+      <dsp:txXfrm>
+        <a:off x="2842617" y="3129408"/>
+        <a:ext cx="2911077" cy="727769"/>
+      </dsp:txXfrm>
+    </dsp:sp>
+    <dsp:sp modelId="{668B6CFA-1EFA-44FF-9497-16D0B8C66679}">
+      <dsp:nvSpPr>
+        <dsp:cNvPr id="0" name=""/>
+        <dsp:cNvSpPr/>
+      </dsp:nvSpPr>
+      <dsp:spPr>
+        <a:xfrm>
+          <a:off x="3296655" y="141660"/>
+          <a:ext cx="1698128" cy="1698128"/>
+        </a:xfrm>
+        <a:prstGeom prst="ellipse">
+          <a:avLst/>
+        </a:prstGeom>
+        <a:solidFill>
+          <a:schemeClr val="accent1">
+            <a:hueOff val="0"/>
+            <a:satOff val="0"/>
+            <a:lumOff val="0"/>
+            <a:alphaOff val="0"/>
+          </a:schemeClr>
+        </a:solidFill>
+        <a:ln w="19050" cap="rnd" cmpd="sng" algn="ctr">
+          <a:solidFill>
+            <a:schemeClr val="lt1">
+              <a:hueOff val="0"/>
+              <a:satOff val="0"/>
+              <a:lumOff val="0"/>
+              <a:alphaOff val="0"/>
+            </a:schemeClr>
+          </a:solidFill>
+          <a:prstDash val="solid"/>
+        </a:ln>
+        <a:effectLst/>
+      </dsp:spPr>
+      <dsp:style>
+        <a:lnRef idx="2">
+          <a:scrgbClr r="0" g="0" b="0"/>
+        </a:lnRef>
+        <a:fillRef idx="1">
+          <a:scrgbClr r="0" g="0" b="0"/>
+        </a:fillRef>
+        <a:effectRef idx="0">
+          <a:scrgbClr r="0" g="0" b="0"/>
+        </a:effectRef>
+        <a:fontRef idx="minor">
+          <a:schemeClr val="lt1"/>
+        </a:fontRef>
+      </dsp:style>
+      <dsp:txBody>
+        <a:bodyPr spcFirstLastPara="0" vert="horz" wrap="square" lIns="35560" tIns="35560" rIns="35560" bIns="35560" numCol="1" spcCol="1270" anchor="ctr" anchorCtr="0">
+          <a:noAutofit/>
+        </a:bodyPr>
+        <a:lstStyle/>
+        <a:p>
+          <a:pPr lvl="0" algn="ctr" defTabSz="1244600">
+            <a:lnSpc>
+              <a:spcPct val="90000"/>
+            </a:lnSpc>
+            <a:spcBef>
+              <a:spcPct val="0"/>
+            </a:spcBef>
+            <a:spcAft>
+              <a:spcPct val="35000"/>
+            </a:spcAft>
+          </a:pPr>
+          <a:r>
+            <a:rPr lang="pt-BR" sz="2800" kern="1200" dirty="0" smtClean="0"/>
+            <a:t>Objeto</a:t>
+          </a:r>
+          <a:endParaRPr lang="pt-BR" sz="2800" kern="1200" dirty="0"/>
+        </a:p>
+      </dsp:txBody>
+      <dsp:txXfrm>
+        <a:off x="3545340" y="390345"/>
+        <a:ext cx="1200758" cy="1200758"/>
+      </dsp:txXfrm>
+    </dsp:sp>
+    <dsp:sp modelId="{4E3C57FC-02C5-4754-9730-87F975BB461B}">
+      <dsp:nvSpPr>
+        <dsp:cNvPr id="0" name=""/>
+        <dsp:cNvSpPr/>
+      </dsp:nvSpPr>
+      <dsp:spPr>
+        <a:xfrm>
+          <a:off x="2600027" y="24258"/>
+          <a:ext cx="3396257" cy="2717005"/>
+        </a:xfrm>
+        <a:prstGeom prst="funnel">
+          <a:avLst/>
+        </a:prstGeom>
+        <a:solidFill>
+          <a:schemeClr val="lt1">
+            <a:alpha val="40000"/>
+            <a:hueOff val="0"/>
+            <a:satOff val="0"/>
+            <a:lumOff val="0"/>
+            <a:alphaOff val="0"/>
+          </a:schemeClr>
+        </a:solidFill>
+        <a:ln w="12700" cap="rnd" cmpd="sng" algn="ctr">
+          <a:solidFill>
+            <a:schemeClr val="accent1">
+              <a:hueOff val="0"/>
+              <a:satOff val="0"/>
+              <a:lumOff val="0"/>
+              <a:alphaOff val="0"/>
+            </a:schemeClr>
+          </a:solidFill>
+          <a:prstDash val="solid"/>
+        </a:ln>
+        <a:effectLst/>
+      </dsp:spPr>
+      <dsp:style>
+        <a:lnRef idx="1">
+          <a:scrgbClr r="0" g="0" b="0"/>
+        </a:lnRef>
+        <a:fillRef idx="1">
+          <a:scrgbClr r="0" g="0" b="0"/>
+        </a:fillRef>
+        <a:effectRef idx="0">
+          <a:scrgbClr r="0" g="0" b="0"/>
+        </a:effectRef>
+        <a:fontRef idx="minor"/>
+      </dsp:style>
     </dsp:sp>
   </dsp:spTree>
 </dsp:drawing>
@@ -4525,6 +5712,324 @@
 </dgm:layoutDef>
 </file>
 
+<file path=ppt/diagrams/layout3.xml><?xml version="1.0" encoding="utf-8"?>
+<dgm:layoutDef xmlns:dgm="http://schemas.openxmlformats.org/drawingml/2006/diagram" xmlns:a="http://schemas.openxmlformats.org/drawingml/2006/main" uniqueId="urn:microsoft.com/office/officeart/2005/8/layout/funnel1">
+  <dgm:title val=""/>
+  <dgm:desc val=""/>
+  <dgm:catLst>
+    <dgm:cat type="relationship" pri="2000"/>
+    <dgm:cat type="process" pri="27000"/>
+  </dgm:catLst>
+  <dgm:sampData>
+    <dgm:dataModel>
+      <dgm:ptLst>
+        <dgm:pt modelId="0" type="doc"/>
+        <dgm:pt modelId="1">
+          <dgm:prSet phldr="1"/>
+        </dgm:pt>
+        <dgm:pt modelId="2">
+          <dgm:prSet phldr="1"/>
+        </dgm:pt>
+        <dgm:pt modelId="3">
+          <dgm:prSet phldr="1"/>
+        </dgm:pt>
+        <dgm:pt modelId="4">
+          <dgm:prSet phldr="1"/>
+        </dgm:pt>
+      </dgm:ptLst>
+      <dgm:cxnLst>
+        <dgm:cxn modelId="5" srcId="0" destId="1" srcOrd="0" destOrd="0"/>
+        <dgm:cxn modelId="6" srcId="0" destId="2" srcOrd="1" destOrd="0"/>
+        <dgm:cxn modelId="7" srcId="0" destId="3" srcOrd="2" destOrd="0"/>
+        <dgm:cxn modelId="8" srcId="0" destId="4" srcOrd="3" destOrd="0"/>
+      </dgm:cxnLst>
+      <dgm:bg/>
+      <dgm:whole/>
+    </dgm:dataModel>
+  </dgm:sampData>
+  <dgm:styleData>
+    <dgm:dataModel>
+      <dgm:ptLst>
+        <dgm:pt modelId="0" type="doc"/>
+        <dgm:pt modelId="1"/>
+        <dgm:pt modelId="2"/>
+      </dgm:ptLst>
+      <dgm:cxnLst>
+        <dgm:cxn modelId="3" srcId="0" destId="1" srcOrd="0" destOrd="0"/>
+        <dgm:cxn modelId="4" srcId="0" destId="2" srcOrd="1" destOrd="0"/>
+      </dgm:cxnLst>
+      <dgm:bg/>
+      <dgm:whole/>
+    </dgm:dataModel>
+  </dgm:styleData>
+  <dgm:clrData>
+    <dgm:dataModel>
+      <dgm:ptLst>
+        <dgm:pt modelId="0" type="doc"/>
+        <dgm:pt modelId="1"/>
+        <dgm:pt modelId="2"/>
+        <dgm:pt modelId="3"/>
+        <dgm:pt modelId="4"/>
+      </dgm:ptLst>
+      <dgm:cxnLst>
+        <dgm:cxn modelId="5" srcId="0" destId="1" srcOrd="0" destOrd="0"/>
+        <dgm:cxn modelId="6" srcId="0" destId="2" srcOrd="1" destOrd="0"/>
+        <dgm:cxn modelId="7" srcId="0" destId="3" srcOrd="2" destOrd="0"/>
+        <dgm:cxn modelId="8" srcId="0" destId="4" srcOrd="3" destOrd="0"/>
+      </dgm:cxnLst>
+      <dgm:bg/>
+      <dgm:whole/>
+    </dgm:dataModel>
+  </dgm:clrData>
+  <dgm:layoutNode name="Name0">
+    <dgm:varLst>
+      <dgm:chMax val="4"/>
+      <dgm:resizeHandles val="exact"/>
+    </dgm:varLst>
+    <dgm:alg type="composite">
+      <dgm:param type="ar" val="1.25"/>
+    </dgm:alg>
+    <dgm:shape xmlns:r="http://schemas.openxmlformats.org/officeDocument/2006/relationships" r:blip="">
+      <dgm:adjLst/>
+    </dgm:shape>
+    <dgm:presOf/>
+    <dgm:choose name="Name1">
+      <dgm:if name="Name2" axis="ch" ptType="node" func="cnt" op="equ" val="2">
+        <dgm:constrLst>
+          <dgm:constr type="w" for="ch" forName="ellipse" refType="w" fact="0.645"/>
+          <dgm:constr type="h" for="ch" forName="ellipse" refType="h" fact="0.28"/>
+          <dgm:constr type="t" for="ch" forName="ellipse" refType="w" fact="0.0275"/>
+          <dgm:constr type="l" for="ch" forName="ellipse" refType="w" fact="0.0265"/>
+          <dgm:constr type="w" for="ch" forName="arrow1" refType="w" fact="0.125"/>
+          <dgm:constr type="h" for="ch" forName="arrow1" refType="h" fact="0.1"/>
+          <dgm:constr type="t" for="ch" forName="arrow1" refType="h" fact="0.72"/>
+          <dgm:constr type="l" for="ch" forName="arrow1" refType="w" fact="0.2875"/>
+          <dgm:constr type="w" for="ch" forName="rectangle" refType="w" fact="0.6"/>
+          <dgm:constr type="h" for="ch" forName="rectangle" refType="w" refFor="ch" refForName="rectangle" fact="0.25"/>
+          <dgm:constr type="t" for="ch" forName="rectangle" refType="h" fact="0.8"/>
+          <dgm:constr type="l" for="ch" forName="rectangle" refType="w" fact="0.05"/>
+          <dgm:constr type="w" for="ch" forName="item1" refType="w" fact="0.35"/>
+          <dgm:constr type="h" for="ch" forName="item1" refType="w" fact="0.35"/>
+          <dgm:constr type="t" for="ch" forName="item1" refType="h" fact="0.05"/>
+          <dgm:constr type="l" for="ch" forName="item1" refType="w" fact="0.125"/>
+          <dgm:constr type="primFontSz" for="ch" forName="item1" op="equ" val="65"/>
+          <dgm:constr type="w" for="ch" forName="funnel" refType="w" fact="0.7"/>
+          <dgm:constr type="h" for="ch" forName="funnel" refType="h" fact="0.7"/>
+          <dgm:constr type="t" for="ch" forName="funnel"/>
+          <dgm:constr type="l" for="ch" forName="funnel"/>
+        </dgm:constrLst>
+      </dgm:if>
+      <dgm:else name="Name3">
+        <dgm:constrLst>
+          <dgm:constr type="w" for="ch" forName="ellipse" refType="w" fact="0.645"/>
+          <dgm:constr type="h" for="ch" forName="ellipse" refType="h" fact="0.28"/>
+          <dgm:constr type="t" for="ch" forName="ellipse" refType="w" fact="0.0275"/>
+          <dgm:constr type="l" for="ch" forName="ellipse" refType="w" fact="0.0265"/>
+          <dgm:constr type="w" for="ch" forName="arrow1" refType="w" fact="0.125"/>
+          <dgm:constr type="h" for="ch" forName="arrow1" refType="h" fact="0.1"/>
+          <dgm:constr type="t" for="ch" forName="arrow1" refType="h" fact="0.72"/>
+          <dgm:constr type="l" for="ch" forName="arrow1" refType="w" fact="0.2875"/>
+          <dgm:constr type="w" for="ch" forName="rectangle" refType="w" fact="0.6"/>
+          <dgm:constr type="h" for="ch" forName="rectangle" refType="w" refFor="ch" refForName="rectangle" fact="0.25"/>
+          <dgm:constr type="t" for="ch" forName="rectangle" refType="h" fact="0.8"/>
+          <dgm:constr type="l" for="ch" forName="rectangle" refType="w" fact="0.05"/>
+          <dgm:constr type="primFontSz" for="ch" forName="rectangle" val="65"/>
+          <dgm:constr type="w" for="ch" forName="item1" refType="w" fact="0.225"/>
+          <dgm:constr type="h" for="ch" forName="item1" refType="w" fact="0.225"/>
+          <dgm:constr type="t" for="ch" forName="item1" refType="h" fact="0.336"/>
+          <dgm:constr type="l" for="ch" forName="item1" refType="w" fact="0.261"/>
+          <dgm:constr type="primFontSz" for="ch" forName="item1" val="65"/>
+          <dgm:constr type="w" for="ch" forName="item2" refType="w" fact="0.225"/>
+          <dgm:constr type="h" for="ch" forName="item2" refType="w" fact="0.225"/>
+          <dgm:constr type="t" for="ch" forName="item2" refType="h" fact="0.125"/>
+          <dgm:constr type="l" for="ch" forName="item2" refType="w" fact="0.1"/>
+          <dgm:constr type="primFontSz" for="ch" forName="item2" refType="primFontSz" refFor="ch" refForName="item1" op="equ"/>
+          <dgm:constr type="w" for="ch" forName="item3" refType="w" fact="0.225"/>
+          <dgm:constr type="h" for="ch" forName="item3" refType="w" fact="0.225"/>
+          <dgm:constr type="t" for="ch" forName="item3" refType="h" fact="0.057"/>
+          <dgm:constr type="l" for="ch" forName="item3" refType="w" fact="0.33"/>
+          <dgm:constr type="primFontSz" for="ch" forName="item3" refType="primFontSz" refFor="ch" refForName="item1" op="equ"/>
+          <dgm:constr type="w" for="ch" forName="funnel" refType="w" fact="0.7"/>
+          <dgm:constr type="h" for="ch" forName="funnel" refType="h" fact="0.7"/>
+          <dgm:constr type="t" for="ch" forName="funnel"/>
+          <dgm:constr type="l" for="ch" forName="funnel"/>
+        </dgm:constrLst>
+      </dgm:else>
+    </dgm:choose>
+    <dgm:ruleLst/>
+    <dgm:choose name="Name4">
+      <dgm:if name="Name5" axis="ch" ptType="node" func="cnt" op="gte" val="1">
+        <dgm:layoutNode name="ellipse" styleLbl="trBgShp">
+          <dgm:alg type="sp"/>
+          <dgm:shape xmlns:r="http://schemas.openxmlformats.org/officeDocument/2006/relationships" type="ellipse" r:blip="">
+            <dgm:adjLst/>
+          </dgm:shape>
+          <dgm:presOf/>
+          <dgm:constrLst/>
+          <dgm:ruleLst/>
+        </dgm:layoutNode>
+        <dgm:layoutNode name="arrow1" styleLbl="fgShp">
+          <dgm:alg type="sp"/>
+          <dgm:shape xmlns:r="http://schemas.openxmlformats.org/officeDocument/2006/relationships" type="downArrow" r:blip="">
+            <dgm:adjLst/>
+          </dgm:shape>
+          <dgm:presOf/>
+          <dgm:constrLst/>
+          <dgm:ruleLst/>
+        </dgm:layoutNode>
+        <dgm:layoutNode name="rectangle" styleLbl="revTx">
+          <dgm:varLst>
+            <dgm:bulletEnabled val="1"/>
+          </dgm:varLst>
+          <dgm:alg type="tx">
+            <dgm:param type="txAnchorHorzCh" val="ctr"/>
+          </dgm:alg>
+          <dgm:shape xmlns:r="http://schemas.openxmlformats.org/officeDocument/2006/relationships" type="rect" r:blip="">
+            <dgm:adjLst/>
+          </dgm:shape>
+          <dgm:choose name="Name6">
+            <dgm:if name="Name7" axis="ch" ptType="node" func="cnt" op="equ" val="1">
+              <dgm:presOf axis="ch desOrSelf" ptType="node node" st="1 1" cnt="1 0"/>
+            </dgm:if>
+            <dgm:if name="Name8" axis="ch" ptType="node" func="cnt" op="equ" val="2">
+              <dgm:presOf axis="ch desOrSelf" ptType="node node" st="2 1" cnt="1 0"/>
+            </dgm:if>
+            <dgm:if name="Name9" axis="ch" ptType="node" func="cnt" op="equ" val="3">
+              <dgm:presOf axis="ch desOrSelf" ptType="node node" st="3 1" cnt="1 0"/>
+            </dgm:if>
+            <dgm:else name="Name10">
+              <dgm:presOf axis="ch desOrSelf" ptType="node node" st="4 1" cnt="1 0"/>
+            </dgm:else>
+          </dgm:choose>
+          <dgm:constrLst/>
+          <dgm:ruleLst>
+            <dgm:rule type="primFontSz" val="5" fact="NaN" max="NaN"/>
+          </dgm:ruleLst>
+        </dgm:layoutNode>
+        <dgm:forEach name="Name11" axis="ch" ptType="node" st="2" cnt="1">
+          <dgm:layoutNode name="item1" styleLbl="node1">
+            <dgm:varLst>
+              <dgm:bulletEnabled val="1"/>
+            </dgm:varLst>
+            <dgm:alg type="tx">
+              <dgm:param type="txAnchorVertCh" val="mid"/>
+            </dgm:alg>
+            <dgm:shape xmlns:r="http://schemas.openxmlformats.org/officeDocument/2006/relationships" type="ellipse" r:blip="">
+              <dgm:adjLst/>
+            </dgm:shape>
+            <dgm:choose name="Name12">
+              <dgm:if name="Name13" axis="root ch" ptType="all node" func="cnt" op="equ" val="1">
+                <dgm:presOf/>
+              </dgm:if>
+              <dgm:if name="Name14" axis="root ch" ptType="all node" func="cnt" op="equ" val="2">
+                <dgm:presOf axis="root ch desOrSelf" ptType="all node node" st="1 1 1" cnt="0 1 0"/>
+              </dgm:if>
+              <dgm:if name="Name15" axis="root ch" ptType="all node" func="cnt" op="equ" val="3">
+                <dgm:presOf axis="root ch desOrSelf" ptType="all node node" st="1 2 1" cnt="0 1 0"/>
+              </dgm:if>
+              <dgm:else name="Name16">
+                <dgm:presOf axis="root ch desOrSelf" ptType="all node node" st="1 3 1" cnt="0 1 0"/>
+              </dgm:else>
+            </dgm:choose>
+            <dgm:constrLst>
+              <dgm:constr type="tMarg" refType="primFontSz" fact="0.1"/>
+              <dgm:constr type="bMarg" refType="primFontSz" fact="0.1"/>
+              <dgm:constr type="lMarg" refType="primFontSz" fact="0.1"/>
+              <dgm:constr type="rMarg" refType="primFontSz" fact="0.1"/>
+            </dgm:constrLst>
+            <dgm:ruleLst>
+              <dgm:rule type="primFontSz" val="5" fact="NaN" max="NaN"/>
+            </dgm:ruleLst>
+          </dgm:layoutNode>
+        </dgm:forEach>
+        <dgm:forEach name="Name17" axis="ch" ptType="node" st="3" cnt="1">
+          <dgm:layoutNode name="item2" styleLbl="node1">
+            <dgm:varLst>
+              <dgm:bulletEnabled val="1"/>
+            </dgm:varLst>
+            <dgm:alg type="tx">
+              <dgm:param type="txAnchorVertCh" val="mid"/>
+            </dgm:alg>
+            <dgm:shape xmlns:r="http://schemas.openxmlformats.org/officeDocument/2006/relationships" type="ellipse" r:blip="">
+              <dgm:adjLst/>
+            </dgm:shape>
+            <dgm:choose name="Name18">
+              <dgm:if name="Name19" axis="root ch" ptType="all node" func="cnt" op="equ" val="1">
+                <dgm:presOf/>
+              </dgm:if>
+              <dgm:if name="Name20" axis="root ch" ptType="all node" func="cnt" op="equ" val="2">
+                <dgm:presOf/>
+              </dgm:if>
+              <dgm:if name="Name21" axis="root ch" ptType="all node" func="cnt" op="equ" val="3">
+                <dgm:presOf axis="root ch desOrSelf" ptType="all node node" st="1 1 1" cnt="0 1 0"/>
+              </dgm:if>
+              <dgm:else name="Name22">
+                <dgm:presOf axis="root ch desOrSelf" ptType="all node node" st="1 2 1" cnt="0 1 0"/>
+              </dgm:else>
+            </dgm:choose>
+            <dgm:constrLst>
+              <dgm:constr type="tMarg" refType="primFontSz" fact="0.1"/>
+              <dgm:constr type="bMarg" refType="primFontSz" fact="0.1"/>
+              <dgm:constr type="lMarg" refType="primFontSz" fact="0.1"/>
+              <dgm:constr type="rMarg" refType="primFontSz" fact="0.1"/>
+            </dgm:constrLst>
+            <dgm:ruleLst>
+              <dgm:rule type="primFontSz" val="5" fact="NaN" max="NaN"/>
+            </dgm:ruleLst>
+          </dgm:layoutNode>
+        </dgm:forEach>
+        <dgm:forEach name="Name23" axis="ch" ptType="node" st="4" cnt="1">
+          <dgm:layoutNode name="item3" styleLbl="node1">
+            <dgm:varLst>
+              <dgm:bulletEnabled val="1"/>
+            </dgm:varLst>
+            <dgm:alg type="tx">
+              <dgm:param type="txAnchorVertCh" val="mid"/>
+            </dgm:alg>
+            <dgm:shape xmlns:r="http://schemas.openxmlformats.org/officeDocument/2006/relationships" type="ellipse" r:blip="">
+              <dgm:adjLst/>
+            </dgm:shape>
+            <dgm:choose name="Name24">
+              <dgm:if name="Name25" axis="root ch" ptType="all node" func="cnt" op="equ" val="1">
+                <dgm:presOf/>
+              </dgm:if>
+              <dgm:if name="Name26" axis="root ch" ptType="all node" func="cnt" op="equ" val="2">
+                <dgm:presOf/>
+              </dgm:if>
+              <dgm:if name="Name27" axis="root ch" ptType="all node" func="cnt" op="equ" val="3">
+                <dgm:presOf/>
+              </dgm:if>
+              <dgm:else name="Name28">
+                <dgm:presOf axis="root ch desOrSelf" ptType="all node node" st="1 1 1" cnt="0 1 0"/>
+              </dgm:else>
+            </dgm:choose>
+            <dgm:constrLst>
+              <dgm:constr type="tMarg" refType="primFontSz" fact="0.1"/>
+              <dgm:constr type="bMarg" refType="primFontSz" fact="0.1"/>
+              <dgm:constr type="lMarg" refType="primFontSz" fact="0.1"/>
+              <dgm:constr type="rMarg" refType="primFontSz" fact="0.1"/>
+            </dgm:constrLst>
+            <dgm:ruleLst>
+              <dgm:rule type="primFontSz" val="5" fact="NaN" max="NaN"/>
+            </dgm:ruleLst>
+          </dgm:layoutNode>
+        </dgm:forEach>
+        <dgm:layoutNode name="funnel" styleLbl="trAlignAcc1">
+          <dgm:alg type="sp"/>
+          <dgm:shape xmlns:r="http://schemas.openxmlformats.org/officeDocument/2006/relationships" type="funnel" r:blip="">
+            <dgm:adjLst/>
+          </dgm:shape>
+          <dgm:presOf/>
+          <dgm:constrLst/>
+          <dgm:ruleLst/>
+        </dgm:layoutNode>
+      </dgm:if>
+      <dgm:else name="Name29"/>
+    </dgm:choose>
+  </dgm:layoutNode>
+</dgm:layoutDef>
+</file>
+
 <file path=ppt/diagrams/quickStyle1.xml><?xml version="1.0" encoding="utf-8"?>
 <dgm:styleDef xmlns:dgm="http://schemas.openxmlformats.org/drawingml/2006/diagram" xmlns:a="http://schemas.openxmlformats.org/drawingml/2006/main" uniqueId="urn:microsoft.com/office/officeart/2005/8/quickstyle/simple1">
   <dgm:title val=""/>
@@ -5560,6 +7065,1040 @@
 </file>
 
 <file path=ppt/diagrams/quickStyle2.xml><?xml version="1.0" encoding="utf-8"?>
+<dgm:styleDef xmlns:dgm="http://schemas.openxmlformats.org/drawingml/2006/diagram" xmlns:a="http://schemas.openxmlformats.org/drawingml/2006/main" uniqueId="urn:microsoft.com/office/officeart/2005/8/quickstyle/simple1">
+  <dgm:title val=""/>
+  <dgm:desc val=""/>
+  <dgm:catLst>
+    <dgm:cat type="simple" pri="10100"/>
+  </dgm:catLst>
+  <dgm:scene3d>
+    <a:camera prst="orthographicFront"/>
+    <a:lightRig rig="threePt" dir="t"/>
+  </dgm:scene3d>
+  <dgm:styleLbl name="node0">
+    <dgm:scene3d>
+      <a:camera prst="orthographicFront"/>
+      <a:lightRig rig="threePt" dir="t"/>
+    </dgm:scene3d>
+    <dgm:sp3d/>
+    <dgm:txPr/>
+    <dgm:style>
+      <a:lnRef idx="2">
+        <a:scrgbClr r="0" g="0" b="0"/>
+      </a:lnRef>
+      <a:fillRef idx="1">
+        <a:scrgbClr r="0" g="0" b="0"/>
+      </a:fillRef>
+      <a:effectRef idx="0">
+        <a:scrgbClr r="0" g="0" b="0"/>
+      </a:effectRef>
+      <a:fontRef idx="minor">
+        <a:schemeClr val="lt1"/>
+      </a:fontRef>
+    </dgm:style>
+  </dgm:styleLbl>
+  <dgm:styleLbl name="lnNode1">
+    <dgm:scene3d>
+      <a:camera prst="orthographicFront"/>
+      <a:lightRig rig="threePt" dir="t"/>
+    </dgm:scene3d>
+    <dgm:sp3d/>
+    <dgm:txPr/>
+    <dgm:style>
+      <a:lnRef idx="2">
+        <a:scrgbClr r="0" g="0" b="0"/>
+      </a:lnRef>
+      <a:fillRef idx="1">
+        <a:scrgbClr r="0" g="0" b="0"/>
+      </a:fillRef>
+      <a:effectRef idx="0">
+        <a:scrgbClr r="0" g="0" b="0"/>
+      </a:effectRef>
+      <a:fontRef idx="minor">
+        <a:schemeClr val="lt1"/>
+      </a:fontRef>
+    </dgm:style>
+  </dgm:styleLbl>
+  <dgm:styleLbl name="vennNode1">
+    <dgm:scene3d>
+      <a:camera prst="orthographicFront"/>
+      <a:lightRig rig="threePt" dir="t"/>
+    </dgm:scene3d>
+    <dgm:sp3d/>
+    <dgm:txPr/>
+    <dgm:style>
+      <a:lnRef idx="2">
+        <a:scrgbClr r="0" g="0" b="0"/>
+      </a:lnRef>
+      <a:fillRef idx="1">
+        <a:scrgbClr r="0" g="0" b="0"/>
+      </a:fillRef>
+      <a:effectRef idx="0">
+        <a:scrgbClr r="0" g="0" b="0"/>
+      </a:effectRef>
+      <a:fontRef idx="minor">
+        <a:schemeClr val="tx1"/>
+      </a:fontRef>
+    </dgm:style>
+  </dgm:styleLbl>
+  <dgm:styleLbl name="alignNode1">
+    <dgm:scene3d>
+      <a:camera prst="orthographicFront"/>
+      <a:lightRig rig="threePt" dir="t"/>
+    </dgm:scene3d>
+    <dgm:sp3d/>
+    <dgm:txPr/>
+    <dgm:style>
+      <a:lnRef idx="2">
+        <a:scrgbClr r="0" g="0" b="0"/>
+      </a:lnRef>
+      <a:fillRef idx="1">
+        <a:scrgbClr r="0" g="0" b="0"/>
+      </a:fillRef>
+      <a:effectRef idx="0">
+        <a:scrgbClr r="0" g="0" b="0"/>
+      </a:effectRef>
+      <a:fontRef idx="minor">
+        <a:schemeClr val="lt1"/>
+      </a:fontRef>
+    </dgm:style>
+  </dgm:styleLbl>
+  <dgm:styleLbl name="node1">
+    <dgm:scene3d>
+      <a:camera prst="orthographicFront"/>
+      <a:lightRig rig="threePt" dir="t"/>
+    </dgm:scene3d>
+    <dgm:sp3d/>
+    <dgm:txPr/>
+    <dgm:style>
+      <a:lnRef idx="2">
+        <a:scrgbClr r="0" g="0" b="0"/>
+      </a:lnRef>
+      <a:fillRef idx="1">
+        <a:scrgbClr r="0" g="0" b="0"/>
+      </a:fillRef>
+      <a:effectRef idx="0">
+        <a:scrgbClr r="0" g="0" b="0"/>
+      </a:effectRef>
+      <a:fontRef idx="minor">
+        <a:schemeClr val="lt1"/>
+      </a:fontRef>
+    </dgm:style>
+  </dgm:styleLbl>
+  <dgm:styleLbl name="node2">
+    <dgm:scene3d>
+      <a:camera prst="orthographicFront"/>
+      <a:lightRig rig="threePt" dir="t"/>
+    </dgm:scene3d>
+    <dgm:sp3d/>
+    <dgm:txPr/>
+    <dgm:style>
+      <a:lnRef idx="2">
+        <a:scrgbClr r="0" g="0" b="0"/>
+      </a:lnRef>
+      <a:fillRef idx="1">
+        <a:scrgbClr r="0" g="0" b="0"/>
+      </a:fillRef>
+      <a:effectRef idx="0">
+        <a:scrgbClr r="0" g="0" b="0"/>
+      </a:effectRef>
+      <a:fontRef idx="minor">
+        <a:schemeClr val="lt1"/>
+      </a:fontRef>
+    </dgm:style>
+  </dgm:styleLbl>
+  <dgm:styleLbl name="node3">
+    <dgm:scene3d>
+      <a:camera prst="orthographicFront"/>
+      <a:lightRig rig="threePt" dir="t"/>
+    </dgm:scene3d>
+    <dgm:sp3d/>
+    <dgm:txPr/>
+    <dgm:style>
+      <a:lnRef idx="2">
+        <a:scrgbClr r="0" g="0" b="0"/>
+      </a:lnRef>
+      <a:fillRef idx="1">
+        <a:scrgbClr r="0" g="0" b="0"/>
+      </a:fillRef>
+      <a:effectRef idx="0">
+        <a:scrgbClr r="0" g="0" b="0"/>
+      </a:effectRef>
+      <a:fontRef idx="minor">
+        <a:schemeClr val="lt1"/>
+      </a:fontRef>
+    </dgm:style>
+  </dgm:styleLbl>
+  <dgm:styleLbl name="node4">
+    <dgm:scene3d>
+      <a:camera prst="orthographicFront"/>
+      <a:lightRig rig="threePt" dir="t"/>
+    </dgm:scene3d>
+    <dgm:sp3d/>
+    <dgm:txPr/>
+    <dgm:style>
+      <a:lnRef idx="2">
+        <a:scrgbClr r="0" g="0" b="0"/>
+      </a:lnRef>
+      <a:fillRef idx="1">
+        <a:scrgbClr r="0" g="0" b="0"/>
+      </a:fillRef>
+      <a:effectRef idx="0">
+        <a:scrgbClr r="0" g="0" b="0"/>
+      </a:effectRef>
+      <a:fontRef idx="minor">
+        <a:schemeClr val="lt1"/>
+      </a:fontRef>
+    </dgm:style>
+  </dgm:styleLbl>
+  <dgm:styleLbl name="fgImgPlace1">
+    <dgm:scene3d>
+      <a:camera prst="orthographicFront"/>
+      <a:lightRig rig="threePt" dir="t"/>
+    </dgm:scene3d>
+    <dgm:sp3d/>
+    <dgm:txPr/>
+    <dgm:style>
+      <a:lnRef idx="2">
+        <a:scrgbClr r="0" g="0" b="0"/>
+      </a:lnRef>
+      <a:fillRef idx="1">
+        <a:scrgbClr r="0" g="0" b="0"/>
+      </a:fillRef>
+      <a:effectRef idx="0">
+        <a:scrgbClr r="0" g="0" b="0"/>
+      </a:effectRef>
+      <a:fontRef idx="minor"/>
+    </dgm:style>
+  </dgm:styleLbl>
+  <dgm:styleLbl name="alignImgPlace1">
+    <dgm:scene3d>
+      <a:camera prst="orthographicFront"/>
+      <a:lightRig rig="threePt" dir="t"/>
+    </dgm:scene3d>
+    <dgm:sp3d/>
+    <dgm:txPr/>
+    <dgm:style>
+      <a:lnRef idx="2">
+        <a:scrgbClr r="0" g="0" b="0"/>
+      </a:lnRef>
+      <a:fillRef idx="1">
+        <a:scrgbClr r="0" g="0" b="0"/>
+      </a:fillRef>
+      <a:effectRef idx="0">
+        <a:scrgbClr r="0" g="0" b="0"/>
+      </a:effectRef>
+      <a:fontRef idx="minor"/>
+    </dgm:style>
+  </dgm:styleLbl>
+  <dgm:styleLbl name="bgImgPlace1">
+    <dgm:scene3d>
+      <a:camera prst="orthographicFront"/>
+      <a:lightRig rig="threePt" dir="t"/>
+    </dgm:scene3d>
+    <dgm:sp3d/>
+    <dgm:txPr/>
+    <dgm:style>
+      <a:lnRef idx="2">
+        <a:scrgbClr r="0" g="0" b="0"/>
+      </a:lnRef>
+      <a:fillRef idx="1">
+        <a:scrgbClr r="0" g="0" b="0"/>
+      </a:fillRef>
+      <a:effectRef idx="0">
+        <a:scrgbClr r="0" g="0" b="0"/>
+      </a:effectRef>
+      <a:fontRef idx="minor"/>
+    </dgm:style>
+  </dgm:styleLbl>
+  <dgm:styleLbl name="sibTrans2D1">
+    <dgm:scene3d>
+      <a:camera prst="orthographicFront"/>
+      <a:lightRig rig="threePt" dir="t"/>
+    </dgm:scene3d>
+    <dgm:sp3d/>
+    <dgm:txPr/>
+    <dgm:style>
+      <a:lnRef idx="0">
+        <a:scrgbClr r="0" g="0" b="0"/>
+      </a:lnRef>
+      <a:fillRef idx="1">
+        <a:scrgbClr r="0" g="0" b="0"/>
+      </a:fillRef>
+      <a:effectRef idx="0">
+        <a:scrgbClr r="0" g="0" b="0"/>
+      </a:effectRef>
+      <a:fontRef idx="minor">
+        <a:schemeClr val="lt1"/>
+      </a:fontRef>
+    </dgm:style>
+  </dgm:styleLbl>
+  <dgm:styleLbl name="fgSibTrans2D1">
+    <dgm:scene3d>
+      <a:camera prst="orthographicFront"/>
+      <a:lightRig rig="threePt" dir="t"/>
+    </dgm:scene3d>
+    <dgm:sp3d/>
+    <dgm:txPr/>
+    <dgm:style>
+      <a:lnRef idx="0">
+        <a:scrgbClr r="0" g="0" b="0"/>
+      </a:lnRef>
+      <a:fillRef idx="1">
+        <a:scrgbClr r="0" g="0" b="0"/>
+      </a:fillRef>
+      <a:effectRef idx="0">
+        <a:scrgbClr r="0" g="0" b="0"/>
+      </a:effectRef>
+      <a:fontRef idx="minor">
+        <a:schemeClr val="lt1"/>
+      </a:fontRef>
+    </dgm:style>
+  </dgm:styleLbl>
+  <dgm:styleLbl name="bgSibTrans2D1">
+    <dgm:scene3d>
+      <a:camera prst="orthographicFront"/>
+      <a:lightRig rig="threePt" dir="t"/>
+    </dgm:scene3d>
+    <dgm:sp3d/>
+    <dgm:txPr/>
+    <dgm:style>
+      <a:lnRef idx="0">
+        <a:scrgbClr r="0" g="0" b="0"/>
+      </a:lnRef>
+      <a:fillRef idx="1">
+        <a:scrgbClr r="0" g="0" b="0"/>
+      </a:fillRef>
+      <a:effectRef idx="0">
+        <a:scrgbClr r="0" g="0" b="0"/>
+      </a:effectRef>
+      <a:fontRef idx="minor">
+        <a:schemeClr val="lt1"/>
+      </a:fontRef>
+    </dgm:style>
+  </dgm:styleLbl>
+  <dgm:styleLbl name="sibTrans1D1">
+    <dgm:scene3d>
+      <a:camera prst="orthographicFront"/>
+      <a:lightRig rig="threePt" dir="t"/>
+    </dgm:scene3d>
+    <dgm:sp3d/>
+    <dgm:txPr/>
+    <dgm:style>
+      <a:lnRef idx="1">
+        <a:scrgbClr r="0" g="0" b="0"/>
+      </a:lnRef>
+      <a:fillRef idx="0">
+        <a:scrgbClr r="0" g="0" b="0"/>
+      </a:fillRef>
+      <a:effectRef idx="0">
+        <a:scrgbClr r="0" g="0" b="0"/>
+      </a:effectRef>
+      <a:fontRef idx="minor"/>
+    </dgm:style>
+  </dgm:styleLbl>
+  <dgm:styleLbl name="callout">
+    <dgm:scene3d>
+      <a:camera prst="orthographicFront"/>
+      <a:lightRig rig="threePt" dir="t"/>
+    </dgm:scene3d>
+    <dgm:sp3d/>
+    <dgm:txPr/>
+    <dgm:style>
+      <a:lnRef idx="2">
+        <a:scrgbClr r="0" g="0" b="0"/>
+      </a:lnRef>
+      <a:fillRef idx="1">
+        <a:scrgbClr r="0" g="0" b="0"/>
+      </a:fillRef>
+      <a:effectRef idx="0">
+        <a:scrgbClr r="0" g="0" b="0"/>
+      </a:effectRef>
+      <a:fontRef idx="minor"/>
+    </dgm:style>
+  </dgm:styleLbl>
+  <dgm:styleLbl name="asst0">
+    <dgm:scene3d>
+      <a:camera prst="orthographicFront"/>
+      <a:lightRig rig="threePt" dir="t"/>
+    </dgm:scene3d>
+    <dgm:sp3d/>
+    <dgm:txPr/>
+    <dgm:style>
+      <a:lnRef idx="2">
+        <a:scrgbClr r="0" g="0" b="0"/>
+      </a:lnRef>
+      <a:fillRef idx="1">
+        <a:scrgbClr r="0" g="0" b="0"/>
+      </a:fillRef>
+      <a:effectRef idx="0">
+        <a:scrgbClr r="0" g="0" b="0"/>
+      </a:effectRef>
+      <a:fontRef idx="minor">
+        <a:schemeClr val="lt1"/>
+      </a:fontRef>
+    </dgm:style>
+  </dgm:styleLbl>
+  <dgm:styleLbl name="asst1">
+    <dgm:scene3d>
+      <a:camera prst="orthographicFront"/>
+      <a:lightRig rig="threePt" dir="t"/>
+    </dgm:scene3d>
+    <dgm:sp3d/>
+    <dgm:txPr/>
+    <dgm:style>
+      <a:lnRef idx="2">
+        <a:scrgbClr r="0" g="0" b="0"/>
+      </a:lnRef>
+      <a:fillRef idx="1">
+        <a:scrgbClr r="0" g="0" b="0"/>
+      </a:fillRef>
+      <a:effectRef idx="0">
+        <a:scrgbClr r="0" g="0" b="0"/>
+      </a:effectRef>
+      <a:fontRef idx="minor">
+        <a:schemeClr val="lt1"/>
+      </a:fontRef>
+    </dgm:style>
+  </dgm:styleLbl>
+  <dgm:styleLbl name="asst2">
+    <dgm:scene3d>
+      <a:camera prst="orthographicFront"/>
+      <a:lightRig rig="threePt" dir="t"/>
+    </dgm:scene3d>
+    <dgm:sp3d/>
+    <dgm:txPr/>
+    <dgm:style>
+      <a:lnRef idx="2">
+        <a:scrgbClr r="0" g="0" b="0"/>
+      </a:lnRef>
+      <a:fillRef idx="1">
+        <a:scrgbClr r="0" g="0" b="0"/>
+      </a:fillRef>
+      <a:effectRef idx="0">
+        <a:scrgbClr r="0" g="0" b="0"/>
+      </a:effectRef>
+      <a:fontRef idx="minor">
+        <a:schemeClr val="lt1"/>
+      </a:fontRef>
+    </dgm:style>
+  </dgm:styleLbl>
+  <dgm:styleLbl name="asst3">
+    <dgm:scene3d>
+      <a:camera prst="orthographicFront"/>
+      <a:lightRig rig="threePt" dir="t"/>
+    </dgm:scene3d>
+    <dgm:sp3d/>
+    <dgm:txPr/>
+    <dgm:style>
+      <a:lnRef idx="2">
+        <a:scrgbClr r="0" g="0" b="0"/>
+      </a:lnRef>
+      <a:fillRef idx="1">
+        <a:scrgbClr r="0" g="0" b="0"/>
+      </a:fillRef>
+      <a:effectRef idx="0">
+        <a:scrgbClr r="0" g="0" b="0"/>
+      </a:effectRef>
+      <a:fontRef idx="minor">
+        <a:schemeClr val="lt1"/>
+      </a:fontRef>
+    </dgm:style>
+  </dgm:styleLbl>
+  <dgm:styleLbl name="asst4">
+    <dgm:scene3d>
+      <a:camera prst="orthographicFront"/>
+      <a:lightRig rig="threePt" dir="t"/>
+    </dgm:scene3d>
+    <dgm:sp3d/>
+    <dgm:txPr/>
+    <dgm:style>
+      <a:lnRef idx="2">
+        <a:scrgbClr r="0" g="0" b="0"/>
+      </a:lnRef>
+      <a:fillRef idx="1">
+        <a:scrgbClr r="0" g="0" b="0"/>
+      </a:fillRef>
+      <a:effectRef idx="0">
+        <a:scrgbClr r="0" g="0" b="0"/>
+      </a:effectRef>
+      <a:fontRef idx="minor">
+        <a:schemeClr val="lt1"/>
+      </a:fontRef>
+    </dgm:style>
+  </dgm:styleLbl>
+  <dgm:styleLbl name="parChTrans2D1">
+    <dgm:scene3d>
+      <a:camera prst="orthographicFront"/>
+      <a:lightRig rig="threePt" dir="t"/>
+    </dgm:scene3d>
+    <dgm:sp3d/>
+    <dgm:txPr/>
+    <dgm:style>
+      <a:lnRef idx="2">
+        <a:scrgbClr r="0" g="0" b="0"/>
+      </a:lnRef>
+      <a:fillRef idx="1">
+        <a:scrgbClr r="0" g="0" b="0"/>
+      </a:fillRef>
+      <a:effectRef idx="0">
+        <a:scrgbClr r="0" g="0" b="0"/>
+      </a:effectRef>
+      <a:fontRef idx="minor">
+        <a:schemeClr val="lt1"/>
+      </a:fontRef>
+    </dgm:style>
+  </dgm:styleLbl>
+  <dgm:styleLbl name="parChTrans2D2">
+    <dgm:scene3d>
+      <a:camera prst="orthographicFront"/>
+      <a:lightRig rig="threePt" dir="t"/>
+    </dgm:scene3d>
+    <dgm:sp3d/>
+    <dgm:txPr/>
+    <dgm:style>
+      <a:lnRef idx="2">
+        <a:scrgbClr r="0" g="0" b="0"/>
+      </a:lnRef>
+      <a:fillRef idx="1">
+        <a:scrgbClr r="0" g="0" b="0"/>
+      </a:fillRef>
+      <a:effectRef idx="0">
+        <a:scrgbClr r="0" g="0" b="0"/>
+      </a:effectRef>
+      <a:fontRef idx="minor">
+        <a:schemeClr val="lt1"/>
+      </a:fontRef>
+    </dgm:style>
+  </dgm:styleLbl>
+  <dgm:styleLbl name="parChTrans2D3">
+    <dgm:scene3d>
+      <a:camera prst="orthographicFront"/>
+      <a:lightRig rig="threePt" dir="t"/>
+    </dgm:scene3d>
+    <dgm:sp3d/>
+    <dgm:txPr/>
+    <dgm:style>
+      <a:lnRef idx="2">
+        <a:scrgbClr r="0" g="0" b="0"/>
+      </a:lnRef>
+      <a:fillRef idx="1">
+        <a:scrgbClr r="0" g="0" b="0"/>
+      </a:fillRef>
+      <a:effectRef idx="0">
+        <a:scrgbClr r="0" g="0" b="0"/>
+      </a:effectRef>
+      <a:fontRef idx="minor">
+        <a:schemeClr val="lt1"/>
+      </a:fontRef>
+    </dgm:style>
+  </dgm:styleLbl>
+  <dgm:styleLbl name="parChTrans2D4">
+    <dgm:scene3d>
+      <a:camera prst="orthographicFront"/>
+      <a:lightRig rig="threePt" dir="t"/>
+    </dgm:scene3d>
+    <dgm:sp3d/>
+    <dgm:txPr/>
+    <dgm:style>
+      <a:lnRef idx="2">
+        <a:scrgbClr r="0" g="0" b="0"/>
+      </a:lnRef>
+      <a:fillRef idx="1">
+        <a:scrgbClr r="0" g="0" b="0"/>
+      </a:fillRef>
+      <a:effectRef idx="0">
+        <a:scrgbClr r="0" g="0" b="0"/>
+      </a:effectRef>
+      <a:fontRef idx="minor">
+        <a:schemeClr val="lt1"/>
+      </a:fontRef>
+    </dgm:style>
+  </dgm:styleLbl>
+  <dgm:styleLbl name="parChTrans1D1">
+    <dgm:scene3d>
+      <a:camera prst="orthographicFront"/>
+      <a:lightRig rig="threePt" dir="t"/>
+    </dgm:scene3d>
+    <dgm:sp3d/>
+    <dgm:txPr/>
+    <dgm:style>
+      <a:lnRef idx="2">
+        <a:scrgbClr r="0" g="0" b="0"/>
+      </a:lnRef>
+      <a:fillRef idx="0">
+        <a:scrgbClr r="0" g="0" b="0"/>
+      </a:fillRef>
+      <a:effectRef idx="0">
+        <a:scrgbClr r="0" g="0" b="0"/>
+      </a:effectRef>
+      <a:fontRef idx="minor"/>
+    </dgm:style>
+  </dgm:styleLbl>
+  <dgm:styleLbl name="parChTrans1D2">
+    <dgm:scene3d>
+      <a:camera prst="orthographicFront"/>
+      <a:lightRig rig="threePt" dir="t"/>
+    </dgm:scene3d>
+    <dgm:sp3d/>
+    <dgm:txPr/>
+    <dgm:style>
+      <a:lnRef idx="2">
+        <a:scrgbClr r="0" g="0" b="0"/>
+      </a:lnRef>
+      <a:fillRef idx="0">
+        <a:scrgbClr r="0" g="0" b="0"/>
+      </a:fillRef>
+      <a:effectRef idx="0">
+        <a:scrgbClr r="0" g="0" b="0"/>
+      </a:effectRef>
+      <a:fontRef idx="minor"/>
+    </dgm:style>
+  </dgm:styleLbl>
+  <dgm:styleLbl name="parChTrans1D3">
+    <dgm:scene3d>
+      <a:camera prst="orthographicFront"/>
+      <a:lightRig rig="threePt" dir="t"/>
+    </dgm:scene3d>
+    <dgm:sp3d/>
+    <dgm:txPr/>
+    <dgm:style>
+      <a:lnRef idx="2">
+        <a:scrgbClr r="0" g="0" b="0"/>
+      </a:lnRef>
+      <a:fillRef idx="0">
+        <a:scrgbClr r="0" g="0" b="0"/>
+      </a:fillRef>
+      <a:effectRef idx="0">
+        <a:scrgbClr r="0" g="0" b="0"/>
+      </a:effectRef>
+      <a:fontRef idx="minor"/>
+    </dgm:style>
+  </dgm:styleLbl>
+  <dgm:styleLbl name="parChTrans1D4">
+    <dgm:scene3d>
+      <a:camera prst="orthographicFront"/>
+      <a:lightRig rig="threePt" dir="t"/>
+    </dgm:scene3d>
+    <dgm:sp3d/>
+    <dgm:txPr/>
+    <dgm:style>
+      <a:lnRef idx="2">
+        <a:scrgbClr r="0" g="0" b="0"/>
+      </a:lnRef>
+      <a:fillRef idx="0">
+        <a:scrgbClr r="0" g="0" b="0"/>
+      </a:fillRef>
+      <a:effectRef idx="0">
+        <a:scrgbClr r="0" g="0" b="0"/>
+      </a:effectRef>
+      <a:fontRef idx="minor"/>
+    </dgm:style>
+  </dgm:styleLbl>
+  <dgm:styleLbl name="fgAcc1">
+    <dgm:scene3d>
+      <a:camera prst="orthographicFront"/>
+      <a:lightRig rig="threePt" dir="t"/>
+    </dgm:scene3d>
+    <dgm:sp3d/>
+    <dgm:txPr/>
+    <dgm:style>
+      <a:lnRef idx="2">
+        <a:scrgbClr r="0" g="0" b="0"/>
+      </a:lnRef>
+      <a:fillRef idx="1">
+        <a:scrgbClr r="0" g="0" b="0"/>
+      </a:fillRef>
+      <a:effectRef idx="0">
+        <a:scrgbClr r="0" g="0" b="0"/>
+      </a:effectRef>
+      <a:fontRef idx="minor"/>
+    </dgm:style>
+  </dgm:styleLbl>
+  <dgm:styleLbl name="conFgAcc1">
+    <dgm:scene3d>
+      <a:camera prst="orthographicFront"/>
+      <a:lightRig rig="threePt" dir="t"/>
+    </dgm:scene3d>
+    <dgm:sp3d/>
+    <dgm:txPr/>
+    <dgm:style>
+      <a:lnRef idx="2">
+        <a:scrgbClr r="0" g="0" b="0"/>
+      </a:lnRef>
+      <a:fillRef idx="1">
+        <a:scrgbClr r="0" g="0" b="0"/>
+      </a:fillRef>
+      <a:effectRef idx="0">
+        <a:scrgbClr r="0" g="0" b="0"/>
+      </a:effectRef>
+      <a:fontRef idx="minor"/>
+    </dgm:style>
+  </dgm:styleLbl>
+  <dgm:styleLbl name="alignAcc1">
+    <dgm:scene3d>
+      <a:camera prst="orthographicFront"/>
+      <a:lightRig rig="threePt" dir="t"/>
+    </dgm:scene3d>
+    <dgm:sp3d/>
+    <dgm:txPr/>
+    <dgm:style>
+      <a:lnRef idx="2">
+        <a:scrgbClr r="0" g="0" b="0"/>
+      </a:lnRef>
+      <a:fillRef idx="1">
+        <a:scrgbClr r="0" g="0" b="0"/>
+      </a:fillRef>
+      <a:effectRef idx="0">
+        <a:scrgbClr r="0" g="0" b="0"/>
+      </a:effectRef>
+      <a:fontRef idx="minor"/>
+    </dgm:style>
+  </dgm:styleLbl>
+  <dgm:styleLbl name="trAlignAcc1">
+    <dgm:scene3d>
+      <a:camera prst="orthographicFront"/>
+      <a:lightRig rig="threePt" dir="t"/>
+    </dgm:scene3d>
+    <dgm:sp3d/>
+    <dgm:txPr/>
+    <dgm:style>
+      <a:lnRef idx="1">
+        <a:scrgbClr r="0" g="0" b="0"/>
+      </a:lnRef>
+      <a:fillRef idx="1">
+        <a:scrgbClr r="0" g="0" b="0"/>
+      </a:fillRef>
+      <a:effectRef idx="0">
+        <a:scrgbClr r="0" g="0" b="0"/>
+      </a:effectRef>
+      <a:fontRef idx="minor"/>
+    </dgm:style>
+  </dgm:styleLbl>
+  <dgm:styleLbl name="bgAcc1">
+    <dgm:scene3d>
+      <a:camera prst="orthographicFront"/>
+      <a:lightRig rig="threePt" dir="t"/>
+    </dgm:scene3d>
+    <dgm:sp3d/>
+    <dgm:txPr/>
+    <dgm:style>
+      <a:lnRef idx="2">
+        <a:scrgbClr r="0" g="0" b="0"/>
+      </a:lnRef>
+      <a:fillRef idx="1">
+        <a:scrgbClr r="0" g="0" b="0"/>
+      </a:fillRef>
+      <a:effectRef idx="0">
+        <a:scrgbClr r="0" g="0" b="0"/>
+      </a:effectRef>
+      <a:fontRef idx="minor"/>
+    </dgm:style>
+  </dgm:styleLbl>
+  <dgm:styleLbl name="solidFgAcc1">
+    <dgm:scene3d>
+      <a:camera prst="orthographicFront"/>
+      <a:lightRig rig="threePt" dir="t"/>
+    </dgm:scene3d>
+    <dgm:sp3d/>
+    <dgm:txPr/>
+    <dgm:style>
+      <a:lnRef idx="2">
+        <a:scrgbClr r="0" g="0" b="0"/>
+      </a:lnRef>
+      <a:fillRef idx="1">
+        <a:scrgbClr r="0" g="0" b="0"/>
+      </a:fillRef>
+      <a:effectRef idx="0">
+        <a:scrgbClr r="0" g="0" b="0"/>
+      </a:effectRef>
+      <a:fontRef idx="minor"/>
+    </dgm:style>
+  </dgm:styleLbl>
+  <dgm:styleLbl name="solidAlignAcc1">
+    <dgm:scene3d>
+      <a:camera prst="orthographicFront"/>
+      <a:lightRig rig="threePt" dir="t"/>
+    </dgm:scene3d>
+    <dgm:sp3d/>
+    <dgm:txPr/>
+    <dgm:style>
+      <a:lnRef idx="2">
+        <a:scrgbClr r="0" g="0" b="0"/>
+      </a:lnRef>
+      <a:fillRef idx="1">
+        <a:scrgbClr r="0" g="0" b="0"/>
+      </a:fillRef>
+      <a:effectRef idx="0">
+        <a:scrgbClr r="0" g="0" b="0"/>
+      </a:effectRef>
+      <a:fontRef idx="minor"/>
+    </dgm:style>
+  </dgm:styleLbl>
+  <dgm:styleLbl name="solidBgAcc1">
+    <dgm:scene3d>
+      <a:camera prst="orthographicFront"/>
+      <a:lightRig rig="threePt" dir="t"/>
+    </dgm:scene3d>
+    <dgm:sp3d/>
+    <dgm:txPr/>
+    <dgm:style>
+      <a:lnRef idx="2">
+        <a:scrgbClr r="0" g="0" b="0"/>
+      </a:lnRef>
+      <a:fillRef idx="1">
+        <a:scrgbClr r="0" g="0" b="0"/>
+      </a:fillRef>
+      <a:effectRef idx="0">
+        <a:scrgbClr r="0" g="0" b="0"/>
+      </a:effectRef>
+      <a:fontRef idx="minor"/>
+    </dgm:style>
+  </dgm:styleLbl>
+  <dgm:styleLbl name="fgAccFollowNode1">
+    <dgm:scene3d>
+      <a:camera prst="orthographicFront"/>
+      <a:lightRig rig="threePt" dir="t"/>
+    </dgm:scene3d>
+    <dgm:sp3d/>
+    <dgm:txPr/>
+    <dgm:style>
+      <a:lnRef idx="2">
+        <a:scrgbClr r="0" g="0" b="0"/>
+      </a:lnRef>
+      <a:fillRef idx="1">
+        <a:scrgbClr r="0" g="0" b="0"/>
+      </a:fillRef>
+      <a:effectRef idx="0">
+        <a:scrgbClr r="0" g="0" b="0"/>
+      </a:effectRef>
+      <a:fontRef idx="minor"/>
+    </dgm:style>
+  </dgm:styleLbl>
+  <dgm:styleLbl name="alignAccFollowNode1">
+    <dgm:scene3d>
+      <a:camera prst="orthographicFront"/>
+      <a:lightRig rig="threePt" dir="t"/>
+    </dgm:scene3d>
+    <dgm:sp3d/>
+    <dgm:txPr/>
+    <dgm:style>
+      <a:lnRef idx="2">
+        <a:scrgbClr r="0" g="0" b="0"/>
+      </a:lnRef>
+      <a:fillRef idx="1">
+        <a:scrgbClr r="0" g="0" b="0"/>
+      </a:fillRef>
+      <a:effectRef idx="0">
+        <a:scrgbClr r="0" g="0" b="0"/>
+      </a:effectRef>
+      <a:fontRef idx="minor"/>
+    </dgm:style>
+  </dgm:styleLbl>
+  <dgm:styleLbl name="bgAccFollowNode1">
+    <dgm:scene3d>
+      <a:camera prst="orthographicFront"/>
+      <a:lightRig rig="threePt" dir="t"/>
+    </dgm:scene3d>
+    <dgm:sp3d/>
+    <dgm:txPr/>
+    <dgm:style>
+      <a:lnRef idx="2">
+        <a:scrgbClr r="0" g="0" b="0"/>
+      </a:lnRef>
+      <a:fillRef idx="1">
+        <a:scrgbClr r="0" g="0" b="0"/>
+      </a:fillRef>
+      <a:effectRef idx="0">
+        <a:scrgbClr r="0" g="0" b="0"/>
+      </a:effectRef>
+      <a:fontRef idx="minor"/>
+    </dgm:style>
+  </dgm:styleLbl>
+  <dgm:styleLbl name="fgAcc0">
+    <dgm:scene3d>
+      <a:camera prst="orthographicFront"/>
+      <a:lightRig rig="threePt" dir="t"/>
+    </dgm:scene3d>
+    <dgm:sp3d/>
+    <dgm:txPr/>
+    <dgm:style>
+      <a:lnRef idx="2">
+        <a:scrgbClr r="0" g="0" b="0"/>
+      </a:lnRef>
+      <a:fillRef idx="1">
+        <a:scrgbClr r="0" g="0" b="0"/>
+      </a:fillRef>
+      <a:effectRef idx="0">
+        <a:scrgbClr r="0" g="0" b="0"/>
+      </a:effectRef>
+      <a:fontRef idx="minor"/>
+    </dgm:style>
+  </dgm:styleLbl>
+  <dgm:styleLbl name="fgAcc2">
+    <dgm:scene3d>
+      <a:camera prst="orthographicFront"/>
+      <a:lightRig rig="threePt" dir="t"/>
+    </dgm:scene3d>
+    <dgm:sp3d/>
+    <dgm:txPr/>
+    <dgm:style>
+      <a:lnRef idx="2">
+        <a:scrgbClr r="0" g="0" b="0"/>
+      </a:lnRef>
+      <a:fillRef idx="1">
+        <a:scrgbClr r="0" g="0" b="0"/>
+      </a:fillRef>
+      <a:effectRef idx="0">
+        <a:scrgbClr r="0" g="0" b="0"/>
+      </a:effectRef>
+      <a:fontRef idx="minor"/>
+    </dgm:style>
+  </dgm:styleLbl>
+  <dgm:styleLbl name="fgAcc3">
+    <dgm:scene3d>
+      <a:camera prst="orthographicFront"/>
+      <a:lightRig rig="threePt" dir="t"/>
+    </dgm:scene3d>
+    <dgm:sp3d/>
+    <dgm:txPr/>
+    <dgm:style>
+      <a:lnRef idx="2">
+        <a:scrgbClr r="0" g="0" b="0"/>
+      </a:lnRef>
+      <a:fillRef idx="1">
+        <a:scrgbClr r="0" g="0" b="0"/>
+      </a:fillRef>
+      <a:effectRef idx="0">
+        <a:scrgbClr r="0" g="0" b="0"/>
+      </a:effectRef>
+      <a:fontRef idx="minor"/>
+    </dgm:style>
+  </dgm:styleLbl>
+  <dgm:styleLbl name="fgAcc4">
+    <dgm:scene3d>
+      <a:camera prst="orthographicFront"/>
+      <a:lightRig rig="threePt" dir="t"/>
+    </dgm:scene3d>
+    <dgm:sp3d/>
+    <dgm:txPr/>
+    <dgm:style>
+      <a:lnRef idx="2">
+        <a:scrgbClr r="0" g="0" b="0"/>
+      </a:lnRef>
+      <a:fillRef idx="1">
+        <a:scrgbClr r="0" g="0" b="0"/>
+      </a:fillRef>
+      <a:effectRef idx="0">
+        <a:scrgbClr r="0" g="0" b="0"/>
+      </a:effectRef>
+      <a:fontRef idx="minor"/>
+    </dgm:style>
+  </dgm:styleLbl>
+  <dgm:styleLbl name="bgShp">
+    <dgm:scene3d>
+      <a:camera prst="orthographicFront"/>
+      <a:lightRig rig="threePt" dir="t"/>
+    </dgm:scene3d>
+    <dgm:sp3d/>
+    <dgm:txPr/>
+    <dgm:style>
+      <a:lnRef idx="0">
+        <a:scrgbClr r="0" g="0" b="0"/>
+      </a:lnRef>
+      <a:fillRef idx="1">
+        <a:scrgbClr r="0" g="0" b="0"/>
+      </a:fillRef>
+      <a:effectRef idx="0">
+        <a:scrgbClr r="0" g="0" b="0"/>
+      </a:effectRef>
+      <a:fontRef idx="minor"/>
+    </dgm:style>
+  </dgm:styleLbl>
+  <dgm:styleLbl name="dkBgShp">
+    <dgm:scene3d>
+      <a:camera prst="orthographicFront"/>
+      <a:lightRig rig="threePt" dir="t"/>
+    </dgm:scene3d>
+    <dgm:sp3d/>
+    <dgm:txPr/>
+    <dgm:style>
+      <a:lnRef idx="0">
+        <a:scrgbClr r="0" g="0" b="0"/>
+      </a:lnRef>
+      <a:fillRef idx="1">
+        <a:scrgbClr r="0" g="0" b="0"/>
+      </a:fillRef>
+      <a:effectRef idx="0">
+        <a:scrgbClr r="0" g="0" b="0"/>
+      </a:effectRef>
+      <a:fontRef idx="minor"/>
+    </dgm:style>
+  </dgm:styleLbl>
+  <dgm:styleLbl name="trBgShp">
+    <dgm:scene3d>
+      <a:camera prst="orthographicFront"/>
+      <a:lightRig rig="threePt" dir="t"/>
+    </dgm:scene3d>
+    <dgm:sp3d/>
+    <dgm:txPr/>
+    <dgm:style>
+      <a:lnRef idx="0">
+        <a:scrgbClr r="0" g="0" b="0"/>
+      </a:lnRef>
+      <a:fillRef idx="1">
+        <a:scrgbClr r="0" g="0" b="0"/>
+      </a:fillRef>
+      <a:effectRef idx="0">
+        <a:scrgbClr r="0" g="0" b="0"/>
+      </a:effectRef>
+      <a:fontRef idx="minor"/>
+    </dgm:style>
+  </dgm:styleLbl>
+  <dgm:styleLbl name="fgShp">
+    <dgm:scene3d>
+      <a:camera prst="orthographicFront"/>
+      <a:lightRig rig="threePt" dir="t"/>
+    </dgm:scene3d>
+    <dgm:sp3d/>
+    <dgm:txPr/>
+    <dgm:style>
+      <a:lnRef idx="2">
+        <a:scrgbClr r="0" g="0" b="0"/>
+      </a:lnRef>
+      <a:fillRef idx="1">
+        <a:scrgbClr r="0" g="0" b="0"/>
+      </a:fillRef>
+      <a:effectRef idx="0">
+        <a:scrgbClr r="0" g="0" b="0"/>
+      </a:effectRef>
+      <a:fontRef idx="minor"/>
+    </dgm:style>
+  </dgm:styleLbl>
+  <dgm:styleLbl name="revTx">
+    <dgm:scene3d>
+      <a:camera prst="orthographicFront"/>
+      <a:lightRig rig="threePt" dir="t"/>
+    </dgm:scene3d>
+    <dgm:sp3d/>
+    <dgm:txPr/>
+    <dgm:style>
+      <a:lnRef idx="0">
+        <a:scrgbClr r="0" g="0" b="0"/>
+      </a:lnRef>
+      <a:fillRef idx="0">
+        <a:scrgbClr r="0" g="0" b="0"/>
+      </a:fillRef>
+      <a:effectRef idx="0">
+        <a:scrgbClr r="0" g="0" b="0"/>
+      </a:effectRef>
+      <a:fontRef idx="minor"/>
+    </dgm:style>
+  </dgm:styleLbl>
+</dgm:styleDef>
+</file>
+
+<file path=ppt/diagrams/quickStyle3.xml><?xml version="1.0" encoding="utf-8"?>
 <dgm:styleDef xmlns:dgm="http://schemas.openxmlformats.org/drawingml/2006/diagram" xmlns:a="http://schemas.openxmlformats.org/drawingml/2006/main" uniqueId="urn:microsoft.com/office/officeart/2005/8/quickstyle/simple1">
   <dgm:title val=""/>
   <dgm:desc val=""/>
@@ -12278,11 +14817,7 @@
           <a:p>
             <a:r>
               <a:rPr lang="pt-BR" dirty="0" smtClean="0"/>
-              <a:t>Compiladores – </a:t>
-            </a:r>
-            <a:r>
-              <a:rPr lang="pt-BR" dirty="0" smtClean="0"/>
-              <a:t>Java2c</a:t>
+              <a:t>Compiladores – Java2c</a:t>
             </a:r>
             <a:endParaRPr lang="pt-BR" dirty="0"/>
           </a:p>
@@ -12311,85 +14846,6 @@
     <p:extLst>
       <p:ext uri="{BB962C8B-B14F-4D97-AF65-F5344CB8AC3E}">
         <p14:creationId xmlns:p14="http://schemas.microsoft.com/office/powerpoint/2010/main" val="3223615608"/>
-      </p:ext>
-    </p:extLst>
-  </p:cSld>
-  <p:clrMapOvr>
-    <a:masterClrMapping/>
-  </p:clrMapOvr>
-  <p:timing>
-    <p:tnLst>
-      <p:par>
-        <p:cTn id="1" dur="indefinite" restart="never" nodeType="tmRoot"/>
-      </p:par>
-    </p:tnLst>
-  </p:timing>
-</p:sld>
-</file>
-
-<file path=ppt/slides/slide10.xml><?xml version="1.0" encoding="utf-8"?>
-<p:sld xmlns:a="http://schemas.openxmlformats.org/drawingml/2006/main" xmlns:r="http://schemas.openxmlformats.org/officeDocument/2006/relationships" xmlns:p="http://schemas.openxmlformats.org/presentationml/2006/main">
-  <p:cSld>
-    <p:spTree>
-      <p:nvGrpSpPr>
-        <p:cNvPr id="1" name=""/>
-        <p:cNvGrpSpPr/>
-        <p:nvPr/>
-      </p:nvGrpSpPr>
-      <p:grpSpPr>
-        <a:xfrm>
-          <a:off x="0" y="0"/>
-          <a:ext cx="0" cy="0"/>
-          <a:chOff x="0" y="0"/>
-          <a:chExt cx="0" cy="0"/>
-        </a:xfrm>
-      </p:grpSpPr>
-      <p:sp>
-        <p:nvSpPr>
-          <p:cNvPr id="4" name="Título 3"/>
-          <p:cNvSpPr>
-            <a:spLocks noGrp="1"/>
-          </p:cNvSpPr>
-          <p:nvPr>
-            <p:ph type="ctrTitle"/>
-          </p:nvPr>
-        </p:nvSpPr>
-        <p:spPr/>
-        <p:txBody>
-          <a:bodyPr/>
-          <a:lstStyle/>
-          <a:p>
-            <a:r>
-              <a:rPr lang="pt-BR" dirty="0" smtClean="0"/>
-              <a:t>Obrigado</a:t>
-            </a:r>
-            <a:endParaRPr lang="pt-BR" dirty="0"/>
-          </a:p>
-        </p:txBody>
-      </p:sp>
-      <p:sp>
-        <p:nvSpPr>
-          <p:cNvPr id="5" name="Subtítulo 4"/>
-          <p:cNvSpPr>
-            <a:spLocks noGrp="1"/>
-          </p:cNvSpPr>
-          <p:nvPr>
-            <p:ph type="subTitle" idx="1"/>
-          </p:nvPr>
-        </p:nvSpPr>
-        <p:spPr/>
-        <p:txBody>
-          <a:bodyPr/>
-          <a:lstStyle/>
-          <a:p>
-            <a:endParaRPr lang="pt-BR" dirty="0"/>
-          </a:p>
-        </p:txBody>
-      </p:sp>
-    </p:spTree>
-    <p:extLst>
-      <p:ext uri="{BB962C8B-B14F-4D97-AF65-F5344CB8AC3E}">
-        <p14:creationId xmlns:p14="http://schemas.microsoft.com/office/powerpoint/2010/main" val="4148996968"/>
       </p:ext>
     </p:extLst>
   </p:cSld>
@@ -12862,7 +15318,7 @@
             <p:ph idx="1"/>
             <p:extLst>
               <p:ext uri="{D42A27DB-BD31-4B8C-83A1-F6EECF244321}">
-                <p14:modId xmlns:p14="http://schemas.microsoft.com/office/powerpoint/2010/main" val="1358224155"/>
+                <p14:modId xmlns:p14="http://schemas.microsoft.com/office/powerpoint/2010/main" val="1362543552"/>
               </p:ext>
             </p:extLst>
           </p:nvPr>
@@ -12937,25 +15393,31 @@
           </a:p>
         </p:txBody>
       </p:sp>
-      <p:sp>
-        <p:nvSpPr>
-          <p:cNvPr id="3" name="Espaço Reservado para Conteúdo 2"/>
-          <p:cNvSpPr>
-            <a:spLocks noGrp="1"/>
-          </p:cNvSpPr>
+      <p:graphicFrame>
+        <p:nvGraphicFramePr>
+          <p:cNvPr id="4" name="Espaço Reservado para Conteúdo 3"/>
+          <p:cNvGraphicFramePr>
+            <a:graphicFrameLocks noGrp="1"/>
+          </p:cNvGraphicFramePr>
           <p:nvPr>
             <p:ph idx="1"/>
+            <p:extLst>
+              <p:ext uri="{D42A27DB-BD31-4B8C-83A1-F6EECF244321}">
+                <p14:modId xmlns:p14="http://schemas.microsoft.com/office/powerpoint/2010/main" val="3830087008"/>
+              </p:ext>
+            </p:extLst>
           </p:nvPr>
-        </p:nvSpPr>
-        <p:spPr/>
-        <p:txBody>
-          <a:bodyPr/>
-          <a:lstStyle/>
-          <a:p>
-            <a:endParaRPr lang="pt-BR"/>
-          </a:p>
-        </p:txBody>
-      </p:sp>
+        </p:nvGraphicFramePr>
+        <p:xfrm>
+          <a:off x="677863" y="2160588"/>
+          <a:ext cx="8596312" cy="3881437"/>
+        </p:xfrm>
+        <a:graphic>
+          <a:graphicData uri="http://schemas.openxmlformats.org/drawingml/2006/diagram">
+            <dgm:relIds xmlns:dgm="http://schemas.openxmlformats.org/drawingml/2006/diagram" xmlns:r="http://schemas.openxmlformats.org/officeDocument/2006/relationships" r:dm="rId2" r:lo="rId3" r:qs="rId4" r:cs="rId5"/>
+          </a:graphicData>
+        </a:graphic>
+      </p:graphicFrame>
     </p:spTree>
     <p:extLst>
       <p:ext uri="{BB962C8B-B14F-4D97-AF65-F5344CB8AC3E}">
@@ -12966,6 +15428,13 @@
   <p:clrMapOvr>
     <a:masterClrMapping/>
   </p:clrMapOvr>
+  <p:timing>
+    <p:tnLst>
+      <p:par>
+        <p:cTn id="1" dur="indefinite" restart="never" nodeType="tmRoot"/>
+      </p:par>
+    </p:tnLst>
+  </p:timing>
 </p:sld>
 </file>
 
@@ -13002,1182 +15471,574 @@
           <a:lstStyle/>
           <a:p>
             <a:r>
-              <a:rPr lang="pt-BR" dirty="0" smtClean="0"/>
-              <a:t>Detalhamento do Escopo</a:t>
+              <a:rPr lang="pt-BR" dirty="0" err="1" smtClean="0"/>
+              <a:t>Tokens</a:t>
             </a:r>
+            <a:endParaRPr lang="pt-BR" dirty="0"/>
+          </a:p>
+        </p:txBody>
+      </p:sp>
+      <p:sp>
+        <p:nvSpPr>
+          <p:cNvPr id="3" name="Espaço Reservado para Conteúdo 2"/>
+          <p:cNvSpPr>
+            <a:spLocks noGrp="1"/>
+          </p:cNvSpPr>
+          <p:nvPr>
+            <p:ph idx="1"/>
+          </p:nvPr>
+        </p:nvSpPr>
+        <p:spPr/>
+        <p:txBody>
+          <a:bodyPr>
+            <a:normAutofit/>
+          </a:bodyPr>
+          <a:lstStyle/>
+          <a:p>
             <a:endParaRPr lang="pt-BR" dirty="0"/>
           </a:p>
         </p:txBody>
       </p:sp>
       <p:graphicFrame>
         <p:nvGraphicFramePr>
-          <p:cNvPr id="4" name="Espaço Reservado para Conteúdo 3"/>
+          <p:cNvPr id="5" name="Tabela 4"/>
           <p:cNvGraphicFramePr>
             <a:graphicFrameLocks noGrp="1"/>
           </p:cNvGraphicFramePr>
           <p:nvPr>
-            <p:ph idx="1"/>
             <p:extLst>
               <p:ext uri="{D42A27DB-BD31-4B8C-83A1-F6EECF244321}">
-                <p14:modId xmlns:p14="http://schemas.microsoft.com/office/powerpoint/2010/main" val="3125062879"/>
+                <p14:modId xmlns:p14="http://schemas.microsoft.com/office/powerpoint/2010/main" val="1248100432"/>
               </p:ext>
             </p:extLst>
           </p:nvPr>
         </p:nvGraphicFramePr>
         <p:xfrm>
-          <a:off x="510269" y="1222021"/>
-          <a:ext cx="8763732" cy="5547960"/>
+          <a:off x="525172" y="1363610"/>
+          <a:ext cx="8876406" cy="5242224"/>
         </p:xfrm>
         <a:graphic>
           <a:graphicData uri="http://schemas.openxmlformats.org/drawingml/2006/table">
             <a:tbl>
-              <a:tblPr>
+              <a:tblPr firstRow="1" bandRow="1">
                 <a:tableStyleId>{5C22544A-7EE6-4342-B048-85BDC9FD1C3A}</a:tableStyleId>
               </a:tblPr>
               <a:tblGrid>
-                <a:gridCol w="2921244"/>
-                <a:gridCol w="2921244"/>
-                <a:gridCol w="2921244"/>
+                <a:gridCol w="2958802"/>
+                <a:gridCol w="2958802"/>
+                <a:gridCol w="2958802"/>
               </a:tblGrid>
-              <a:tr h="435558">
+              <a:tr h="436852">
                 <a:tc>
                   <a:txBody>
                     <a:bodyPr/>
                     <a:lstStyle/>
                     <a:p>
-                      <a:pPr>
-                        <a:lnSpc>
-                          <a:spcPct val="115000"/>
-                        </a:lnSpc>
-                        <a:spcAft>
-                          <a:spcPts val="0"/>
-                        </a:spcAft>
-                      </a:pPr>
-                      <a:r>
-                        <a:rPr lang="pt-BR" sz="1600" b="1" dirty="0">
-                          <a:effectLst/>
-                        </a:rPr>
-                        <a:t>Atividade</a:t>
-                      </a:r>
-                      <a:endParaRPr lang="pt-BR" sz="1600" b="1" dirty="0">
-                        <a:solidFill>
-                          <a:srgbClr val="000000"/>
-                        </a:solidFill>
-                        <a:effectLst/>
-                        <a:latin typeface="Arial" panose="020B0604020202020204" pitchFamily="34" charset="0"/>
-                        <a:ea typeface="Arial" panose="020B0604020202020204" pitchFamily="34" charset="0"/>
-                        <a:cs typeface="Times New Roman" panose="02020603050405020304" pitchFamily="18" charset="0"/>
-                      </a:endParaRPr>
+                      <a:endParaRPr lang="pt-BR" dirty="0"/>
                     </a:p>
                   </a:txBody>
-                  <a:tcPr marL="63500" marR="63500" marT="63500" marB="63500"/>
+                  <a:tcPr/>
                 </a:tc>
                 <a:tc>
                   <a:txBody>
                     <a:bodyPr/>
                     <a:lstStyle/>
                     <a:p>
-                      <a:pPr algn="ctr">
-                        <a:lnSpc>
-                          <a:spcPct val="115000"/>
-                        </a:lnSpc>
-                        <a:spcAft>
-                          <a:spcPts val="0"/>
-                        </a:spcAft>
-                      </a:pPr>
-                      <a:r>
-                        <a:rPr lang="pt-BR" sz="1600" b="1" dirty="0">
-                          <a:effectLst/>
-                        </a:rPr>
-                        <a:t>Data Início</a:t>
-                      </a:r>
-                      <a:endParaRPr lang="pt-BR" sz="1600" b="1" dirty="0">
-                        <a:solidFill>
-                          <a:srgbClr val="000000"/>
-                        </a:solidFill>
-                        <a:effectLst/>
-                        <a:latin typeface="Arial" panose="020B0604020202020204" pitchFamily="34" charset="0"/>
-                        <a:ea typeface="Arial" panose="020B0604020202020204" pitchFamily="34" charset="0"/>
-                        <a:cs typeface="Times New Roman" panose="02020603050405020304" pitchFamily="18" charset="0"/>
-                      </a:endParaRPr>
+                      <a:endParaRPr lang="pt-BR" dirty="0"/>
                     </a:p>
                   </a:txBody>
-                  <a:tcPr marL="63500" marR="63500" marT="63500" marB="63500"/>
+                  <a:tcPr/>
                 </a:tc>
                 <a:tc>
                   <a:txBody>
                     <a:bodyPr/>
                     <a:lstStyle/>
                     <a:p>
-                      <a:pPr algn="ctr">
-                        <a:lnSpc>
-                          <a:spcPct val="115000"/>
-                        </a:lnSpc>
-                        <a:spcAft>
-                          <a:spcPts val="0"/>
-                        </a:spcAft>
-                      </a:pPr>
-                      <a:r>
-                        <a:rPr lang="pt-BR" sz="1600" b="1" dirty="0">
-                          <a:effectLst/>
-                        </a:rPr>
-                        <a:t>Data Fim</a:t>
-                      </a:r>
-                      <a:endParaRPr lang="pt-BR" sz="1600" b="1" dirty="0">
-                        <a:solidFill>
-                          <a:srgbClr val="000000"/>
-                        </a:solidFill>
-                        <a:effectLst/>
-                        <a:latin typeface="Arial" panose="020B0604020202020204" pitchFamily="34" charset="0"/>
-                        <a:ea typeface="Arial" panose="020B0604020202020204" pitchFamily="34" charset="0"/>
-                        <a:cs typeface="Times New Roman" panose="02020603050405020304" pitchFamily="18" charset="0"/>
-                      </a:endParaRPr>
+                      <a:endParaRPr lang="pt-BR"/>
                     </a:p>
                   </a:txBody>
-                  <a:tcPr marL="63500" marR="63500" marT="63500" marB="63500"/>
+                  <a:tcPr/>
                 </a:tc>
               </a:tr>
-              <a:tr h="435558">
+              <a:tr h="436852">
                 <a:tc>
                   <a:txBody>
                     <a:bodyPr/>
                     <a:lstStyle/>
                     <a:p>
-                      <a:pPr>
-                        <a:lnSpc>
-                          <a:spcPct val="115000"/>
-                        </a:lnSpc>
-                        <a:spcAft>
-                          <a:spcPts val="0"/>
-                        </a:spcAft>
-                      </a:pPr>
                       <a:r>
-                        <a:rPr lang="pt-BR" sz="1600" b="1">
-                          <a:effectLst/>
-                        </a:rPr>
-                        <a:t>Definir Escopo</a:t>
+                        <a:rPr lang="pt-BR" dirty="0" err="1" smtClean="0"/>
+                        <a:t>Int</a:t>
                       </a:r>
-                      <a:endParaRPr lang="pt-BR" sz="1600" b="1">
-                        <a:solidFill>
-                          <a:srgbClr val="000000"/>
-                        </a:solidFill>
-                        <a:effectLst/>
-                        <a:latin typeface="Arial" panose="020B0604020202020204" pitchFamily="34" charset="0"/>
-                        <a:ea typeface="Arial" panose="020B0604020202020204" pitchFamily="34" charset="0"/>
-                        <a:cs typeface="Times New Roman" panose="02020603050405020304" pitchFamily="18" charset="0"/>
-                      </a:endParaRPr>
+                      <a:endParaRPr lang="pt-BR" dirty="0"/>
                     </a:p>
                   </a:txBody>
-                  <a:tcPr marL="63500" marR="63500" marT="63500" marB="63500"/>
+                  <a:tcPr/>
                 </a:tc>
                 <a:tc>
                   <a:txBody>
                     <a:bodyPr/>
                     <a:lstStyle/>
                     <a:p>
-                      <a:pPr algn="ctr">
-                        <a:lnSpc>
-                          <a:spcPct val="115000"/>
-                        </a:lnSpc>
-                        <a:spcAft>
-                          <a:spcPts val="0"/>
-                        </a:spcAft>
-                      </a:pPr>
                       <a:r>
-                        <a:rPr lang="pt-BR" sz="1600">
-                          <a:effectLst/>
-                        </a:rPr>
-                        <a:t>28/08/2013</a:t>
+                        <a:rPr lang="pt-BR" dirty="0" smtClean="0"/>
+                        <a:t>Do</a:t>
                       </a:r>
-                      <a:endParaRPr lang="pt-BR" sz="1600">
-                        <a:solidFill>
-                          <a:srgbClr val="000000"/>
-                        </a:solidFill>
-                        <a:effectLst/>
-                        <a:latin typeface="Arial" panose="020B0604020202020204" pitchFamily="34" charset="0"/>
-                        <a:ea typeface="Arial" panose="020B0604020202020204" pitchFamily="34" charset="0"/>
-                        <a:cs typeface="Times New Roman" panose="02020603050405020304" pitchFamily="18" charset="0"/>
-                      </a:endParaRPr>
+                      <a:endParaRPr lang="pt-BR" dirty="0"/>
                     </a:p>
                   </a:txBody>
-                  <a:tcPr marL="63500" marR="63500" marT="63500" marB="63500"/>
+                  <a:tcPr/>
                 </a:tc>
                 <a:tc>
                   <a:txBody>
                     <a:bodyPr/>
                     <a:lstStyle/>
                     <a:p>
-                      <a:pPr algn="ctr">
-                        <a:lnSpc>
-                          <a:spcPct val="115000"/>
-                        </a:lnSpc>
-                        <a:spcAft>
-                          <a:spcPts val="0"/>
-                        </a:spcAft>
-                      </a:pPr>
                       <a:r>
-                        <a:rPr lang="pt-BR" sz="1600">
-                          <a:effectLst/>
-                        </a:rPr>
-                        <a:t>28/08/2013</a:t>
+                        <a:rPr lang="en-US" dirty="0" smtClean="0"/>
+                        <a:t>CLASSPATH</a:t>
                       </a:r>
-                      <a:endParaRPr lang="pt-BR" sz="1600">
-                        <a:solidFill>
-                          <a:srgbClr val="000000"/>
-                        </a:solidFill>
-                        <a:effectLst/>
-                        <a:latin typeface="Arial" panose="020B0604020202020204" pitchFamily="34" charset="0"/>
-                        <a:ea typeface="Arial" panose="020B0604020202020204" pitchFamily="34" charset="0"/>
-                        <a:cs typeface="Times New Roman" panose="02020603050405020304" pitchFamily="18" charset="0"/>
-                      </a:endParaRPr>
                     </a:p>
                   </a:txBody>
-                  <a:tcPr marL="63500" marR="63500" marT="63500" marB="63500"/>
+                  <a:tcPr/>
                 </a:tc>
               </a:tr>
-              <a:tr h="435558">
+              <a:tr h="436852">
                 <a:tc>
                   <a:txBody>
                     <a:bodyPr/>
                     <a:lstStyle/>
                     <a:p>
-                      <a:pPr>
-                        <a:lnSpc>
-                          <a:spcPct val="115000"/>
-                        </a:lnSpc>
-                        <a:spcAft>
-                          <a:spcPts val="0"/>
-                        </a:spcAft>
-                      </a:pPr>
                       <a:r>
-                        <a:rPr lang="pt-BR" sz="1600" b="1">
-                          <a:effectLst/>
-                        </a:rPr>
-                        <a:t>Ambientação com o flex</a:t>
+                        <a:rPr lang="pt-BR" dirty="0" smtClean="0"/>
+                        <a:t>STRING</a:t>
                       </a:r>
-                      <a:endParaRPr lang="pt-BR" sz="1600" b="1">
-                        <a:solidFill>
-                          <a:srgbClr val="000000"/>
-                        </a:solidFill>
-                        <a:effectLst/>
-                        <a:latin typeface="Arial" panose="020B0604020202020204" pitchFamily="34" charset="0"/>
-                        <a:ea typeface="Arial" panose="020B0604020202020204" pitchFamily="34" charset="0"/>
-                        <a:cs typeface="Times New Roman" panose="02020603050405020304" pitchFamily="18" charset="0"/>
-                      </a:endParaRPr>
                     </a:p>
                   </a:txBody>
-                  <a:tcPr marL="63500" marR="63500" marT="63500" marB="63500"/>
+                  <a:tcPr/>
                 </a:tc>
                 <a:tc>
                   <a:txBody>
                     <a:bodyPr/>
                     <a:lstStyle/>
                     <a:p>
-                      <a:pPr algn="ctr">
-                        <a:lnSpc>
-                          <a:spcPct val="115000"/>
-                        </a:lnSpc>
-                        <a:spcAft>
-                          <a:spcPts val="0"/>
-                        </a:spcAft>
-                      </a:pPr>
                       <a:r>
-                        <a:rPr lang="pt-BR" sz="1600">
-                          <a:effectLst/>
-                        </a:rPr>
-                        <a:t>29/08/2013</a:t>
+                        <a:rPr lang="pt-BR" dirty="0" err="1" smtClean="0"/>
+                        <a:t>While</a:t>
                       </a:r>
-                      <a:endParaRPr lang="pt-BR" sz="1600">
-                        <a:solidFill>
-                          <a:srgbClr val="000000"/>
-                        </a:solidFill>
-                        <a:effectLst/>
-                        <a:latin typeface="Arial" panose="020B0604020202020204" pitchFamily="34" charset="0"/>
-                        <a:ea typeface="Arial" panose="020B0604020202020204" pitchFamily="34" charset="0"/>
-                        <a:cs typeface="Times New Roman" panose="02020603050405020304" pitchFamily="18" charset="0"/>
-                      </a:endParaRPr>
+                      <a:endParaRPr lang="pt-BR" dirty="0"/>
                     </a:p>
                   </a:txBody>
-                  <a:tcPr marL="63500" marR="63500" marT="63500" marB="63500"/>
+                  <a:tcPr/>
                 </a:tc>
                 <a:tc>
                   <a:txBody>
                     <a:bodyPr/>
                     <a:lstStyle/>
                     <a:p>
-                      <a:pPr algn="ctr">
-                        <a:lnSpc>
-                          <a:spcPct val="115000"/>
-                        </a:lnSpc>
-                        <a:spcAft>
-                          <a:spcPts val="0"/>
-                        </a:spcAft>
-                      </a:pPr>
                       <a:r>
-                        <a:rPr lang="pt-BR" sz="1600">
-                          <a:effectLst/>
-                        </a:rPr>
-                        <a:t>02/09/2013</a:t>
+                        <a:rPr lang="pt-BR" dirty="0" smtClean="0"/>
+                        <a:t>PARAMETER</a:t>
                       </a:r>
-                      <a:endParaRPr lang="pt-BR" sz="1600">
-                        <a:solidFill>
-                          <a:srgbClr val="000000"/>
-                        </a:solidFill>
-                        <a:effectLst/>
-                        <a:latin typeface="Arial" panose="020B0604020202020204" pitchFamily="34" charset="0"/>
-                        <a:ea typeface="Arial" panose="020B0604020202020204" pitchFamily="34" charset="0"/>
-                        <a:cs typeface="Times New Roman" panose="02020603050405020304" pitchFamily="18" charset="0"/>
-                      </a:endParaRPr>
+                      <a:endParaRPr lang="pt-BR" dirty="0"/>
                     </a:p>
                   </a:txBody>
-                  <a:tcPr marL="63500" marR="63500" marT="63500" marB="63500"/>
+                  <a:tcPr/>
                 </a:tc>
               </a:tr>
-              <a:tr h="435558">
+              <a:tr h="436852">
                 <a:tc>
                   <a:txBody>
                     <a:bodyPr/>
                     <a:lstStyle/>
                     <a:p>
-                      <a:pPr>
-                        <a:lnSpc>
-                          <a:spcPct val="115000"/>
-                        </a:lnSpc>
-                        <a:spcAft>
-                          <a:spcPts val="0"/>
-                        </a:spcAft>
-                      </a:pPr>
                       <a:r>
-                        <a:rPr lang="pt-BR" sz="1600" b="1" dirty="0">
-                          <a:effectLst/>
-                        </a:rPr>
-                        <a:t>Ambientação com o </a:t>
+                        <a:rPr lang="pt-BR" dirty="0" smtClean="0"/>
+                        <a:t>Char</a:t>
                       </a:r>
-                      <a:r>
-                        <a:rPr lang="pt-BR" sz="1600" b="1" dirty="0" err="1">
-                          <a:effectLst/>
-                        </a:rPr>
-                        <a:t>bison</a:t>
-                      </a:r>
-                      <a:endParaRPr lang="pt-BR" sz="1600" b="1" dirty="0">
-                        <a:solidFill>
-                          <a:srgbClr val="000000"/>
-                        </a:solidFill>
-                        <a:effectLst/>
-                        <a:latin typeface="Arial" panose="020B0604020202020204" pitchFamily="34" charset="0"/>
-                        <a:ea typeface="Arial" panose="020B0604020202020204" pitchFamily="34" charset="0"/>
-                        <a:cs typeface="Times New Roman" panose="02020603050405020304" pitchFamily="18" charset="0"/>
-                      </a:endParaRPr>
                     </a:p>
                   </a:txBody>
-                  <a:tcPr marL="63500" marR="63500" marT="63500" marB="63500"/>
+                  <a:tcPr/>
                 </a:tc>
                 <a:tc>
                   <a:txBody>
                     <a:bodyPr/>
                     <a:lstStyle/>
                     <a:p>
-                      <a:pPr algn="ctr">
-                        <a:lnSpc>
-                          <a:spcPct val="115000"/>
-                        </a:lnSpc>
-                        <a:spcAft>
-                          <a:spcPts val="0"/>
-                        </a:spcAft>
-                      </a:pPr>
                       <a:r>
-                        <a:rPr lang="pt-BR" sz="1600">
-                          <a:effectLst/>
-                        </a:rPr>
-                        <a:t>03/09/2013</a:t>
+                        <a:rPr lang="pt-BR" dirty="0" err="1" smtClean="0"/>
+                        <a:t>return</a:t>
                       </a:r>
-                      <a:endParaRPr lang="pt-BR" sz="1600">
-                        <a:solidFill>
-                          <a:srgbClr val="000000"/>
-                        </a:solidFill>
-                        <a:effectLst/>
-                        <a:latin typeface="Arial" panose="020B0604020202020204" pitchFamily="34" charset="0"/>
-                        <a:ea typeface="Arial" panose="020B0604020202020204" pitchFamily="34" charset="0"/>
-                        <a:cs typeface="Times New Roman" panose="02020603050405020304" pitchFamily="18" charset="0"/>
-                      </a:endParaRPr>
+                      <a:endParaRPr lang="pt-BR" dirty="0"/>
                     </a:p>
                   </a:txBody>
-                  <a:tcPr marL="63500" marR="63500" marT="63500" marB="63500"/>
+                  <a:tcPr/>
                 </a:tc>
                 <a:tc>
                   <a:txBody>
                     <a:bodyPr/>
                     <a:lstStyle/>
                     <a:p>
-                      <a:pPr algn="ctr">
-                        <a:lnSpc>
-                          <a:spcPct val="115000"/>
-                        </a:lnSpc>
-                        <a:spcAft>
-                          <a:spcPts val="0"/>
-                        </a:spcAft>
-                      </a:pPr>
                       <a:r>
-                        <a:rPr lang="pt-BR" sz="1600">
-                          <a:effectLst/>
-                        </a:rPr>
-                        <a:t>04/09/2013</a:t>
+                        <a:rPr lang="pt-BR" dirty="0" smtClean="0"/>
+                        <a:t>,</a:t>
                       </a:r>
-                      <a:endParaRPr lang="pt-BR" sz="1600">
-                        <a:solidFill>
-                          <a:srgbClr val="000000"/>
-                        </a:solidFill>
-                        <a:effectLst/>
-                        <a:latin typeface="Arial" panose="020B0604020202020204" pitchFamily="34" charset="0"/>
-                        <a:ea typeface="Arial" panose="020B0604020202020204" pitchFamily="34" charset="0"/>
-                        <a:cs typeface="Times New Roman" panose="02020603050405020304" pitchFamily="18" charset="0"/>
-                      </a:endParaRPr>
+                      <a:endParaRPr lang="pt-BR" dirty="0"/>
                     </a:p>
                   </a:txBody>
-                  <a:tcPr marL="63500" marR="63500" marT="63500" marB="63500"/>
+                  <a:tcPr/>
                 </a:tc>
               </a:tr>
-              <a:tr h="624874">
+              <a:tr h="436852">
                 <a:tc>
                   <a:txBody>
                     <a:bodyPr/>
                     <a:lstStyle/>
                     <a:p>
-                      <a:pPr>
-                        <a:lnSpc>
-                          <a:spcPct val="115000"/>
-                        </a:lnSpc>
-                        <a:spcAft>
-                          <a:spcPts val="0"/>
-                        </a:spcAft>
-                      </a:pPr>
                       <a:r>
-                        <a:rPr lang="pt-BR" sz="1600" b="1" dirty="0">
-                          <a:effectLst/>
-                        </a:rPr>
-                        <a:t>Entrega 01</a:t>
+                        <a:rPr lang="pt-BR" dirty="0" err="1" smtClean="0"/>
+                        <a:t>Boolean</a:t>
                       </a:r>
-                      <a:endParaRPr lang="pt-BR" sz="1600" b="1" dirty="0">
-                        <a:solidFill>
-                          <a:srgbClr val="000000"/>
-                        </a:solidFill>
-                        <a:effectLst/>
-                        <a:latin typeface="Arial" panose="020B0604020202020204" pitchFamily="34" charset="0"/>
-                        <a:ea typeface="Arial" panose="020B0604020202020204" pitchFamily="34" charset="0"/>
-                        <a:cs typeface="Times New Roman" panose="02020603050405020304" pitchFamily="18" charset="0"/>
-                      </a:endParaRPr>
+                      <a:endParaRPr lang="pt-BR" dirty="0"/>
                     </a:p>
                   </a:txBody>
-                  <a:tcPr marL="63500" marR="63500" marT="63500" marB="63500"/>
-                </a:tc>
-                <a:tc gridSpan="2">
-                  <a:txBody>
-                    <a:bodyPr/>
-                    <a:lstStyle/>
-                    <a:p>
-                      <a:pPr algn="ctr">
-                        <a:lnSpc>
-                          <a:spcPct val="115000"/>
-                        </a:lnSpc>
-                        <a:spcAft>
-                          <a:spcPts val="0"/>
-                        </a:spcAft>
-                      </a:pPr>
-                      <a:r>
-                        <a:rPr lang="pt-BR" sz="1600" dirty="0">
-                          <a:effectLst/>
-                        </a:rPr>
-                        <a:t>05/09/2013</a:t>
-                      </a:r>
-                      <a:endParaRPr lang="pt-BR" sz="1600" dirty="0">
-                        <a:solidFill>
-                          <a:srgbClr val="000000"/>
-                        </a:solidFill>
-                        <a:effectLst/>
-                        <a:latin typeface="Arial" panose="020B0604020202020204" pitchFamily="34" charset="0"/>
-                        <a:ea typeface="Arial" panose="020B0604020202020204" pitchFamily="34" charset="0"/>
-                        <a:cs typeface="Times New Roman" panose="02020603050405020304" pitchFamily="18" charset="0"/>
-                      </a:endParaRPr>
-                    </a:p>
-                    <a:p>
-                      <a:pPr algn="ctr">
-                        <a:lnSpc>
-                          <a:spcPct val="115000"/>
-                        </a:lnSpc>
-                        <a:spcAft>
-                          <a:spcPts val="0"/>
-                        </a:spcAft>
-                      </a:pPr>
-                      <a:r>
-                        <a:rPr lang="pt-BR" sz="1600" dirty="0">
-                          <a:effectLst/>
-                        </a:rPr>
-                        <a:t> </a:t>
-                      </a:r>
-                      <a:endParaRPr lang="pt-BR" sz="1600" dirty="0">
-                        <a:solidFill>
-                          <a:srgbClr val="000000"/>
-                        </a:solidFill>
-                        <a:effectLst/>
-                        <a:latin typeface="Arial" panose="020B0604020202020204" pitchFamily="34" charset="0"/>
-                        <a:ea typeface="Arial" panose="020B0604020202020204" pitchFamily="34" charset="0"/>
-                        <a:cs typeface="Times New Roman" panose="02020603050405020304" pitchFamily="18" charset="0"/>
-                      </a:endParaRPr>
-                    </a:p>
-                  </a:txBody>
-                  <a:tcPr marL="63500" marR="63500" marT="63500" marB="63500" anchor="ctr"/>
-                </a:tc>
-                <a:tc hMerge="1">
-                  <a:txBody>
-                    <a:bodyPr/>
-                    <a:lstStyle/>
-                    <a:p>
-                      <a:pPr algn="ctr">
-                        <a:lnSpc>
-                          <a:spcPct val="115000"/>
-                        </a:lnSpc>
-                        <a:spcAft>
-                          <a:spcPts val="0"/>
-                        </a:spcAft>
-                      </a:pPr>
-                      <a:endParaRPr lang="pt-BR" sz="1100" dirty="0">
-                        <a:solidFill>
-                          <a:srgbClr val="000000"/>
-                        </a:solidFill>
-                        <a:effectLst/>
-                        <a:latin typeface="Arial" panose="020B0604020202020204" pitchFamily="34" charset="0"/>
-                        <a:ea typeface="Arial" panose="020B0604020202020204" pitchFamily="34" charset="0"/>
-                        <a:cs typeface="Times New Roman" panose="02020603050405020304" pitchFamily="18" charset="0"/>
-                      </a:endParaRPr>
-                    </a:p>
-                  </a:txBody>
-                  <a:tcPr marL="63500" marR="63500" marT="63500" marB="63500"/>
-                </a:tc>
-              </a:tr>
-              <a:tr h="435558">
-                <a:tc>
-                  <a:txBody>
-                    <a:bodyPr/>
-                    <a:lstStyle/>
-                    <a:p>
-                      <a:pPr>
-                        <a:lnSpc>
-                          <a:spcPct val="115000"/>
-                        </a:lnSpc>
-                        <a:spcAft>
-                          <a:spcPts val="0"/>
-                        </a:spcAft>
-                      </a:pPr>
-                      <a:r>
-                        <a:rPr lang="pt-BR" sz="1600" b="1">
-                          <a:effectLst/>
-                        </a:rPr>
-                        <a:t>Definir expressões regulares</a:t>
-                      </a:r>
-                      <a:endParaRPr lang="pt-BR" sz="1600" b="1">
-                        <a:solidFill>
-                          <a:srgbClr val="000000"/>
-                        </a:solidFill>
-                        <a:effectLst/>
-                        <a:latin typeface="Arial" panose="020B0604020202020204" pitchFamily="34" charset="0"/>
-                        <a:ea typeface="Arial" panose="020B0604020202020204" pitchFamily="34" charset="0"/>
-                        <a:cs typeface="Times New Roman" panose="02020603050405020304" pitchFamily="18" charset="0"/>
-                      </a:endParaRPr>
-                    </a:p>
-                  </a:txBody>
-                  <a:tcPr marL="63500" marR="63500" marT="63500" marB="63500"/>
+                  <a:tcPr/>
                 </a:tc>
                 <a:tc>
                   <a:txBody>
                     <a:bodyPr/>
                     <a:lstStyle/>
                     <a:p>
-                      <a:pPr algn="ctr">
-                        <a:lnSpc>
-                          <a:spcPct val="115000"/>
-                        </a:lnSpc>
-                        <a:spcAft>
-                          <a:spcPts val="0"/>
-                        </a:spcAft>
-                      </a:pPr>
                       <a:r>
-                        <a:rPr lang="pt-BR" sz="1600">
-                          <a:effectLst/>
-                        </a:rPr>
-                        <a:t>09/09/2013</a:t>
+                        <a:rPr lang="pt-BR" dirty="0" smtClean="0"/>
+                        <a:t>for</a:t>
                       </a:r>
-                      <a:endParaRPr lang="pt-BR" sz="1600">
-                        <a:solidFill>
-                          <a:srgbClr val="000000"/>
-                        </a:solidFill>
-                        <a:effectLst/>
-                        <a:latin typeface="Arial" panose="020B0604020202020204" pitchFamily="34" charset="0"/>
-                        <a:ea typeface="Arial" panose="020B0604020202020204" pitchFamily="34" charset="0"/>
-                        <a:cs typeface="Times New Roman" panose="02020603050405020304" pitchFamily="18" charset="0"/>
-                      </a:endParaRPr>
+                      <a:endParaRPr lang="pt-BR" dirty="0"/>
                     </a:p>
                   </a:txBody>
-                  <a:tcPr marL="63500" marR="63500" marT="63500" marB="63500"/>
+                  <a:tcPr/>
                 </a:tc>
                 <a:tc>
                   <a:txBody>
                     <a:bodyPr/>
                     <a:lstStyle/>
                     <a:p>
-                      <a:pPr algn="ctr">
-                        <a:lnSpc>
-                          <a:spcPct val="115000"/>
-                        </a:lnSpc>
-                        <a:spcAft>
-                          <a:spcPts val="0"/>
-                        </a:spcAft>
-                      </a:pPr>
                       <a:r>
-                        <a:rPr lang="pt-BR" sz="1600" dirty="0">
-                          <a:effectLst/>
-                        </a:rPr>
-                        <a:t>24/09/2013</a:t>
+                        <a:rPr lang="pt-BR" dirty="0" smtClean="0"/>
+                        <a:t>.</a:t>
                       </a:r>
-                      <a:endParaRPr lang="pt-BR" sz="1600" dirty="0">
-                        <a:solidFill>
-                          <a:srgbClr val="000000"/>
-                        </a:solidFill>
-                        <a:effectLst/>
-                        <a:latin typeface="Arial" panose="020B0604020202020204" pitchFamily="34" charset="0"/>
-                        <a:ea typeface="Arial" panose="020B0604020202020204" pitchFamily="34" charset="0"/>
-                        <a:cs typeface="Times New Roman" panose="02020603050405020304" pitchFamily="18" charset="0"/>
-                      </a:endParaRPr>
+                      <a:endParaRPr lang="pt-BR" dirty="0"/>
                     </a:p>
                   </a:txBody>
-                  <a:tcPr marL="63500" marR="63500" marT="63500" marB="63500"/>
+                  <a:tcPr/>
                 </a:tc>
               </a:tr>
-              <a:tr h="435558">
+              <a:tr h="436852">
                 <a:tc>
                   <a:txBody>
                     <a:bodyPr/>
                     <a:lstStyle/>
                     <a:p>
-                      <a:pPr>
-                        <a:lnSpc>
-                          <a:spcPct val="115000"/>
-                        </a:lnSpc>
-                        <a:spcAft>
-                          <a:spcPts val="0"/>
-                        </a:spcAft>
-                      </a:pPr>
                       <a:r>
-                        <a:rPr lang="pt-BR" sz="1600" b="1">
-                          <a:effectLst/>
-                        </a:rPr>
-                        <a:t>Gerar tokens</a:t>
+                        <a:rPr lang="pt-BR" dirty="0" smtClean="0"/>
+                        <a:t>Constant</a:t>
                       </a:r>
-                      <a:endParaRPr lang="pt-BR" sz="1600" b="1">
-                        <a:solidFill>
-                          <a:srgbClr val="000000"/>
-                        </a:solidFill>
-                        <a:effectLst/>
-                        <a:latin typeface="Arial" panose="020B0604020202020204" pitchFamily="34" charset="0"/>
-                        <a:ea typeface="Arial" panose="020B0604020202020204" pitchFamily="34" charset="0"/>
-                        <a:cs typeface="Times New Roman" panose="02020603050405020304" pitchFamily="18" charset="0"/>
-                      </a:endParaRPr>
+                      <a:endParaRPr lang="pt-BR" dirty="0"/>
                     </a:p>
                   </a:txBody>
-                  <a:tcPr marL="63500" marR="63500" marT="63500" marB="63500"/>
+                  <a:tcPr/>
                 </a:tc>
                 <a:tc>
                   <a:txBody>
                     <a:bodyPr/>
                     <a:lstStyle/>
                     <a:p>
-                      <a:pPr algn="ctr">
-                        <a:lnSpc>
-                          <a:spcPct val="115000"/>
-                        </a:lnSpc>
-                        <a:spcAft>
-                          <a:spcPts val="0"/>
-                        </a:spcAft>
-                      </a:pPr>
                       <a:r>
-                        <a:rPr lang="pt-BR" sz="1600">
-                          <a:effectLst/>
-                        </a:rPr>
-                        <a:t>25/09/2013</a:t>
+                        <a:rPr lang="pt-BR" dirty="0" smtClean="0"/>
+                        <a:t>System</a:t>
                       </a:r>
-                      <a:endParaRPr lang="pt-BR" sz="1600">
-                        <a:solidFill>
-                          <a:srgbClr val="000000"/>
-                        </a:solidFill>
-                        <a:effectLst/>
-                        <a:latin typeface="Arial" panose="020B0604020202020204" pitchFamily="34" charset="0"/>
-                        <a:ea typeface="Arial" panose="020B0604020202020204" pitchFamily="34" charset="0"/>
-                        <a:cs typeface="Times New Roman" panose="02020603050405020304" pitchFamily="18" charset="0"/>
-                      </a:endParaRPr>
+                      <a:endParaRPr lang="pt-BR" dirty="0"/>
                     </a:p>
                   </a:txBody>
-                  <a:tcPr marL="63500" marR="63500" marT="63500" marB="63500"/>
+                  <a:tcPr/>
                 </a:tc>
                 <a:tc>
                   <a:txBody>
                     <a:bodyPr/>
                     <a:lstStyle/>
                     <a:p>
-                      <a:pPr algn="ctr">
-                        <a:lnSpc>
-                          <a:spcPct val="115000"/>
-                        </a:lnSpc>
-                        <a:spcAft>
-                          <a:spcPts val="0"/>
-                        </a:spcAft>
-                      </a:pPr>
                       <a:r>
-                        <a:rPr lang="pt-BR" sz="1600">
-                          <a:effectLst/>
-                        </a:rPr>
-                        <a:t>02/10/2013</a:t>
+                        <a:rPr lang="pt-BR" dirty="0" smtClean="0"/>
+                        <a:t>;</a:t>
                       </a:r>
-                      <a:endParaRPr lang="pt-BR" sz="1600">
-                        <a:solidFill>
-                          <a:srgbClr val="000000"/>
-                        </a:solidFill>
-                        <a:effectLst/>
-                        <a:latin typeface="Arial" panose="020B0604020202020204" pitchFamily="34" charset="0"/>
-                        <a:ea typeface="Arial" panose="020B0604020202020204" pitchFamily="34" charset="0"/>
-                        <a:cs typeface="Times New Roman" panose="02020603050405020304" pitchFamily="18" charset="0"/>
-                      </a:endParaRPr>
+                      <a:endParaRPr lang="pt-BR" dirty="0"/>
                     </a:p>
                   </a:txBody>
-                  <a:tcPr marL="63500" marR="63500" marT="63500" marB="63500"/>
+                  <a:tcPr/>
                 </a:tc>
               </a:tr>
-              <a:tr h="624874">
+              <a:tr h="436852">
                 <a:tc>
                   <a:txBody>
                     <a:bodyPr/>
                     <a:lstStyle/>
                     <a:p>
-                      <a:pPr>
-                        <a:lnSpc>
-                          <a:spcPct val="115000"/>
-                        </a:lnSpc>
-                        <a:spcAft>
-                          <a:spcPts val="0"/>
-                        </a:spcAft>
-                      </a:pPr>
                       <a:r>
-                        <a:rPr lang="pt-BR" sz="1600" b="1">
-                          <a:effectLst/>
-                        </a:rPr>
-                        <a:t>Entrega 02</a:t>
+                        <a:rPr lang="pt-BR" dirty="0" err="1" smtClean="0"/>
+                        <a:t>Float</a:t>
                       </a:r>
-                      <a:endParaRPr lang="pt-BR" sz="1600" b="1">
-                        <a:solidFill>
-                          <a:srgbClr val="000000"/>
-                        </a:solidFill>
-                        <a:effectLst/>
-                        <a:latin typeface="Arial" panose="020B0604020202020204" pitchFamily="34" charset="0"/>
-                        <a:ea typeface="Arial" panose="020B0604020202020204" pitchFamily="34" charset="0"/>
-                        <a:cs typeface="Times New Roman" panose="02020603050405020304" pitchFamily="18" charset="0"/>
-                      </a:endParaRPr>
+                      <a:endParaRPr lang="pt-BR" dirty="0"/>
                     </a:p>
                   </a:txBody>
-                  <a:tcPr marL="63500" marR="63500" marT="63500" marB="63500"/>
-                </a:tc>
-                <a:tc gridSpan="2">
-                  <a:txBody>
-                    <a:bodyPr/>
-                    <a:lstStyle/>
-                    <a:p>
-                      <a:pPr algn="ctr">
-                        <a:lnSpc>
-                          <a:spcPct val="115000"/>
-                        </a:lnSpc>
-                        <a:spcAft>
-                          <a:spcPts val="0"/>
-                        </a:spcAft>
-                      </a:pPr>
-                      <a:r>
-                        <a:rPr lang="pt-BR" sz="1600" dirty="0">
-                          <a:effectLst/>
-                        </a:rPr>
-                        <a:t>03/10/2013</a:t>
-                      </a:r>
-                      <a:endParaRPr lang="pt-BR" sz="1600" dirty="0">
-                        <a:solidFill>
-                          <a:srgbClr val="000000"/>
-                        </a:solidFill>
-                        <a:effectLst/>
-                        <a:latin typeface="Arial" panose="020B0604020202020204" pitchFamily="34" charset="0"/>
-                        <a:ea typeface="Arial" panose="020B0604020202020204" pitchFamily="34" charset="0"/>
-                        <a:cs typeface="Times New Roman" panose="02020603050405020304" pitchFamily="18" charset="0"/>
-                      </a:endParaRPr>
-                    </a:p>
-                    <a:p>
-                      <a:pPr algn="ctr">
-                        <a:lnSpc>
-                          <a:spcPct val="115000"/>
-                        </a:lnSpc>
-                        <a:spcAft>
-                          <a:spcPts val="0"/>
-                        </a:spcAft>
-                      </a:pPr>
-                      <a:r>
-                        <a:rPr lang="pt-BR" sz="1600" dirty="0">
-                          <a:effectLst/>
-                        </a:rPr>
-                        <a:t> </a:t>
-                      </a:r>
-                      <a:endParaRPr lang="pt-BR" sz="1600" dirty="0">
-                        <a:solidFill>
-                          <a:srgbClr val="000000"/>
-                        </a:solidFill>
-                        <a:effectLst/>
-                        <a:latin typeface="Arial" panose="020B0604020202020204" pitchFamily="34" charset="0"/>
-                        <a:ea typeface="Arial" panose="020B0604020202020204" pitchFamily="34" charset="0"/>
-                        <a:cs typeface="Times New Roman" panose="02020603050405020304" pitchFamily="18" charset="0"/>
-                      </a:endParaRPr>
-                    </a:p>
-                  </a:txBody>
-                  <a:tcPr marL="63500" marR="63500" marT="63500" marB="63500"/>
-                </a:tc>
-                <a:tc hMerge="1">
-                  <a:txBody>
-                    <a:bodyPr/>
-                    <a:lstStyle/>
-                    <a:p>
-                      <a:pPr algn="ctr">
-                        <a:lnSpc>
-                          <a:spcPct val="115000"/>
-                        </a:lnSpc>
-                        <a:spcAft>
-                          <a:spcPts val="0"/>
-                        </a:spcAft>
-                      </a:pPr>
-                      <a:endParaRPr lang="pt-BR" sz="1100" dirty="0">
-                        <a:solidFill>
-                          <a:srgbClr val="000000"/>
-                        </a:solidFill>
-                        <a:effectLst/>
-                        <a:latin typeface="Arial" panose="020B0604020202020204" pitchFamily="34" charset="0"/>
-                        <a:ea typeface="Arial" panose="020B0604020202020204" pitchFamily="34" charset="0"/>
-                        <a:cs typeface="Times New Roman" panose="02020603050405020304" pitchFamily="18" charset="0"/>
-                      </a:endParaRPr>
-                    </a:p>
-                  </a:txBody>
-                  <a:tcPr marL="63500" marR="63500" marT="63500" marB="63500"/>
-                </a:tc>
-              </a:tr>
-              <a:tr h="435558">
-                <a:tc>
-                  <a:txBody>
-                    <a:bodyPr/>
-                    <a:lstStyle/>
-                    <a:p>
-                      <a:pPr>
-                        <a:lnSpc>
-                          <a:spcPct val="115000"/>
-                        </a:lnSpc>
-                        <a:spcAft>
-                          <a:spcPts val="0"/>
-                        </a:spcAft>
-                      </a:pPr>
-                      <a:r>
-                        <a:rPr lang="pt-BR" sz="1600" b="1">
-                          <a:effectLst/>
-                        </a:rPr>
-                        <a:t>Aprimorar tokens</a:t>
-                      </a:r>
-                      <a:endParaRPr lang="pt-BR" sz="1600" b="1">
-                        <a:solidFill>
-                          <a:srgbClr val="000000"/>
-                        </a:solidFill>
-                        <a:effectLst/>
-                        <a:latin typeface="Arial" panose="020B0604020202020204" pitchFamily="34" charset="0"/>
-                        <a:ea typeface="Arial" panose="020B0604020202020204" pitchFamily="34" charset="0"/>
-                        <a:cs typeface="Times New Roman" panose="02020603050405020304" pitchFamily="18" charset="0"/>
-                      </a:endParaRPr>
-                    </a:p>
-                  </a:txBody>
-                  <a:tcPr marL="63500" marR="63500" marT="63500" marB="63500"/>
+                  <a:tcPr/>
                 </a:tc>
                 <a:tc>
                   <a:txBody>
                     <a:bodyPr/>
                     <a:lstStyle/>
                     <a:p>
-                      <a:pPr algn="ctr">
-                        <a:lnSpc>
-                          <a:spcPct val="115000"/>
-                        </a:lnSpc>
-                        <a:spcAft>
-                          <a:spcPts val="0"/>
-                        </a:spcAft>
-                      </a:pPr>
                       <a:r>
-                        <a:rPr lang="pt-BR" sz="1600">
-                          <a:effectLst/>
-                        </a:rPr>
-                        <a:t>07/10/2013</a:t>
+                        <a:rPr lang="pt-BR" dirty="0" smtClean="0"/>
+                        <a:t>Out</a:t>
                       </a:r>
-                      <a:endParaRPr lang="pt-BR" sz="1600">
-                        <a:solidFill>
-                          <a:srgbClr val="000000"/>
-                        </a:solidFill>
-                        <a:effectLst/>
-                        <a:latin typeface="Arial" panose="020B0604020202020204" pitchFamily="34" charset="0"/>
-                        <a:ea typeface="Arial" panose="020B0604020202020204" pitchFamily="34" charset="0"/>
-                        <a:cs typeface="Times New Roman" panose="02020603050405020304" pitchFamily="18" charset="0"/>
-                      </a:endParaRPr>
+                      <a:endParaRPr lang="pt-BR" dirty="0"/>
                     </a:p>
                   </a:txBody>
-                  <a:tcPr marL="63500" marR="63500" marT="63500" marB="63500"/>
+                  <a:tcPr/>
                 </a:tc>
                 <a:tc>
                   <a:txBody>
                     <a:bodyPr/>
                     <a:lstStyle/>
                     <a:p>
-                      <a:pPr algn="ctr">
-                        <a:lnSpc>
-                          <a:spcPct val="115000"/>
-                        </a:lnSpc>
-                        <a:spcAft>
-                          <a:spcPts val="0"/>
-                        </a:spcAft>
-                      </a:pPr>
                       <a:r>
-                        <a:rPr lang="pt-BR" sz="1600">
-                          <a:effectLst/>
-                        </a:rPr>
-                        <a:t>11/10/2013</a:t>
+                        <a:rPr lang="pt-BR" dirty="0" smtClean="0"/>
+                        <a:t>&lt;</a:t>
                       </a:r>
-                      <a:endParaRPr lang="pt-BR" sz="1600">
-                        <a:solidFill>
-                          <a:srgbClr val="000000"/>
-                        </a:solidFill>
-                        <a:effectLst/>
-                        <a:latin typeface="Arial" panose="020B0604020202020204" pitchFamily="34" charset="0"/>
-                        <a:ea typeface="Arial" panose="020B0604020202020204" pitchFamily="34" charset="0"/>
-                        <a:cs typeface="Times New Roman" panose="02020603050405020304" pitchFamily="18" charset="0"/>
-                      </a:endParaRPr>
+                      <a:endParaRPr lang="pt-BR" dirty="0"/>
                     </a:p>
                   </a:txBody>
-                  <a:tcPr marL="63500" marR="63500" marT="63500" marB="63500"/>
+                  <a:tcPr/>
                 </a:tc>
               </a:tr>
-              <a:tr h="435558">
+              <a:tr h="436852">
                 <a:tc>
                   <a:txBody>
                     <a:bodyPr/>
                     <a:lstStyle/>
                     <a:p>
-                      <a:pPr>
-                        <a:lnSpc>
-                          <a:spcPct val="115000"/>
-                        </a:lnSpc>
-                        <a:spcAft>
-                          <a:spcPts val="0"/>
-                        </a:spcAft>
-                      </a:pPr>
                       <a:r>
-                        <a:rPr lang="pt-BR" sz="1600" b="1">
-                          <a:effectLst/>
-                        </a:rPr>
-                        <a:t>Geração de código</a:t>
+                        <a:rPr lang="pt-BR" dirty="0" err="1" smtClean="0"/>
+                        <a:t>double</a:t>
                       </a:r>
-                      <a:endParaRPr lang="pt-BR" sz="1600" b="1">
-                        <a:solidFill>
-                          <a:srgbClr val="000000"/>
-                        </a:solidFill>
-                        <a:effectLst/>
-                        <a:latin typeface="Arial" panose="020B0604020202020204" pitchFamily="34" charset="0"/>
-                        <a:ea typeface="Arial" panose="020B0604020202020204" pitchFamily="34" charset="0"/>
-                        <a:cs typeface="Times New Roman" panose="02020603050405020304" pitchFamily="18" charset="0"/>
-                      </a:endParaRPr>
+                      <a:endParaRPr lang="pt-BR" dirty="0"/>
                     </a:p>
                   </a:txBody>
-                  <a:tcPr marL="63500" marR="63500" marT="63500" marB="63500"/>
+                  <a:tcPr/>
                 </a:tc>
                 <a:tc>
                   <a:txBody>
                     <a:bodyPr/>
                     <a:lstStyle/>
                     <a:p>
-                      <a:pPr algn="ctr">
-                        <a:lnSpc>
-                          <a:spcPct val="115000"/>
-                        </a:lnSpc>
-                        <a:spcAft>
-                          <a:spcPts val="0"/>
-                        </a:spcAft>
-                      </a:pPr>
                       <a:r>
-                        <a:rPr lang="pt-BR" sz="1600" dirty="0">
-                          <a:effectLst/>
-                        </a:rPr>
-                        <a:t>14/10/2013</a:t>
+                        <a:rPr lang="pt-BR" dirty="0" err="1" smtClean="0"/>
+                        <a:t>println</a:t>
                       </a:r>
-                      <a:endParaRPr lang="pt-BR" sz="1600" dirty="0">
-                        <a:solidFill>
-                          <a:srgbClr val="000000"/>
-                        </a:solidFill>
-                        <a:effectLst/>
-                        <a:latin typeface="Arial" panose="020B0604020202020204" pitchFamily="34" charset="0"/>
-                        <a:ea typeface="Arial" panose="020B0604020202020204" pitchFamily="34" charset="0"/>
-                        <a:cs typeface="Times New Roman" panose="02020603050405020304" pitchFamily="18" charset="0"/>
-                      </a:endParaRPr>
+                      <a:endParaRPr lang="pt-BR" dirty="0"/>
                     </a:p>
                   </a:txBody>
-                  <a:tcPr marL="63500" marR="63500" marT="63500" marB="63500"/>
+                  <a:tcPr/>
                 </a:tc>
                 <a:tc>
                   <a:txBody>
                     <a:bodyPr/>
                     <a:lstStyle/>
                     <a:p>
-                      <a:pPr algn="ctr">
-                        <a:lnSpc>
-                          <a:spcPct val="115000"/>
-                        </a:lnSpc>
-                        <a:spcAft>
-                          <a:spcPts val="0"/>
-                        </a:spcAft>
-                      </a:pPr>
                       <a:r>
-                        <a:rPr lang="pt-BR" sz="1600">
-                          <a:effectLst/>
-                        </a:rPr>
-                        <a:t>04/11/2013</a:t>
+                        <a:rPr lang="pt-BR" dirty="0" smtClean="0"/>
+                        <a:t>&gt;</a:t>
                       </a:r>
-                      <a:endParaRPr lang="pt-BR" sz="1600">
-                        <a:solidFill>
-                          <a:srgbClr val="000000"/>
-                        </a:solidFill>
-                        <a:effectLst/>
-                        <a:latin typeface="Arial" panose="020B0604020202020204" pitchFamily="34" charset="0"/>
-                        <a:ea typeface="Arial" panose="020B0604020202020204" pitchFamily="34" charset="0"/>
-                        <a:cs typeface="Times New Roman" panose="02020603050405020304" pitchFamily="18" charset="0"/>
-                      </a:endParaRPr>
+                      <a:endParaRPr lang="pt-BR" dirty="0"/>
                     </a:p>
                   </a:txBody>
-                  <a:tcPr marL="63500" marR="63500" marT="63500" marB="63500"/>
+                  <a:tcPr/>
                 </a:tc>
               </a:tr>
-              <a:tr h="624874">
+              <a:tr h="436852">
                 <a:tc>
                   <a:txBody>
                     <a:bodyPr/>
                     <a:lstStyle/>
                     <a:p>
-                      <a:pPr>
-                        <a:lnSpc>
-                          <a:spcPct val="115000"/>
-                        </a:lnSpc>
-                        <a:spcAft>
-                          <a:spcPts val="0"/>
-                        </a:spcAft>
-                      </a:pPr>
                       <a:r>
-                        <a:rPr lang="pt-BR" sz="1600" b="1" dirty="0">
-                          <a:effectLst/>
-                        </a:rPr>
-                        <a:t>Entrega 03</a:t>
+                        <a:rPr lang="pt-BR" dirty="0" err="1" smtClean="0"/>
+                        <a:t>Long</a:t>
                       </a:r>
-                      <a:endParaRPr lang="pt-BR" sz="1600" b="1" dirty="0">
-                        <a:solidFill>
-                          <a:srgbClr val="000000"/>
-                        </a:solidFill>
-                        <a:effectLst/>
-                        <a:latin typeface="Arial" panose="020B0604020202020204" pitchFamily="34" charset="0"/>
-                        <a:ea typeface="Arial" panose="020B0604020202020204" pitchFamily="34" charset="0"/>
-                        <a:cs typeface="Times New Roman" panose="02020603050405020304" pitchFamily="18" charset="0"/>
-                      </a:endParaRPr>
+                      <a:endParaRPr lang="pt-BR" dirty="0"/>
                     </a:p>
                   </a:txBody>
-                  <a:tcPr marL="63500" marR="63500" marT="63500" marB="63500"/>
+                  <a:tcPr/>
                 </a:tc>
-                <a:tc gridSpan="2">
+                <a:tc>
                   <a:txBody>
                     <a:bodyPr/>
                     <a:lstStyle/>
                     <a:p>
-                      <a:pPr algn="ctr">
-                        <a:lnSpc>
-                          <a:spcPct val="115000"/>
-                        </a:lnSpc>
-                        <a:spcAft>
-                          <a:spcPts val="0"/>
-                        </a:spcAft>
-                      </a:pPr>
                       <a:r>
-                        <a:rPr lang="pt-BR" sz="1600" dirty="0">
-                          <a:effectLst/>
-                        </a:rPr>
-                        <a:t>05/11/2013</a:t>
+                        <a:rPr lang="pt-BR" dirty="0" err="1" smtClean="0"/>
+                        <a:t>print</a:t>
                       </a:r>
-                      <a:endParaRPr lang="pt-BR" sz="1600" dirty="0">
-                        <a:solidFill>
-                          <a:srgbClr val="000000"/>
-                        </a:solidFill>
-                        <a:effectLst/>
-                        <a:latin typeface="Arial" panose="020B0604020202020204" pitchFamily="34" charset="0"/>
-                        <a:ea typeface="Arial" panose="020B0604020202020204" pitchFamily="34" charset="0"/>
-                        <a:cs typeface="Times New Roman" panose="02020603050405020304" pitchFamily="18" charset="0"/>
-                      </a:endParaRPr>
-                    </a:p>
-                    <a:p>
-                      <a:pPr algn="ctr">
-                        <a:lnSpc>
-                          <a:spcPct val="115000"/>
-                        </a:lnSpc>
-                        <a:spcAft>
-                          <a:spcPts val="0"/>
-                        </a:spcAft>
-                      </a:pPr>
-                      <a:r>
-                        <a:rPr lang="pt-BR" sz="1600" dirty="0">
-                          <a:effectLst/>
-                        </a:rPr>
-                        <a:t> </a:t>
-                      </a:r>
-                      <a:endParaRPr lang="pt-BR" sz="1600" dirty="0">
-                        <a:solidFill>
-                          <a:srgbClr val="000000"/>
-                        </a:solidFill>
-                        <a:effectLst/>
-                        <a:latin typeface="Arial" panose="020B0604020202020204" pitchFamily="34" charset="0"/>
-                        <a:ea typeface="Arial" panose="020B0604020202020204" pitchFamily="34" charset="0"/>
-                        <a:cs typeface="Times New Roman" panose="02020603050405020304" pitchFamily="18" charset="0"/>
-                      </a:endParaRPr>
+                      <a:endParaRPr lang="pt-BR" dirty="0"/>
                     </a:p>
                   </a:txBody>
-                  <a:tcPr marL="63500" marR="63500" marT="63500" marB="63500"/>
+                  <a:tcPr/>
                 </a:tc>
-                <a:tc hMerge="1">
+                <a:tc>
                   <a:txBody>
                     <a:bodyPr/>
                     <a:lstStyle/>
                     <a:p>
-                      <a:pPr algn="ctr">
-                        <a:lnSpc>
-                          <a:spcPct val="115000"/>
-                        </a:lnSpc>
-                        <a:spcAft>
-                          <a:spcPts val="0"/>
-                        </a:spcAft>
-                      </a:pPr>
-                      <a:endParaRPr lang="pt-BR" sz="1100" dirty="0">
-                        <a:solidFill>
-                          <a:srgbClr val="000000"/>
-                        </a:solidFill>
-                        <a:effectLst/>
-                        <a:latin typeface="Arial" panose="020B0604020202020204" pitchFamily="34" charset="0"/>
-                        <a:ea typeface="Arial" panose="020B0604020202020204" pitchFamily="34" charset="0"/>
-                        <a:cs typeface="Times New Roman" panose="02020603050405020304" pitchFamily="18" charset="0"/>
-                      </a:endParaRPr>
+                      <a:r>
+                        <a:rPr lang="pt-BR" dirty="0" smtClean="0"/>
+                        <a:t>&lt;=</a:t>
+                      </a:r>
+                      <a:endParaRPr lang="pt-BR" dirty="0"/>
                     </a:p>
                   </a:txBody>
-                  <a:tcPr marL="63500" marR="63500" marT="63500" marB="63500"/>
+                  <a:tcPr/>
+                </a:tc>
+              </a:tr>
+              <a:tr h="436852">
+                <a:tc>
+                  <a:txBody>
+                    <a:bodyPr/>
+                    <a:lstStyle/>
+                    <a:p>
+                      <a:r>
+                        <a:rPr lang="pt-BR" dirty="0" smtClean="0"/>
+                        <a:t>short</a:t>
+                      </a:r>
+                      <a:endParaRPr lang="pt-BR" dirty="0"/>
+                    </a:p>
+                  </a:txBody>
+                  <a:tcPr/>
+                </a:tc>
+                <a:tc>
+                  <a:txBody>
+                    <a:bodyPr/>
+                    <a:lstStyle/>
+                    <a:p>
+                      <a:r>
+                        <a:rPr lang="pt-BR" dirty="0" smtClean="0"/>
+                        <a:t>&amp;&amp;</a:t>
+                      </a:r>
+                      <a:endParaRPr lang="pt-BR" dirty="0"/>
+                    </a:p>
+                  </a:txBody>
+                  <a:tcPr/>
+                </a:tc>
+                <a:tc>
+                  <a:txBody>
+                    <a:bodyPr/>
+                    <a:lstStyle/>
+                    <a:p>
+                      <a:r>
+                        <a:rPr lang="pt-BR" dirty="0" smtClean="0"/>
+                        <a:t>&gt;=</a:t>
+                      </a:r>
+                      <a:endParaRPr lang="pt-BR" dirty="0"/>
+                    </a:p>
+                  </a:txBody>
+                  <a:tcPr/>
+                </a:tc>
+              </a:tr>
+              <a:tr h="436852">
+                <a:tc>
+                  <a:txBody>
+                    <a:bodyPr/>
+                    <a:lstStyle/>
+                    <a:p>
+                      <a:r>
+                        <a:rPr lang="pt-BR" dirty="0" err="1" smtClean="0"/>
+                        <a:t>void</a:t>
+                      </a:r>
+                      <a:endParaRPr lang="pt-BR" dirty="0"/>
+                    </a:p>
+                  </a:txBody>
+                  <a:tcPr/>
+                </a:tc>
+                <a:tc>
+                  <a:txBody>
+                    <a:bodyPr/>
+                    <a:lstStyle/>
+                    <a:p>
+                      <a:r>
+                        <a:rPr lang="pt-BR" dirty="0" smtClean="0"/>
+                        <a:t>||</a:t>
+                      </a:r>
+                      <a:endParaRPr lang="pt-BR" dirty="0"/>
+                    </a:p>
+                  </a:txBody>
+                  <a:tcPr/>
+                </a:tc>
+                <a:tc>
+                  <a:txBody>
+                    <a:bodyPr/>
+                    <a:lstStyle/>
+                    <a:p>
+                      <a:r>
+                        <a:rPr lang="pt-BR" dirty="0" smtClean="0"/>
+                        <a:t>==</a:t>
+                      </a:r>
+                      <a:endParaRPr lang="pt-BR" dirty="0"/>
+                    </a:p>
+                  </a:txBody>
+                  <a:tcPr/>
+                </a:tc>
+              </a:tr>
+              <a:tr h="436852">
+                <a:tc>
+                  <a:txBody>
+                    <a:bodyPr/>
+                    <a:lstStyle/>
+                    <a:p>
+                      <a:r>
+                        <a:rPr lang="pt-BR" dirty="0" smtClean="0"/>
+                        <a:t>(</a:t>
+                      </a:r>
+                      <a:endParaRPr lang="pt-BR" dirty="0"/>
+                    </a:p>
+                  </a:txBody>
+                  <a:tcPr/>
+                </a:tc>
+                <a:tc>
+                  <a:txBody>
+                    <a:bodyPr/>
+                    <a:lstStyle/>
+                    <a:p>
+                      <a:r>
+                        <a:rPr lang="pt-BR" dirty="0" smtClean="0"/>
+                        <a:t>)</a:t>
+                      </a:r>
+                      <a:endParaRPr lang="pt-BR" dirty="0"/>
+                    </a:p>
+                  </a:txBody>
+                  <a:tcPr/>
+                </a:tc>
+                <a:tc>
+                  <a:txBody>
+                    <a:bodyPr/>
+                    <a:lstStyle/>
+                    <a:p>
+                      <a:r>
+                        <a:rPr lang="pt-BR" dirty="0" smtClean="0"/>
+                        <a:t>!=</a:t>
+                      </a:r>
+                      <a:endParaRPr lang="pt-BR" dirty="0"/>
+                    </a:p>
+                  </a:txBody>
+                  <a:tcPr/>
                 </a:tc>
               </a:tr>
             </a:tbl>
@@ -14187,7 +16048,7 @@
     </p:spTree>
     <p:extLst>
       <p:ext uri="{BB962C8B-B14F-4D97-AF65-F5344CB8AC3E}">
-        <p14:creationId xmlns:p14="http://schemas.microsoft.com/office/powerpoint/2010/main" val="4192227117"/>
+        <p14:creationId xmlns:p14="http://schemas.microsoft.com/office/powerpoint/2010/main" val="2417705424"/>
       </p:ext>
     </p:extLst>
   </p:cSld>
@@ -14223,12 +16084,12 @@
       </p:grpSpPr>
       <p:sp>
         <p:nvSpPr>
-          <p:cNvPr id="2" name="Título 1"/>
+          <p:cNvPr id="4" name="Título 3"/>
           <p:cNvSpPr>
             <a:spLocks noGrp="1"/>
           </p:cNvSpPr>
           <p:nvPr>
-            <p:ph type="title"/>
+            <p:ph type="ctrTitle"/>
           </p:nvPr>
         </p:nvSpPr>
         <p:spPr/>
@@ -14238,231 +16099,48 @@
           <a:p>
             <a:r>
               <a:rPr lang="pt-BR" dirty="0" smtClean="0"/>
-              <a:t>Expressões Regulares</a:t>
+              <a:t>Obrigado</a:t>
             </a:r>
             <a:endParaRPr lang="pt-BR" dirty="0"/>
           </a:p>
         </p:txBody>
       </p:sp>
-      <p:graphicFrame>
-        <p:nvGraphicFramePr>
-          <p:cNvPr id="4" name="Espaço Reservado para Conteúdo 3"/>
-          <p:cNvGraphicFramePr>
-            <a:graphicFrameLocks noGrp="1"/>
-          </p:cNvGraphicFramePr>
+      <p:sp>
+        <p:nvSpPr>
+          <p:cNvPr id="5" name="Subtítulo 4"/>
+          <p:cNvSpPr>
+            <a:spLocks noGrp="1"/>
+          </p:cNvSpPr>
           <p:nvPr>
-            <p:ph idx="1"/>
-            <p:extLst>
-              <p:ext uri="{D42A27DB-BD31-4B8C-83A1-F6EECF244321}">
-                <p14:modId xmlns:p14="http://schemas.microsoft.com/office/powerpoint/2010/main" val="35421371"/>
-              </p:ext>
-            </p:extLst>
+            <p:ph type="subTitle" idx="1"/>
           </p:nvPr>
-        </p:nvGraphicFramePr>
-        <p:xfrm>
-          <a:off x="677863" y="2160588"/>
-          <a:ext cx="8596312" cy="2966720"/>
-        </p:xfrm>
-        <a:graphic>
-          <a:graphicData uri="http://schemas.openxmlformats.org/drawingml/2006/table">
-            <a:tbl>
-              <a:tblPr firstRow="1" bandRow="1">
-                <a:tableStyleId>{5C22544A-7EE6-4342-B048-85BDC9FD1C3A}</a:tableStyleId>
-              </a:tblPr>
-              <a:tblGrid>
-                <a:gridCol w="4298156"/>
-                <a:gridCol w="4298156"/>
-              </a:tblGrid>
-              <a:tr h="370840">
-                <a:tc>
-                  <a:txBody>
-                    <a:bodyPr/>
-                    <a:lstStyle/>
-                    <a:p>
-                      <a:endParaRPr lang="pt-BR" dirty="0"/>
-                    </a:p>
-                  </a:txBody>
-                  <a:tcPr/>
-                </a:tc>
-                <a:tc>
-                  <a:txBody>
-                    <a:bodyPr/>
-                    <a:lstStyle/>
-                    <a:p>
-                      <a:endParaRPr lang="pt-BR"/>
-                    </a:p>
-                  </a:txBody>
-                  <a:tcPr/>
-                </a:tc>
-              </a:tr>
-              <a:tr h="370840">
-                <a:tc>
-                  <a:txBody>
-                    <a:bodyPr/>
-                    <a:lstStyle/>
-                    <a:p>
-                      <a:endParaRPr lang="pt-BR"/>
-                    </a:p>
-                  </a:txBody>
-                  <a:tcPr/>
-                </a:tc>
-                <a:tc>
-                  <a:txBody>
-                    <a:bodyPr/>
-                    <a:lstStyle/>
-                    <a:p>
-                      <a:endParaRPr lang="pt-BR"/>
-                    </a:p>
-                  </a:txBody>
-                  <a:tcPr/>
-                </a:tc>
-              </a:tr>
-              <a:tr h="370840">
-                <a:tc>
-                  <a:txBody>
-                    <a:bodyPr/>
-                    <a:lstStyle/>
-                    <a:p>
-                      <a:endParaRPr lang="pt-BR"/>
-                    </a:p>
-                  </a:txBody>
-                  <a:tcPr/>
-                </a:tc>
-                <a:tc>
-                  <a:txBody>
-                    <a:bodyPr/>
-                    <a:lstStyle/>
-                    <a:p>
-                      <a:endParaRPr lang="pt-BR"/>
-                    </a:p>
-                  </a:txBody>
-                  <a:tcPr/>
-                </a:tc>
-              </a:tr>
-              <a:tr h="370840">
-                <a:tc>
-                  <a:txBody>
-                    <a:bodyPr/>
-                    <a:lstStyle/>
-                    <a:p>
-                      <a:endParaRPr lang="pt-BR"/>
-                    </a:p>
-                  </a:txBody>
-                  <a:tcPr/>
-                </a:tc>
-                <a:tc>
-                  <a:txBody>
-                    <a:bodyPr/>
-                    <a:lstStyle/>
-                    <a:p>
-                      <a:endParaRPr lang="pt-BR"/>
-                    </a:p>
-                  </a:txBody>
-                  <a:tcPr/>
-                </a:tc>
-              </a:tr>
-              <a:tr h="370840">
-                <a:tc>
-                  <a:txBody>
-                    <a:bodyPr/>
-                    <a:lstStyle/>
-                    <a:p>
-                      <a:endParaRPr lang="pt-BR"/>
-                    </a:p>
-                  </a:txBody>
-                  <a:tcPr/>
-                </a:tc>
-                <a:tc>
-                  <a:txBody>
-                    <a:bodyPr/>
-                    <a:lstStyle/>
-                    <a:p>
-                      <a:endParaRPr lang="pt-BR"/>
-                    </a:p>
-                  </a:txBody>
-                  <a:tcPr/>
-                </a:tc>
-              </a:tr>
-              <a:tr h="370840">
-                <a:tc>
-                  <a:txBody>
-                    <a:bodyPr/>
-                    <a:lstStyle/>
-                    <a:p>
-                      <a:endParaRPr lang="pt-BR"/>
-                    </a:p>
-                  </a:txBody>
-                  <a:tcPr/>
-                </a:tc>
-                <a:tc>
-                  <a:txBody>
-                    <a:bodyPr/>
-                    <a:lstStyle/>
-                    <a:p>
-                      <a:endParaRPr lang="pt-BR"/>
-                    </a:p>
-                  </a:txBody>
-                  <a:tcPr/>
-                </a:tc>
-              </a:tr>
-              <a:tr h="370840">
-                <a:tc>
-                  <a:txBody>
-                    <a:bodyPr/>
-                    <a:lstStyle/>
-                    <a:p>
-                      <a:endParaRPr lang="pt-BR"/>
-                    </a:p>
-                  </a:txBody>
-                  <a:tcPr/>
-                </a:tc>
-                <a:tc>
-                  <a:txBody>
-                    <a:bodyPr/>
-                    <a:lstStyle/>
-                    <a:p>
-                      <a:endParaRPr lang="pt-BR"/>
-                    </a:p>
-                  </a:txBody>
-                  <a:tcPr/>
-                </a:tc>
-              </a:tr>
-              <a:tr h="370840">
-                <a:tc>
-                  <a:txBody>
-                    <a:bodyPr/>
-                    <a:lstStyle/>
-                    <a:p>
-                      <a:endParaRPr lang="pt-BR"/>
-                    </a:p>
-                  </a:txBody>
-                  <a:tcPr/>
-                </a:tc>
-                <a:tc>
-                  <a:txBody>
-                    <a:bodyPr/>
-                    <a:lstStyle/>
-                    <a:p>
-                      <a:endParaRPr lang="pt-BR" dirty="0"/>
-                    </a:p>
-                  </a:txBody>
-                  <a:tcPr/>
-                </a:tc>
-              </a:tr>
-            </a:tbl>
-          </a:graphicData>
-        </a:graphic>
-      </p:graphicFrame>
+        </p:nvSpPr>
+        <p:spPr/>
+        <p:txBody>
+          <a:bodyPr/>
+          <a:lstStyle/>
+          <a:p>
+            <a:endParaRPr lang="pt-BR" dirty="0"/>
+          </a:p>
+        </p:txBody>
+      </p:sp>
     </p:spTree>
     <p:extLst>
       <p:ext uri="{BB962C8B-B14F-4D97-AF65-F5344CB8AC3E}">
-        <p14:creationId xmlns:p14="http://schemas.microsoft.com/office/powerpoint/2010/main" val="2417705424"/>
+        <p14:creationId xmlns:p14="http://schemas.microsoft.com/office/powerpoint/2010/main" val="4148996968"/>
       </p:ext>
     </p:extLst>
   </p:cSld>
   <p:clrMapOvr>
     <a:masterClrMapping/>
   </p:clrMapOvr>
+  <p:timing>
+    <p:tnLst>
+      <p:par>
+        <p:cTn id="1" dur="indefinite" restart="never" nodeType="tmRoot"/>
+      </p:par>
+    </p:tnLst>
+  </p:timing>
 </p:sld>
 </file>
 

</xml_diff>